<commit_message>
Added an empty TwitterController api
</commit_message>
<xml_diff>
--- a/PowerPoll/PowerPoll/bin/Debug/Presentation1.pptx
+++ b/PowerPoll/PowerPoll/bin/Debug/Presentation1.pptx
@@ -2,10 +2,10 @@
 <file path=ppt/presentation.xml><?xml version="1.0" encoding="utf-8"?>
 <p:presentation xmlns:a="http://schemas.openxmlformats.org/drawingml/2006/main" xmlns:r="http://schemas.openxmlformats.org/officeDocument/2006/relationships" xmlns:p="http://schemas.openxmlformats.org/presentationml/2006/main" saveSubsetFonts="1">
   <p:sldMasterIdLst>
-    <p:sldMasterId id="2147483648" r:id="Rd373222bf03c42ba"/>
+    <p:sldMasterId id="2147483648" r:id="R072537bdf8a344e5"/>
   </p:sldMasterIdLst>
   <p:sldIdLst>
-    <p:sldId id="256" r:id="R35feb21c05eb4260"/>
+    <p:sldId id="256" r:id="Raf7aa90d2ce24cbf"/>
   </p:sldIdLst>
   <p:sldSz cx="12192000" cy="6858000"/>
   <p:notesSz cx="6858000" cy="9144000"/>
@@ -2652,17 +2652,17 @@
   </p:cSld>
   <p:clrMap bg1="lt1" tx1="dk1" bg2="lt2" tx2="dk2" accent1="accent1" accent2="accent2" accent3="accent3" accent4="accent4" accent5="accent5" accent6="accent6" hlink="hlink" folHlink="folHlink"/>
   <p:sldLayoutIdLst>
-    <p:sldLayoutId id="2147483649" r:id="Re3075c08bb1e4eb2"/>
-    <p:sldLayoutId id="2147483650" r:id="R5937e5dad64040fe"/>
-    <p:sldLayoutId id="2147483651" r:id="R70d5238fac824665"/>
-    <p:sldLayoutId id="2147483652" r:id="R655f7de063ca4ca6"/>
-    <p:sldLayoutId id="2147483653" r:id="R024916cceda742d4"/>
-    <p:sldLayoutId id="2147483654" r:id="R560b905b53f6499c"/>
-    <p:sldLayoutId id="2147483655" r:id="Rdac640e902cf491a"/>
-    <p:sldLayoutId id="2147483656" r:id="R5430e97055894703"/>
-    <p:sldLayoutId id="2147483657" r:id="R25d2554d0b044801"/>
-    <p:sldLayoutId id="2147483658" r:id="Rbc1db8f55cfe4b35"/>
-    <p:sldLayoutId id="2147483659" r:id="R799cce631ed14ae0"/>
+    <p:sldLayoutId id="2147483649" r:id="R6363ab81c94b4327"/>
+    <p:sldLayoutId id="2147483650" r:id="R41763f4e3f284929"/>
+    <p:sldLayoutId id="2147483651" r:id="Rc232226c7bf24de3"/>
+    <p:sldLayoutId id="2147483652" r:id="Rd46d65aea4364fb8"/>
+    <p:sldLayoutId id="2147483653" r:id="Rb3b66e7ac86d4c4f"/>
+    <p:sldLayoutId id="2147483654" r:id="R4550534ec0fa484f"/>
+    <p:sldLayoutId id="2147483655" r:id="R37e30c2868af410e"/>
+    <p:sldLayoutId id="2147483656" r:id="R41ad6fcee4d24ac3"/>
+    <p:sldLayoutId id="2147483657" r:id="R1c06edc5ef904b8b"/>
+    <p:sldLayoutId id="2147483658" r:id="R6a3a83fef6f84699"/>
+    <p:sldLayoutId id="2147483659" r:id="R08fae670268a4f96"/>
   </p:sldLayoutIdLst>
   <p:txStyles>
     <p:titleStyle>
@@ -3279,7 +3279,7 @@
             </p:xfrm>
             <a:graphic>
               <a:graphicData uri="http://schemas.microsoft.com/office/webextensions/webextension/2010/11">
-                <we:webextensionref xmlns:we="http://schemas.microsoft.com/office/webextensions/webextension/2010/11" xmlns:r="http://schemas.openxmlformats.org/officeDocument/2006/relationships" r:id="Rf90b019560694fd9"/>
+                <we:webextensionref xmlns:we="http://schemas.microsoft.com/office/webextensions/webextension/2010/11" xmlns:r="http://schemas.openxmlformats.org/officeDocument/2006/relationships" r:id="R46a3002b778e4863"/>
               </a:graphicData>
             </a:graphic>
           </p:graphicFrame>
@@ -3291,7 +3291,7 @@
               <p:cNvPicPr/>
             </p:nvPicPr>
             <p:blipFill>
-              <a:blip xmlns:r="http://schemas.openxmlformats.org/officeDocument/2006/relationships" r:embed="R8a18e986f5af46df"/>
+              <a:blip xmlns:r="http://schemas.openxmlformats.org/officeDocument/2006/relationships" r:embed="Rfda08da6eeba4bca"/>
               <a:stretch>
                 <a:fillRect/>
               </a:stretch>
@@ -3322,11 +3322,11 @@
 </file>
 
 <file path=ppt/slides/udata/data.xml><?xml version="1.0" encoding="utf-8"?>
-<we:webextension xmlns:r="http://schemas.openxmlformats.org/officeDocument/2006/relationships" xmlns:we="http://schemas.microsoft.com/office/webextensions/webextension/2010/11" id="{c71209ba-dc9e-4911-92b7-f5d39c6aa24d}">
+<we:webextension xmlns:r="http://schemas.openxmlformats.org/officeDocument/2006/relationships" xmlns:we="http://schemas.microsoft.com/office/webextensions/webextension/2010/11" id="{3d22325f-6379-4170-8157-125e574b8213}">
   <we:reference id="695691ef-8f6e-4dc4-b6b9-c5a5f44499f7" version="1.0.0.0" store="developer" storeType="Registry"/>
   <we:alternateReferences/>
   <we:properties/>
   <we:bindings/>
-  <we:snapshot xmlns:r="http://schemas.openxmlformats.org/officeDocument/2006/relationships" r:embed="R8a18e986f5af46df"/>
+  <we:snapshot xmlns:r="http://schemas.openxmlformats.org/officeDocument/2006/relationships" r:embed="Rfda08da6eeba4bca"/>
 </we:webextension>
 </file>
</xml_diff>

<commit_message>
added some test stuff
</commit_message>
<xml_diff>
--- a/PowerPoll/PowerPoll/bin/Debug/Presentation1.pptx
+++ b/PowerPoll/PowerPoll/bin/Debug/Presentation1.pptx
@@ -2,10 +2,10 @@
 <file path=ppt/presentation.xml><?xml version="1.0" encoding="utf-8"?>
 <p:presentation xmlns:a="http://schemas.openxmlformats.org/drawingml/2006/main" xmlns:r="http://schemas.openxmlformats.org/officeDocument/2006/relationships" xmlns:p="http://schemas.openxmlformats.org/presentationml/2006/main" saveSubsetFonts="1">
   <p:sldMasterIdLst>
-    <p:sldMasterId id="2147483648" r:id="R072537bdf8a344e5"/>
+    <p:sldMasterId id="2147483648" r:id="R0f58918c8fc44e1a"/>
   </p:sldMasterIdLst>
   <p:sldIdLst>
-    <p:sldId id="256" r:id="Raf7aa90d2ce24cbf"/>
+    <p:sldId id="256" r:id="R0a9f913265664a09"/>
   </p:sldIdLst>
   <p:sldSz cx="12192000" cy="6858000"/>
   <p:notesSz cx="6858000" cy="9144000"/>
@@ -2652,17 +2652,17 @@
   </p:cSld>
   <p:clrMap bg1="lt1" tx1="dk1" bg2="lt2" tx2="dk2" accent1="accent1" accent2="accent2" accent3="accent3" accent4="accent4" accent5="accent5" accent6="accent6" hlink="hlink" folHlink="folHlink"/>
   <p:sldLayoutIdLst>
-    <p:sldLayoutId id="2147483649" r:id="R6363ab81c94b4327"/>
-    <p:sldLayoutId id="2147483650" r:id="R41763f4e3f284929"/>
-    <p:sldLayoutId id="2147483651" r:id="Rc232226c7bf24de3"/>
-    <p:sldLayoutId id="2147483652" r:id="Rd46d65aea4364fb8"/>
-    <p:sldLayoutId id="2147483653" r:id="Rb3b66e7ac86d4c4f"/>
-    <p:sldLayoutId id="2147483654" r:id="R4550534ec0fa484f"/>
-    <p:sldLayoutId id="2147483655" r:id="R37e30c2868af410e"/>
-    <p:sldLayoutId id="2147483656" r:id="R41ad6fcee4d24ac3"/>
-    <p:sldLayoutId id="2147483657" r:id="R1c06edc5ef904b8b"/>
-    <p:sldLayoutId id="2147483658" r:id="R6a3a83fef6f84699"/>
-    <p:sldLayoutId id="2147483659" r:id="R08fae670268a4f96"/>
+    <p:sldLayoutId id="2147483649" r:id="Rdf98b197939746a0"/>
+    <p:sldLayoutId id="2147483650" r:id="Re44bf7fb9f6e45e9"/>
+    <p:sldLayoutId id="2147483651" r:id="Rdcfb8bdc1cfd4acc"/>
+    <p:sldLayoutId id="2147483652" r:id="R79eced0b1ef64596"/>
+    <p:sldLayoutId id="2147483653" r:id="R8c2df1147e5947f7"/>
+    <p:sldLayoutId id="2147483654" r:id="R05e3b9613e4544c4"/>
+    <p:sldLayoutId id="2147483655" r:id="R1e243e8cd41d4d34"/>
+    <p:sldLayoutId id="2147483656" r:id="R5872bb0e97414e4b"/>
+    <p:sldLayoutId id="2147483657" r:id="R4e02618fb83b4401"/>
+    <p:sldLayoutId id="2147483658" r:id="Re028ed3337ac459a"/>
+    <p:sldLayoutId id="2147483659" r:id="R31d0382028cb4efb"/>
   </p:sldLayoutIdLst>
   <p:txStyles>
     <p:titleStyle>
@@ -3279,7 +3279,7 @@
             </p:xfrm>
             <a:graphic>
               <a:graphicData uri="http://schemas.microsoft.com/office/webextensions/webextension/2010/11">
-                <we:webextensionref xmlns:we="http://schemas.microsoft.com/office/webextensions/webextension/2010/11" xmlns:r="http://schemas.openxmlformats.org/officeDocument/2006/relationships" r:id="R46a3002b778e4863"/>
+                <we:webextensionref xmlns:we="http://schemas.microsoft.com/office/webextensions/webextension/2010/11" xmlns:r="http://schemas.openxmlformats.org/officeDocument/2006/relationships" r:id="R7327bfc185614681"/>
               </a:graphicData>
             </a:graphic>
           </p:graphicFrame>
@@ -3291,7 +3291,7 @@
               <p:cNvPicPr/>
             </p:nvPicPr>
             <p:blipFill>
-              <a:blip xmlns:r="http://schemas.openxmlformats.org/officeDocument/2006/relationships" r:embed="Rfda08da6eeba4bca"/>
+              <a:blip xmlns:r="http://schemas.openxmlformats.org/officeDocument/2006/relationships" r:embed="Ra65f9be3d4154337"/>
               <a:stretch>
                 <a:fillRect/>
               </a:stretch>
@@ -3322,11 +3322,11 @@
 </file>
 
 <file path=ppt/slides/udata/data.xml><?xml version="1.0" encoding="utf-8"?>
-<we:webextension xmlns:r="http://schemas.openxmlformats.org/officeDocument/2006/relationships" xmlns:we="http://schemas.microsoft.com/office/webextensions/webextension/2010/11" id="{3d22325f-6379-4170-8157-125e574b8213}">
+<we:webextension xmlns:r="http://schemas.openxmlformats.org/officeDocument/2006/relationships" xmlns:we="http://schemas.microsoft.com/office/webextensions/webextension/2010/11" id="{77f30025-0611-42c5-96bf-0b8e01abc9e2}">
   <we:reference id="695691ef-8f6e-4dc4-b6b9-c5a5f44499f7" version="1.0.0.0" store="developer" storeType="Registry"/>
   <we:alternateReferences/>
   <we:properties/>
   <we:bindings/>
-  <we:snapshot xmlns:r="http://schemas.openxmlformats.org/officeDocument/2006/relationships" r:embed="Rfda08da6eeba4bca"/>
+  <we:snapshot xmlns:r="http://schemas.openxmlformats.org/officeDocument/2006/relationships" r:embed="Ra65f9be3d4154337"/>
 </we:webextension>
 </file>
</xml_diff>

<commit_message>
no windoewsazure error fixed
</commit_message>
<xml_diff>
--- a/PowerPoll/PowerPoll/bin/Debug/Presentation1.pptx
+++ b/PowerPoll/PowerPoll/bin/Debug/Presentation1.pptx
@@ -2,10 +2,10 @@
 <file path=ppt/presentation.xml><?xml version="1.0" encoding="utf-8"?>
 <p:presentation xmlns:a="http://schemas.openxmlformats.org/drawingml/2006/main" xmlns:r="http://schemas.openxmlformats.org/officeDocument/2006/relationships" xmlns:p="http://schemas.openxmlformats.org/presentationml/2006/main" saveSubsetFonts="1">
   <p:sldMasterIdLst>
-    <p:sldMasterId id="2147483648" r:id="R319edc5ab1d748fc"/>
+    <p:sldMasterId id="2147483648" r:id="R18010c220349401d"/>
   </p:sldMasterIdLst>
   <p:sldIdLst>
-    <p:sldId id="256" r:id="R5f8d21d4e7b5475d"/>
+    <p:sldId id="256" r:id="Red41c35e94184d79"/>
   </p:sldIdLst>
   <p:sldSz cx="12192000" cy="6858000"/>
   <p:notesSz cx="6858000" cy="9144000"/>
@@ -2652,17 +2652,17 @@
   </p:cSld>
   <p:clrMap bg1="lt1" tx1="dk1" bg2="lt2" tx2="dk2" accent1="accent1" accent2="accent2" accent3="accent3" accent4="accent4" accent5="accent5" accent6="accent6" hlink="hlink" folHlink="folHlink"/>
   <p:sldLayoutIdLst>
-    <p:sldLayoutId id="2147483649" r:id="R80eee216f2e94340"/>
-    <p:sldLayoutId id="2147483650" r:id="R36ca74366de14cb0"/>
-    <p:sldLayoutId id="2147483651" r:id="Rf1fa14b6df054ec7"/>
-    <p:sldLayoutId id="2147483652" r:id="R5ae48dab3c18443f"/>
-    <p:sldLayoutId id="2147483653" r:id="Rc29ee6ddd5a941cb"/>
-    <p:sldLayoutId id="2147483654" r:id="R093a28da77be4742"/>
-    <p:sldLayoutId id="2147483655" r:id="R8145215b02244652"/>
-    <p:sldLayoutId id="2147483656" r:id="Rb002aee4d62e48e1"/>
-    <p:sldLayoutId id="2147483657" r:id="Ra3f56149e86e4018"/>
-    <p:sldLayoutId id="2147483658" r:id="R707d81243bf847be"/>
-    <p:sldLayoutId id="2147483659" r:id="R8543b6cfff1a4785"/>
+    <p:sldLayoutId id="2147483649" r:id="R448a71d8920d4abf"/>
+    <p:sldLayoutId id="2147483650" r:id="Rae416e41e88c4b9e"/>
+    <p:sldLayoutId id="2147483651" r:id="R798dfd73b3b4440c"/>
+    <p:sldLayoutId id="2147483652" r:id="R907b7499ec474545"/>
+    <p:sldLayoutId id="2147483653" r:id="R774f5077ed6c4b4f"/>
+    <p:sldLayoutId id="2147483654" r:id="Rc6be15804b774fb7"/>
+    <p:sldLayoutId id="2147483655" r:id="R482a2ae9e166450e"/>
+    <p:sldLayoutId id="2147483656" r:id="R0aa7dc5418214237"/>
+    <p:sldLayoutId id="2147483657" r:id="R7865bf43d27e40a1"/>
+    <p:sldLayoutId id="2147483658" r:id="Ref3089519ceb4e39"/>
+    <p:sldLayoutId id="2147483659" r:id="R2f65761aab2548ae"/>
   </p:sldLayoutIdLst>
   <p:txStyles>
     <p:titleStyle>
@@ -3279,7 +3279,7 @@
             </p:xfrm>
             <a:graphic>
               <a:graphicData uri="http://schemas.microsoft.com/office/webextensions/webextension/2010/11">
-                <we:webextensionref xmlns:we="http://schemas.microsoft.com/office/webextensions/webextension/2010/11" xmlns:r="http://schemas.openxmlformats.org/officeDocument/2006/relationships" r:id="Rf7ee69ee277c4d37"/>
+                <we:webextensionref xmlns:we="http://schemas.microsoft.com/office/webextensions/webextension/2010/11" xmlns:r="http://schemas.openxmlformats.org/officeDocument/2006/relationships" r:id="Rfd24aabea6634747"/>
               </a:graphicData>
             </a:graphic>
           </p:graphicFrame>
@@ -3291,7 +3291,7 @@
               <p:cNvPicPr/>
             </p:nvPicPr>
             <p:blipFill>
-              <a:blip xmlns:r="http://schemas.openxmlformats.org/officeDocument/2006/relationships" r:embed="R65dbf94ad7c84191"/>
+              <a:blip xmlns:r="http://schemas.openxmlformats.org/officeDocument/2006/relationships" r:embed="R49fc3857fa884cdf"/>
               <a:stretch>
                 <a:fillRect/>
               </a:stretch>
@@ -3322,11 +3322,11 @@
 </file>
 
 <file path=ppt/slides/udata/data.xml><?xml version="1.0" encoding="utf-8"?>
-<we:webextension xmlns:r="http://schemas.openxmlformats.org/officeDocument/2006/relationships" xmlns:we="http://schemas.microsoft.com/office/webextensions/webextension/2010/11" id="{c76d4a0f-2345-4a60-8a19-f2e3c52dc79c}">
+<we:webextension xmlns:r="http://schemas.openxmlformats.org/officeDocument/2006/relationships" xmlns:we="http://schemas.microsoft.com/office/webextensions/webextension/2010/11" id="{2797215d-9e8f-44d9-8af2-b52d9562ce64}">
   <we:reference id="695691ef-8f6e-4dc4-b6b9-c5a5f44499f7" version="1.0.0.0" store="developer" storeType="Registry"/>
   <we:alternateReferences/>
   <we:properties/>
   <we:bindings/>
-  <we:snapshot xmlns:r="http://schemas.openxmlformats.org/officeDocument/2006/relationships" r:embed="R65dbf94ad7c84191"/>
+  <we:snapshot xmlns:r="http://schemas.openxmlformats.org/officeDocument/2006/relationships" r:embed="R49fc3857fa884cdf"/>
 </we:webextension>
 </file>
</xml_diff>

<commit_message>
added a rough ui, needs some CSS to make it better and a way of removing keyword boxes, it does create tables on the backend though
</commit_message>
<xml_diff>
--- a/PowerPoll/PowerPoll/bin/Debug/Presentation1.pptx
+++ b/PowerPoll/PowerPoll/bin/Debug/Presentation1.pptx
@@ -2,10 +2,10 @@
 <file path=ppt/presentation.xml><?xml version="1.0" encoding="utf-8"?>
 <p:presentation xmlns:a="http://schemas.openxmlformats.org/drawingml/2006/main" xmlns:r="http://schemas.openxmlformats.org/officeDocument/2006/relationships" xmlns:p="http://schemas.openxmlformats.org/presentationml/2006/main" saveSubsetFonts="1">
   <p:sldMasterIdLst>
-    <p:sldMasterId id="2147483648" r:id="R18010c220349401d"/>
+    <p:sldMasterId id="2147483648" r:id="R3a09c5fa2bab47e7"/>
   </p:sldMasterIdLst>
   <p:sldIdLst>
-    <p:sldId id="256" r:id="Red41c35e94184d79"/>
+    <p:sldId id="256" r:id="R059f192688234b72"/>
   </p:sldIdLst>
   <p:sldSz cx="12192000" cy="6858000"/>
   <p:notesSz cx="6858000" cy="9144000"/>
@@ -2652,17 +2652,17 @@
   </p:cSld>
   <p:clrMap bg1="lt1" tx1="dk1" bg2="lt2" tx2="dk2" accent1="accent1" accent2="accent2" accent3="accent3" accent4="accent4" accent5="accent5" accent6="accent6" hlink="hlink" folHlink="folHlink"/>
   <p:sldLayoutIdLst>
-    <p:sldLayoutId id="2147483649" r:id="R448a71d8920d4abf"/>
-    <p:sldLayoutId id="2147483650" r:id="Rae416e41e88c4b9e"/>
-    <p:sldLayoutId id="2147483651" r:id="R798dfd73b3b4440c"/>
-    <p:sldLayoutId id="2147483652" r:id="R907b7499ec474545"/>
-    <p:sldLayoutId id="2147483653" r:id="R774f5077ed6c4b4f"/>
-    <p:sldLayoutId id="2147483654" r:id="Rc6be15804b774fb7"/>
-    <p:sldLayoutId id="2147483655" r:id="R482a2ae9e166450e"/>
-    <p:sldLayoutId id="2147483656" r:id="R0aa7dc5418214237"/>
-    <p:sldLayoutId id="2147483657" r:id="R7865bf43d27e40a1"/>
-    <p:sldLayoutId id="2147483658" r:id="Ref3089519ceb4e39"/>
-    <p:sldLayoutId id="2147483659" r:id="R2f65761aab2548ae"/>
+    <p:sldLayoutId id="2147483649" r:id="R2aa9eb074edd4352"/>
+    <p:sldLayoutId id="2147483650" r:id="Rce553e06bc8d4271"/>
+    <p:sldLayoutId id="2147483651" r:id="Re610881890ae4fad"/>
+    <p:sldLayoutId id="2147483652" r:id="R4b1f5cc4bbb44c6a"/>
+    <p:sldLayoutId id="2147483653" r:id="R054857dc51de4817"/>
+    <p:sldLayoutId id="2147483654" r:id="R59fa363d6ece40f8"/>
+    <p:sldLayoutId id="2147483655" r:id="R38acdad1f2ff4c2f"/>
+    <p:sldLayoutId id="2147483656" r:id="Rf0eae95a591b4adb"/>
+    <p:sldLayoutId id="2147483657" r:id="Rffe67b44c399480c"/>
+    <p:sldLayoutId id="2147483658" r:id="R672b8032a0c64342"/>
+    <p:sldLayoutId id="2147483659" r:id="R15e7cdd3aa4c4a00"/>
   </p:sldLayoutIdLst>
   <p:txStyles>
     <p:titleStyle>
@@ -3275,11 +3275,11 @@
             </p:nvGraphicFramePr>
             <p:xfrm>
               <a:off x="0" y="0"/>
-              <a:ext cx="3810000" cy="3810000"/>
+              <a:ext cx="9144000" cy="6858000"/>
             </p:xfrm>
             <a:graphic>
               <a:graphicData uri="http://schemas.microsoft.com/office/webextensions/webextension/2010/11">
-                <we:webextensionref xmlns:we="http://schemas.microsoft.com/office/webextensions/webextension/2010/11" xmlns:r="http://schemas.openxmlformats.org/officeDocument/2006/relationships" r:id="Rfd24aabea6634747"/>
+                <we:webextensionref xmlns:we="http://schemas.microsoft.com/office/webextensions/webextension/2010/11" xmlns:r="http://schemas.openxmlformats.org/officeDocument/2006/relationships" r:id="Re194a66178774350"/>
               </a:graphicData>
             </a:graphic>
           </p:graphicFrame>
@@ -3291,7 +3291,7 @@
               <p:cNvPicPr/>
             </p:nvPicPr>
             <p:blipFill>
-              <a:blip xmlns:r="http://schemas.openxmlformats.org/officeDocument/2006/relationships" r:embed="R49fc3857fa884cdf"/>
+              <a:blip xmlns:r="http://schemas.openxmlformats.org/officeDocument/2006/relationships" r:embed="Rae7fc81708d24a25"/>
               <a:stretch>
                 <a:fillRect/>
               </a:stretch>
@@ -3299,7 +3299,7 @@
             <p:spPr>
               <a:xfrm>
                 <a:off x="0" y="0"/>
-                <a:ext cx="3810000" cy="3810000"/>
+                <a:ext cx="9144000" cy="6858000"/>
               </a:xfrm>
               <a:prstGeom prst="rect">
                 <a:avLst/>
@@ -3322,11 +3322,11 @@
 </file>
 
 <file path=ppt/slides/udata/data.xml><?xml version="1.0" encoding="utf-8"?>
-<we:webextension xmlns:r="http://schemas.openxmlformats.org/officeDocument/2006/relationships" xmlns:we="http://schemas.microsoft.com/office/webextensions/webextension/2010/11" id="{2797215d-9e8f-44d9-8af2-b52d9562ce64}">
+<we:webextension xmlns:r="http://schemas.openxmlformats.org/officeDocument/2006/relationships" xmlns:we="http://schemas.microsoft.com/office/webextensions/webextension/2010/11" id="{3ca126ea-8e5d-416e-94a3-989da39bc968}">
   <we:reference id="695691ef-8f6e-4dc4-b6b9-c5a5f44499f7" version="1.0.0.0" store="developer" storeType="Registry"/>
   <we:alternateReferences/>
   <we:properties/>
   <we:bindings/>
-  <we:snapshot xmlns:r="http://schemas.openxmlformats.org/officeDocument/2006/relationships" r:embed="R49fc3857fa884cdf"/>
+  <we:snapshot xmlns:r="http://schemas.openxmlformats.org/officeDocument/2006/relationships" r:embed="Rae7fc81708d24a25"/>
 </we:webextension>
 </file>
</xml_diff>

<commit_message>
backend works on azure now
</commit_message>
<xml_diff>
--- a/PowerPoll/PowerPoll/bin/Debug/Presentation1.pptx
+++ b/PowerPoll/PowerPoll/bin/Debug/Presentation1.pptx
@@ -2,10 +2,10 @@
 <file path=ppt/presentation.xml><?xml version="1.0" encoding="utf-8"?>
 <p:presentation xmlns:a="http://schemas.openxmlformats.org/drawingml/2006/main" xmlns:r="http://schemas.openxmlformats.org/officeDocument/2006/relationships" xmlns:p="http://schemas.openxmlformats.org/presentationml/2006/main" saveSubsetFonts="1">
   <p:sldMasterIdLst>
-    <p:sldMasterId id="2147483648" r:id="R3a09c5fa2bab47e7"/>
+    <p:sldMasterId id="2147483648" r:id="R300fb0dce9ff40fe"/>
   </p:sldMasterIdLst>
   <p:sldIdLst>
-    <p:sldId id="256" r:id="R059f192688234b72"/>
+    <p:sldId id="256" r:id="R2d1777c2e6254ff2"/>
   </p:sldIdLst>
   <p:sldSz cx="12192000" cy="6858000"/>
   <p:notesSz cx="6858000" cy="9144000"/>
@@ -2652,17 +2652,17 @@
   </p:cSld>
   <p:clrMap bg1="lt1" tx1="dk1" bg2="lt2" tx2="dk2" accent1="accent1" accent2="accent2" accent3="accent3" accent4="accent4" accent5="accent5" accent6="accent6" hlink="hlink" folHlink="folHlink"/>
   <p:sldLayoutIdLst>
-    <p:sldLayoutId id="2147483649" r:id="R2aa9eb074edd4352"/>
-    <p:sldLayoutId id="2147483650" r:id="Rce553e06bc8d4271"/>
-    <p:sldLayoutId id="2147483651" r:id="Re610881890ae4fad"/>
-    <p:sldLayoutId id="2147483652" r:id="R4b1f5cc4bbb44c6a"/>
-    <p:sldLayoutId id="2147483653" r:id="R054857dc51de4817"/>
-    <p:sldLayoutId id="2147483654" r:id="R59fa363d6ece40f8"/>
-    <p:sldLayoutId id="2147483655" r:id="R38acdad1f2ff4c2f"/>
-    <p:sldLayoutId id="2147483656" r:id="Rf0eae95a591b4adb"/>
-    <p:sldLayoutId id="2147483657" r:id="Rffe67b44c399480c"/>
-    <p:sldLayoutId id="2147483658" r:id="R672b8032a0c64342"/>
-    <p:sldLayoutId id="2147483659" r:id="R15e7cdd3aa4c4a00"/>
+    <p:sldLayoutId id="2147483649" r:id="Rb7052a091e3b449d"/>
+    <p:sldLayoutId id="2147483650" r:id="Rd1f853615dfa46cb"/>
+    <p:sldLayoutId id="2147483651" r:id="R4102c78a77384457"/>
+    <p:sldLayoutId id="2147483652" r:id="R37bae52ebc0249fc"/>
+    <p:sldLayoutId id="2147483653" r:id="R5e8a2cbe4e1d4d8d"/>
+    <p:sldLayoutId id="2147483654" r:id="R334199a5594845ee"/>
+    <p:sldLayoutId id="2147483655" r:id="R4fe9e6f086e84f61"/>
+    <p:sldLayoutId id="2147483656" r:id="R815ce2561f0d4a34"/>
+    <p:sldLayoutId id="2147483657" r:id="Rd1a3c38ac3d5483d"/>
+    <p:sldLayoutId id="2147483658" r:id="R565eeac85c2649eb"/>
+    <p:sldLayoutId id="2147483659" r:id="Rde99a317c20c4a65"/>
   </p:sldLayoutIdLst>
   <p:txStyles>
     <p:titleStyle>
@@ -3279,7 +3279,7 @@
             </p:xfrm>
             <a:graphic>
               <a:graphicData uri="http://schemas.microsoft.com/office/webextensions/webextension/2010/11">
-                <we:webextensionref xmlns:we="http://schemas.microsoft.com/office/webextensions/webextension/2010/11" xmlns:r="http://schemas.openxmlformats.org/officeDocument/2006/relationships" r:id="Re194a66178774350"/>
+                <we:webextensionref xmlns:we="http://schemas.microsoft.com/office/webextensions/webextension/2010/11" xmlns:r="http://schemas.openxmlformats.org/officeDocument/2006/relationships" r:id="R0ba3fa3eac1440a4"/>
               </a:graphicData>
             </a:graphic>
           </p:graphicFrame>
@@ -3291,7 +3291,7 @@
               <p:cNvPicPr/>
             </p:nvPicPr>
             <p:blipFill>
-              <a:blip xmlns:r="http://schemas.openxmlformats.org/officeDocument/2006/relationships" r:embed="Rae7fc81708d24a25"/>
+              <a:blip xmlns:r="http://schemas.openxmlformats.org/officeDocument/2006/relationships" r:embed="Rf484042c2df24d1b"/>
               <a:stretch>
                 <a:fillRect/>
               </a:stretch>
@@ -3322,11 +3322,11 @@
 </file>
 
 <file path=ppt/slides/udata/data.xml><?xml version="1.0" encoding="utf-8"?>
-<we:webextension xmlns:r="http://schemas.openxmlformats.org/officeDocument/2006/relationships" xmlns:we="http://schemas.microsoft.com/office/webextensions/webextension/2010/11" id="{3ca126ea-8e5d-416e-94a3-989da39bc968}">
+<we:webextension xmlns:r="http://schemas.openxmlformats.org/officeDocument/2006/relationships" xmlns:we="http://schemas.microsoft.com/office/webextensions/webextension/2010/11" id="{87e6e383-264c-4eb2-9536-dd99281c1e70}">
   <we:reference id="695691ef-8f6e-4dc4-b6b9-c5a5f44499f7" version="1.0.0.0" store="developer" storeType="Registry"/>
   <we:alternateReferences/>
   <we:properties/>
   <we:bindings/>
-  <we:snapshot xmlns:r="http://schemas.openxmlformats.org/officeDocument/2006/relationships" r:embed="Rae7fc81708d24a25"/>
+  <we:snapshot xmlns:r="http://schemas.openxmlformats.org/officeDocument/2006/relationships" r:embed="Rf484042c2df24d1b"/>
 </we:webextension>
 </file>
</xml_diff>

<commit_message>
got a rough chart working with live data
</commit_message>
<xml_diff>
--- a/PowerPoll/PowerPoll/bin/Debug/Presentation1.pptx
+++ b/PowerPoll/PowerPoll/bin/Debug/Presentation1.pptx
@@ -2,10 +2,10 @@
 <file path=ppt/presentation.xml><?xml version="1.0" encoding="utf-8"?>
 <p:presentation xmlns:a="http://schemas.openxmlformats.org/drawingml/2006/main" xmlns:r="http://schemas.openxmlformats.org/officeDocument/2006/relationships" xmlns:p="http://schemas.openxmlformats.org/presentationml/2006/main" saveSubsetFonts="1">
   <p:sldMasterIdLst>
-    <p:sldMasterId id="2147483648" r:id="R300fb0dce9ff40fe"/>
+    <p:sldMasterId id="2147483648" r:id="R6eff4b8c90804ab3"/>
   </p:sldMasterIdLst>
   <p:sldIdLst>
-    <p:sldId id="256" r:id="R2d1777c2e6254ff2"/>
+    <p:sldId id="256" r:id="Ra33187b001104fe1"/>
   </p:sldIdLst>
   <p:sldSz cx="12192000" cy="6858000"/>
   <p:notesSz cx="6858000" cy="9144000"/>
@@ -2652,17 +2652,17 @@
   </p:cSld>
   <p:clrMap bg1="lt1" tx1="dk1" bg2="lt2" tx2="dk2" accent1="accent1" accent2="accent2" accent3="accent3" accent4="accent4" accent5="accent5" accent6="accent6" hlink="hlink" folHlink="folHlink"/>
   <p:sldLayoutIdLst>
-    <p:sldLayoutId id="2147483649" r:id="Rb7052a091e3b449d"/>
-    <p:sldLayoutId id="2147483650" r:id="Rd1f853615dfa46cb"/>
-    <p:sldLayoutId id="2147483651" r:id="R4102c78a77384457"/>
-    <p:sldLayoutId id="2147483652" r:id="R37bae52ebc0249fc"/>
-    <p:sldLayoutId id="2147483653" r:id="R5e8a2cbe4e1d4d8d"/>
-    <p:sldLayoutId id="2147483654" r:id="R334199a5594845ee"/>
-    <p:sldLayoutId id="2147483655" r:id="R4fe9e6f086e84f61"/>
-    <p:sldLayoutId id="2147483656" r:id="R815ce2561f0d4a34"/>
-    <p:sldLayoutId id="2147483657" r:id="Rd1a3c38ac3d5483d"/>
-    <p:sldLayoutId id="2147483658" r:id="R565eeac85c2649eb"/>
-    <p:sldLayoutId id="2147483659" r:id="Rde99a317c20c4a65"/>
+    <p:sldLayoutId id="2147483649" r:id="Rb4204f9f3e9c42b3"/>
+    <p:sldLayoutId id="2147483650" r:id="Rde2a623f8fec4ad8"/>
+    <p:sldLayoutId id="2147483651" r:id="R7b6b85295ccd44db"/>
+    <p:sldLayoutId id="2147483652" r:id="R4d86233eedeb439d"/>
+    <p:sldLayoutId id="2147483653" r:id="R14a8380442604f1c"/>
+    <p:sldLayoutId id="2147483654" r:id="R9a66ed2c44974be5"/>
+    <p:sldLayoutId id="2147483655" r:id="Rf0c43047c9e7471e"/>
+    <p:sldLayoutId id="2147483656" r:id="R2225757d48c44809"/>
+    <p:sldLayoutId id="2147483657" r:id="R5c19f14556f9490a"/>
+    <p:sldLayoutId id="2147483658" r:id="R2859386ef69b4967"/>
+    <p:sldLayoutId id="2147483659" r:id="Rd566867608124fcb"/>
   </p:sldLayoutIdLst>
   <p:txStyles>
     <p:titleStyle>
@@ -3279,7 +3279,7 @@
             </p:xfrm>
             <a:graphic>
               <a:graphicData uri="http://schemas.microsoft.com/office/webextensions/webextension/2010/11">
-                <we:webextensionref xmlns:we="http://schemas.microsoft.com/office/webextensions/webextension/2010/11" xmlns:r="http://schemas.openxmlformats.org/officeDocument/2006/relationships" r:id="R0ba3fa3eac1440a4"/>
+                <we:webextensionref xmlns:we="http://schemas.microsoft.com/office/webextensions/webextension/2010/11" xmlns:r="http://schemas.openxmlformats.org/officeDocument/2006/relationships" r:id="R8b099005579944a2"/>
               </a:graphicData>
             </a:graphic>
           </p:graphicFrame>
@@ -3291,7 +3291,7 @@
               <p:cNvPicPr/>
             </p:nvPicPr>
             <p:blipFill>
-              <a:blip xmlns:r="http://schemas.openxmlformats.org/officeDocument/2006/relationships" r:embed="Rf484042c2df24d1b"/>
+              <a:blip xmlns:r="http://schemas.openxmlformats.org/officeDocument/2006/relationships" r:embed="R151b7fc8d1f84e49"/>
               <a:stretch>
                 <a:fillRect/>
               </a:stretch>
@@ -3322,11 +3322,11 @@
 </file>
 
 <file path=ppt/slides/udata/data.xml><?xml version="1.0" encoding="utf-8"?>
-<we:webextension xmlns:r="http://schemas.openxmlformats.org/officeDocument/2006/relationships" xmlns:we="http://schemas.microsoft.com/office/webextensions/webextension/2010/11" id="{87e6e383-264c-4eb2-9536-dd99281c1e70}">
+<we:webextension xmlns:r="http://schemas.openxmlformats.org/officeDocument/2006/relationships" xmlns:we="http://schemas.microsoft.com/office/webextensions/webextension/2010/11" id="{7dc3bd83-358b-4002-b142-8ab4cc21447e}">
   <we:reference id="695691ef-8f6e-4dc4-b6b9-c5a5f44499f7" version="1.0.0.0" store="developer" storeType="Registry"/>
   <we:alternateReferences/>
   <we:properties/>
   <we:bindings/>
-  <we:snapshot xmlns:r="http://schemas.openxmlformats.org/officeDocument/2006/relationships" r:embed="Rf484042c2df24d1b"/>
+  <we:snapshot xmlns:r="http://schemas.openxmlformats.org/officeDocument/2006/relationships" r:embed="R151b7fc8d1f84e49"/>
 </we:webextension>
 </file>
</xml_diff>

<commit_message>
made a slighly better, animated bar graph
</commit_message>
<xml_diff>
--- a/PowerPoll/PowerPoll/bin/Debug/Presentation1.pptx
+++ b/PowerPoll/PowerPoll/bin/Debug/Presentation1.pptx
@@ -2,10 +2,10 @@
 <file path=ppt/presentation.xml><?xml version="1.0" encoding="utf-8"?>
 <p:presentation xmlns:a="http://schemas.openxmlformats.org/drawingml/2006/main" xmlns:r="http://schemas.openxmlformats.org/officeDocument/2006/relationships" xmlns:p="http://schemas.openxmlformats.org/presentationml/2006/main" saveSubsetFonts="1">
   <p:sldMasterIdLst>
-    <p:sldMasterId id="2147483648" r:id="R6eff4b8c90804ab3"/>
+    <p:sldMasterId id="2147483648" r:id="R1e5fbfd430564416"/>
   </p:sldMasterIdLst>
   <p:sldIdLst>
-    <p:sldId id="256" r:id="Ra33187b001104fe1"/>
+    <p:sldId id="256" r:id="R06232df0e57246e2"/>
   </p:sldIdLst>
   <p:sldSz cx="12192000" cy="6858000"/>
   <p:notesSz cx="6858000" cy="9144000"/>
@@ -2652,17 +2652,17 @@
   </p:cSld>
   <p:clrMap bg1="lt1" tx1="dk1" bg2="lt2" tx2="dk2" accent1="accent1" accent2="accent2" accent3="accent3" accent4="accent4" accent5="accent5" accent6="accent6" hlink="hlink" folHlink="folHlink"/>
   <p:sldLayoutIdLst>
-    <p:sldLayoutId id="2147483649" r:id="Rb4204f9f3e9c42b3"/>
-    <p:sldLayoutId id="2147483650" r:id="Rde2a623f8fec4ad8"/>
-    <p:sldLayoutId id="2147483651" r:id="R7b6b85295ccd44db"/>
-    <p:sldLayoutId id="2147483652" r:id="R4d86233eedeb439d"/>
-    <p:sldLayoutId id="2147483653" r:id="R14a8380442604f1c"/>
-    <p:sldLayoutId id="2147483654" r:id="R9a66ed2c44974be5"/>
-    <p:sldLayoutId id="2147483655" r:id="Rf0c43047c9e7471e"/>
-    <p:sldLayoutId id="2147483656" r:id="R2225757d48c44809"/>
-    <p:sldLayoutId id="2147483657" r:id="R5c19f14556f9490a"/>
-    <p:sldLayoutId id="2147483658" r:id="R2859386ef69b4967"/>
-    <p:sldLayoutId id="2147483659" r:id="Rd566867608124fcb"/>
+    <p:sldLayoutId id="2147483649" r:id="R34501fd4711b45f4"/>
+    <p:sldLayoutId id="2147483650" r:id="Rdfdd616a78784d1d"/>
+    <p:sldLayoutId id="2147483651" r:id="Rdb0576d6588c4aa8"/>
+    <p:sldLayoutId id="2147483652" r:id="Rfde7633abb894e1f"/>
+    <p:sldLayoutId id="2147483653" r:id="R2aee3ea8659e406e"/>
+    <p:sldLayoutId id="2147483654" r:id="R57b82678169f4b0f"/>
+    <p:sldLayoutId id="2147483655" r:id="R8180e12e252745a1"/>
+    <p:sldLayoutId id="2147483656" r:id="R35669f4acd9b4eef"/>
+    <p:sldLayoutId id="2147483657" r:id="Rb187621815b8455a"/>
+    <p:sldLayoutId id="2147483658" r:id="R34828379a9384035"/>
+    <p:sldLayoutId id="2147483659" r:id="R678995fa45194e0d"/>
   </p:sldLayoutIdLst>
   <p:txStyles>
     <p:titleStyle>
@@ -3279,7 +3279,7 @@
             </p:xfrm>
             <a:graphic>
               <a:graphicData uri="http://schemas.microsoft.com/office/webextensions/webextension/2010/11">
-                <we:webextensionref xmlns:we="http://schemas.microsoft.com/office/webextensions/webextension/2010/11" xmlns:r="http://schemas.openxmlformats.org/officeDocument/2006/relationships" r:id="R8b099005579944a2"/>
+                <we:webextensionref xmlns:we="http://schemas.microsoft.com/office/webextensions/webextension/2010/11" xmlns:r="http://schemas.openxmlformats.org/officeDocument/2006/relationships" r:id="R0829578d455e4e9e"/>
               </a:graphicData>
             </a:graphic>
           </p:graphicFrame>
@@ -3291,7 +3291,7 @@
               <p:cNvPicPr/>
             </p:nvPicPr>
             <p:blipFill>
-              <a:blip xmlns:r="http://schemas.openxmlformats.org/officeDocument/2006/relationships" r:embed="R151b7fc8d1f84e49"/>
+              <a:blip xmlns:r="http://schemas.openxmlformats.org/officeDocument/2006/relationships" r:embed="R5b8a035eca0c4c30"/>
               <a:stretch>
                 <a:fillRect/>
               </a:stretch>
@@ -3322,11 +3322,11 @@
 </file>
 
 <file path=ppt/slides/udata/data.xml><?xml version="1.0" encoding="utf-8"?>
-<we:webextension xmlns:r="http://schemas.openxmlformats.org/officeDocument/2006/relationships" xmlns:we="http://schemas.microsoft.com/office/webextensions/webextension/2010/11" id="{7dc3bd83-358b-4002-b142-8ab4cc21447e}">
+<we:webextension xmlns:r="http://schemas.openxmlformats.org/officeDocument/2006/relationships" xmlns:we="http://schemas.microsoft.com/office/webextensions/webextension/2010/11" id="{21c80d30-cfb0-4678-80f9-759d81a4b089}">
   <we:reference id="695691ef-8f6e-4dc4-b6b9-c5a5f44499f7" version="1.0.0.0" store="developer" storeType="Registry"/>
   <we:alternateReferences/>
   <we:properties/>
   <we:bindings/>
-  <we:snapshot xmlns:r="http://schemas.openxmlformats.org/officeDocument/2006/relationships" r:embed="R151b7fc8d1f84e49"/>
+  <we:snapshot xmlns:r="http://schemas.openxmlformats.org/officeDocument/2006/relationships" r:embed="R5b8a035eca0c4c30"/>
 </we:webextension>
 </file>
</xml_diff>

<commit_message>
added header logo and title
</commit_message>
<xml_diff>
--- a/PowerPoll/PowerPoll/bin/Debug/Presentation1.pptx
+++ b/PowerPoll/PowerPoll/bin/Debug/Presentation1.pptx
@@ -2,10 +2,10 @@
 <file path=ppt/presentation.xml><?xml version="1.0" encoding="utf-8"?>
 <p:presentation xmlns:a="http://schemas.openxmlformats.org/drawingml/2006/main" xmlns:r="http://schemas.openxmlformats.org/officeDocument/2006/relationships" xmlns:p="http://schemas.openxmlformats.org/presentationml/2006/main" saveSubsetFonts="1">
   <p:sldMasterIdLst>
-    <p:sldMasterId id="2147483648" r:id="R1e5fbfd430564416"/>
+    <p:sldMasterId id="2147483648" r:id="R0ad7f427ff9647a3"/>
   </p:sldMasterIdLst>
   <p:sldIdLst>
-    <p:sldId id="256" r:id="R06232df0e57246e2"/>
+    <p:sldId id="256" r:id="R6456828b60294189"/>
   </p:sldIdLst>
   <p:sldSz cx="12192000" cy="6858000"/>
   <p:notesSz cx="6858000" cy="9144000"/>
@@ -2652,17 +2652,17 @@
   </p:cSld>
   <p:clrMap bg1="lt1" tx1="dk1" bg2="lt2" tx2="dk2" accent1="accent1" accent2="accent2" accent3="accent3" accent4="accent4" accent5="accent5" accent6="accent6" hlink="hlink" folHlink="folHlink"/>
   <p:sldLayoutIdLst>
-    <p:sldLayoutId id="2147483649" r:id="R34501fd4711b45f4"/>
-    <p:sldLayoutId id="2147483650" r:id="Rdfdd616a78784d1d"/>
-    <p:sldLayoutId id="2147483651" r:id="Rdb0576d6588c4aa8"/>
-    <p:sldLayoutId id="2147483652" r:id="Rfde7633abb894e1f"/>
-    <p:sldLayoutId id="2147483653" r:id="R2aee3ea8659e406e"/>
-    <p:sldLayoutId id="2147483654" r:id="R57b82678169f4b0f"/>
-    <p:sldLayoutId id="2147483655" r:id="R8180e12e252745a1"/>
-    <p:sldLayoutId id="2147483656" r:id="R35669f4acd9b4eef"/>
-    <p:sldLayoutId id="2147483657" r:id="Rb187621815b8455a"/>
-    <p:sldLayoutId id="2147483658" r:id="R34828379a9384035"/>
-    <p:sldLayoutId id="2147483659" r:id="R678995fa45194e0d"/>
+    <p:sldLayoutId id="2147483649" r:id="R80708854fd9a4cb5"/>
+    <p:sldLayoutId id="2147483650" r:id="Rf4d0a36c4b244f26"/>
+    <p:sldLayoutId id="2147483651" r:id="R81f0fe23f6ba4d7b"/>
+    <p:sldLayoutId id="2147483652" r:id="R189247d6a5654fdd"/>
+    <p:sldLayoutId id="2147483653" r:id="Re4c4dc0d9f3e44c8"/>
+    <p:sldLayoutId id="2147483654" r:id="Rd91f7875c4514b8d"/>
+    <p:sldLayoutId id="2147483655" r:id="R2d7b948170ae4aca"/>
+    <p:sldLayoutId id="2147483656" r:id="R7b3bdbec6d654511"/>
+    <p:sldLayoutId id="2147483657" r:id="Rdfe3772a10f846fe"/>
+    <p:sldLayoutId id="2147483658" r:id="Rb4cfabd9965c4651"/>
+    <p:sldLayoutId id="2147483659" r:id="Rf06c3905a91c455e"/>
   </p:sldLayoutIdLst>
   <p:txStyles>
     <p:titleStyle>
@@ -3279,7 +3279,7 @@
             </p:xfrm>
             <a:graphic>
               <a:graphicData uri="http://schemas.microsoft.com/office/webextensions/webextension/2010/11">
-                <we:webextensionref xmlns:we="http://schemas.microsoft.com/office/webextensions/webextension/2010/11" xmlns:r="http://schemas.openxmlformats.org/officeDocument/2006/relationships" r:id="R0829578d455e4e9e"/>
+                <we:webextensionref xmlns:we="http://schemas.microsoft.com/office/webextensions/webextension/2010/11" xmlns:r="http://schemas.openxmlformats.org/officeDocument/2006/relationships" r:id="Red8741fc15434781"/>
               </a:graphicData>
             </a:graphic>
           </p:graphicFrame>
@@ -3291,7 +3291,7 @@
               <p:cNvPicPr/>
             </p:nvPicPr>
             <p:blipFill>
-              <a:blip xmlns:r="http://schemas.openxmlformats.org/officeDocument/2006/relationships" r:embed="R5b8a035eca0c4c30"/>
+              <a:blip xmlns:r="http://schemas.openxmlformats.org/officeDocument/2006/relationships" r:embed="R7af72d8e780d44b1"/>
               <a:stretch>
                 <a:fillRect/>
               </a:stretch>
@@ -3322,11 +3322,11 @@
 </file>
 
 <file path=ppt/slides/udata/data.xml><?xml version="1.0" encoding="utf-8"?>
-<we:webextension xmlns:r="http://schemas.openxmlformats.org/officeDocument/2006/relationships" xmlns:we="http://schemas.microsoft.com/office/webextensions/webextension/2010/11" id="{21c80d30-cfb0-4678-80f9-759d81a4b089}">
+<we:webextension xmlns:r="http://schemas.openxmlformats.org/officeDocument/2006/relationships" xmlns:we="http://schemas.microsoft.com/office/webextensions/webextension/2010/11" id="{b7bb0736-ab70-4934-8ed2-a0863aa84c1b}">
   <we:reference id="695691ef-8f6e-4dc4-b6b9-c5a5f44499f7" version="1.0.0.0" store="developer" storeType="Registry"/>
   <we:alternateReferences/>
   <we:properties/>
   <we:bindings/>
-  <we:snapshot xmlns:r="http://schemas.openxmlformats.org/officeDocument/2006/relationships" r:embed="R5b8a035eca0c4c30"/>
+  <we:snapshot xmlns:r="http://schemas.openxmlformats.org/officeDocument/2006/relationships" r:embed="R7af72d8e780d44b1"/>
 </we:webextension>
 </file>
</xml_diff>

<commit_message>
added small visual changes
</commit_message>
<xml_diff>
--- a/PowerPoll/PowerPoll/bin/Debug/Presentation1.pptx
+++ b/PowerPoll/PowerPoll/bin/Debug/Presentation1.pptx
@@ -2,10 +2,10 @@
 <file path=ppt/presentation.xml><?xml version="1.0" encoding="utf-8"?>
 <p:presentation xmlns:a="http://schemas.openxmlformats.org/drawingml/2006/main" xmlns:r="http://schemas.openxmlformats.org/officeDocument/2006/relationships" xmlns:p="http://schemas.openxmlformats.org/presentationml/2006/main" saveSubsetFonts="1">
   <p:sldMasterIdLst>
-    <p:sldMasterId id="2147483648" r:id="R0ad7f427ff9647a3"/>
+    <p:sldMasterId id="2147483648" r:id="Rd38b4af0e791414a"/>
   </p:sldMasterIdLst>
   <p:sldIdLst>
-    <p:sldId id="256" r:id="R6456828b60294189"/>
+    <p:sldId id="256" r:id="Rb16338df304b40a8"/>
   </p:sldIdLst>
   <p:sldSz cx="12192000" cy="6858000"/>
   <p:notesSz cx="6858000" cy="9144000"/>
@@ -2652,17 +2652,17 @@
   </p:cSld>
   <p:clrMap bg1="lt1" tx1="dk1" bg2="lt2" tx2="dk2" accent1="accent1" accent2="accent2" accent3="accent3" accent4="accent4" accent5="accent5" accent6="accent6" hlink="hlink" folHlink="folHlink"/>
   <p:sldLayoutIdLst>
-    <p:sldLayoutId id="2147483649" r:id="R80708854fd9a4cb5"/>
-    <p:sldLayoutId id="2147483650" r:id="Rf4d0a36c4b244f26"/>
-    <p:sldLayoutId id="2147483651" r:id="R81f0fe23f6ba4d7b"/>
-    <p:sldLayoutId id="2147483652" r:id="R189247d6a5654fdd"/>
-    <p:sldLayoutId id="2147483653" r:id="Re4c4dc0d9f3e44c8"/>
-    <p:sldLayoutId id="2147483654" r:id="Rd91f7875c4514b8d"/>
-    <p:sldLayoutId id="2147483655" r:id="R2d7b948170ae4aca"/>
-    <p:sldLayoutId id="2147483656" r:id="R7b3bdbec6d654511"/>
-    <p:sldLayoutId id="2147483657" r:id="Rdfe3772a10f846fe"/>
-    <p:sldLayoutId id="2147483658" r:id="Rb4cfabd9965c4651"/>
-    <p:sldLayoutId id="2147483659" r:id="Rf06c3905a91c455e"/>
+    <p:sldLayoutId id="2147483649" r:id="R6a291a7c9db94b85"/>
+    <p:sldLayoutId id="2147483650" r:id="R791d998a128f4de2"/>
+    <p:sldLayoutId id="2147483651" r:id="R83c326b561734ecf"/>
+    <p:sldLayoutId id="2147483652" r:id="Rdab85da570504c0f"/>
+    <p:sldLayoutId id="2147483653" r:id="R0330206ceb524b0c"/>
+    <p:sldLayoutId id="2147483654" r:id="R7f6cccafe8904c6b"/>
+    <p:sldLayoutId id="2147483655" r:id="R28de055b3f7c4674"/>
+    <p:sldLayoutId id="2147483656" r:id="Rcee93117d7904afa"/>
+    <p:sldLayoutId id="2147483657" r:id="Ra53f22d601284c9a"/>
+    <p:sldLayoutId id="2147483658" r:id="R99cef4a2e2df4e4c"/>
+    <p:sldLayoutId id="2147483659" r:id="Rf1a12d9b1ecb4cf7"/>
   </p:sldLayoutIdLst>
   <p:txStyles>
     <p:titleStyle>
@@ -3279,7 +3279,7 @@
             </p:xfrm>
             <a:graphic>
               <a:graphicData uri="http://schemas.microsoft.com/office/webextensions/webextension/2010/11">
-                <we:webextensionref xmlns:we="http://schemas.microsoft.com/office/webextensions/webextension/2010/11" xmlns:r="http://schemas.openxmlformats.org/officeDocument/2006/relationships" r:id="Red8741fc15434781"/>
+                <we:webextensionref xmlns:we="http://schemas.microsoft.com/office/webextensions/webextension/2010/11" xmlns:r="http://schemas.openxmlformats.org/officeDocument/2006/relationships" r:id="R20def8695da2442a"/>
               </a:graphicData>
             </a:graphic>
           </p:graphicFrame>
@@ -3291,7 +3291,7 @@
               <p:cNvPicPr/>
             </p:nvPicPr>
             <p:blipFill>
-              <a:blip xmlns:r="http://schemas.openxmlformats.org/officeDocument/2006/relationships" r:embed="R7af72d8e780d44b1"/>
+              <a:blip xmlns:r="http://schemas.openxmlformats.org/officeDocument/2006/relationships" r:embed="R1a8e503e63b44fed"/>
               <a:stretch>
                 <a:fillRect/>
               </a:stretch>
@@ -3322,11 +3322,11 @@
 </file>
 
 <file path=ppt/slides/udata/data.xml><?xml version="1.0" encoding="utf-8"?>
-<we:webextension xmlns:r="http://schemas.openxmlformats.org/officeDocument/2006/relationships" xmlns:we="http://schemas.microsoft.com/office/webextensions/webextension/2010/11" id="{b7bb0736-ab70-4934-8ed2-a0863aa84c1b}">
+<we:webextension xmlns:r="http://schemas.openxmlformats.org/officeDocument/2006/relationships" xmlns:we="http://schemas.microsoft.com/office/webextensions/webextension/2010/11" id="{fb110507-842f-40e1-93dc-77bbc20b8a99}">
   <we:reference id="695691ef-8f6e-4dc4-b6b9-c5a5f44499f7" version="1.0.0.0" store="developer" storeType="Registry"/>
   <we:alternateReferences/>
   <we:properties/>
   <we:bindings/>
-  <we:snapshot xmlns:r="http://schemas.openxmlformats.org/officeDocument/2006/relationships" r:embed="R7af72d8e780d44b1"/>
+  <we:snapshot xmlns:r="http://schemas.openxmlformats.org/officeDocument/2006/relationships" r:embed="R1a8e503e63b44fed"/>
 </we:webextension>
 </file>
</xml_diff>

<commit_message>
fixed a bug in generating tables
</commit_message>
<xml_diff>
--- a/PowerPoll/PowerPoll/bin/Debug/Presentation1.pptx
+++ b/PowerPoll/PowerPoll/bin/Debug/Presentation1.pptx
@@ -2,10 +2,10 @@
 <file path=ppt/presentation.xml><?xml version="1.0" encoding="utf-8"?>
 <p:presentation xmlns:a="http://schemas.openxmlformats.org/drawingml/2006/main" xmlns:r="http://schemas.openxmlformats.org/officeDocument/2006/relationships" xmlns:p="http://schemas.openxmlformats.org/presentationml/2006/main" saveSubsetFonts="1">
   <p:sldMasterIdLst>
-    <p:sldMasterId id="2147483648" r:id="Rd38b4af0e791414a"/>
+    <p:sldMasterId id="2147483648" r:id="Rfb02d0bff9a2402b"/>
   </p:sldMasterIdLst>
   <p:sldIdLst>
-    <p:sldId id="256" r:id="Rb16338df304b40a8"/>
+    <p:sldId id="256" r:id="R4f8c2d036d9b44a5"/>
   </p:sldIdLst>
   <p:sldSz cx="12192000" cy="6858000"/>
   <p:notesSz cx="6858000" cy="9144000"/>
@@ -2652,17 +2652,17 @@
   </p:cSld>
   <p:clrMap bg1="lt1" tx1="dk1" bg2="lt2" tx2="dk2" accent1="accent1" accent2="accent2" accent3="accent3" accent4="accent4" accent5="accent5" accent6="accent6" hlink="hlink" folHlink="folHlink"/>
   <p:sldLayoutIdLst>
-    <p:sldLayoutId id="2147483649" r:id="R6a291a7c9db94b85"/>
-    <p:sldLayoutId id="2147483650" r:id="R791d998a128f4de2"/>
-    <p:sldLayoutId id="2147483651" r:id="R83c326b561734ecf"/>
-    <p:sldLayoutId id="2147483652" r:id="Rdab85da570504c0f"/>
-    <p:sldLayoutId id="2147483653" r:id="R0330206ceb524b0c"/>
-    <p:sldLayoutId id="2147483654" r:id="R7f6cccafe8904c6b"/>
-    <p:sldLayoutId id="2147483655" r:id="R28de055b3f7c4674"/>
-    <p:sldLayoutId id="2147483656" r:id="Rcee93117d7904afa"/>
-    <p:sldLayoutId id="2147483657" r:id="Ra53f22d601284c9a"/>
-    <p:sldLayoutId id="2147483658" r:id="R99cef4a2e2df4e4c"/>
-    <p:sldLayoutId id="2147483659" r:id="Rf1a12d9b1ecb4cf7"/>
+    <p:sldLayoutId id="2147483649" r:id="R76a39a2aaa1542cf"/>
+    <p:sldLayoutId id="2147483650" r:id="R38806800ec834465"/>
+    <p:sldLayoutId id="2147483651" r:id="R31fb3f38fc694ba4"/>
+    <p:sldLayoutId id="2147483652" r:id="R54c1b3f955924dec"/>
+    <p:sldLayoutId id="2147483653" r:id="R572ad6553756445a"/>
+    <p:sldLayoutId id="2147483654" r:id="R2a8ac732fe8b46bf"/>
+    <p:sldLayoutId id="2147483655" r:id="R79f9b0b5e6db4a78"/>
+    <p:sldLayoutId id="2147483656" r:id="R22b9592f816049b3"/>
+    <p:sldLayoutId id="2147483657" r:id="Rc2c83acde4b340e9"/>
+    <p:sldLayoutId id="2147483658" r:id="Ra2f563f59eab4258"/>
+    <p:sldLayoutId id="2147483659" r:id="R40805ae5e458486d"/>
   </p:sldLayoutIdLst>
   <p:txStyles>
     <p:titleStyle>
@@ -3279,7 +3279,7 @@
             </p:xfrm>
             <a:graphic>
               <a:graphicData uri="http://schemas.microsoft.com/office/webextensions/webextension/2010/11">
-                <we:webextensionref xmlns:we="http://schemas.microsoft.com/office/webextensions/webextension/2010/11" xmlns:r="http://schemas.openxmlformats.org/officeDocument/2006/relationships" r:id="R20def8695da2442a"/>
+                <we:webextensionref xmlns:we="http://schemas.microsoft.com/office/webextensions/webextension/2010/11" xmlns:r="http://schemas.openxmlformats.org/officeDocument/2006/relationships" r:id="Rdb80a8a3433f4bf4"/>
               </a:graphicData>
             </a:graphic>
           </p:graphicFrame>
@@ -3291,7 +3291,7 @@
               <p:cNvPicPr/>
             </p:nvPicPr>
             <p:blipFill>
-              <a:blip xmlns:r="http://schemas.openxmlformats.org/officeDocument/2006/relationships" r:embed="R1a8e503e63b44fed"/>
+              <a:blip xmlns:r="http://schemas.openxmlformats.org/officeDocument/2006/relationships" r:embed="Rb5a5f20d06ec4c5d"/>
               <a:stretch>
                 <a:fillRect/>
               </a:stretch>
@@ -3322,11 +3322,11 @@
 </file>
 
 <file path=ppt/slides/udata/data.xml><?xml version="1.0" encoding="utf-8"?>
-<we:webextension xmlns:r="http://schemas.openxmlformats.org/officeDocument/2006/relationships" xmlns:we="http://schemas.microsoft.com/office/webextensions/webextension/2010/11" id="{fb110507-842f-40e1-93dc-77bbc20b8a99}">
+<we:webextension xmlns:r="http://schemas.openxmlformats.org/officeDocument/2006/relationships" xmlns:we="http://schemas.microsoft.com/office/webextensions/webextension/2010/11" id="{aef3a2f1-0b90-49c5-a190-44017f11c9eb}">
   <we:reference id="695691ef-8f6e-4dc4-b6b9-c5a5f44499f7" version="1.0.0.0" store="developer" storeType="Registry"/>
   <we:alternateReferences/>
   <we:properties/>
   <we:bindings/>
-  <we:snapshot xmlns:r="http://schemas.openxmlformats.org/officeDocument/2006/relationships" r:embed="R1a8e503e63b44fed"/>
+  <we:snapshot xmlns:r="http://schemas.openxmlformats.org/officeDocument/2006/relationships" r:embed="Rb5a5f20d06ec4c5d"/>
 </we:webextension>
 </file>
</xml_diff>

<commit_message>
Removed 'Create Poll' button, removed the graph choice option, Added functioning buttons for bar and pie chart
</commit_message>
<xml_diff>
--- a/PowerPoll/PowerPoll/bin/Debug/Presentation1.pptx
+++ b/PowerPoll/PowerPoll/bin/Debug/Presentation1.pptx
@@ -2,10 +2,10 @@
 <file path=ppt/presentation.xml><?xml version="1.0" encoding="utf-8"?>
 <p:presentation xmlns:a="http://schemas.openxmlformats.org/drawingml/2006/main" xmlns:r="http://schemas.openxmlformats.org/officeDocument/2006/relationships" xmlns:p="http://schemas.openxmlformats.org/presentationml/2006/main" saveSubsetFonts="1">
   <p:sldMasterIdLst>
-    <p:sldMasterId id="2147483648" r:id="Rfb02d0bff9a2402b"/>
+    <p:sldMasterId id="2147483648" r:id="Rf55de7e1f28c4978"/>
   </p:sldMasterIdLst>
   <p:sldIdLst>
-    <p:sldId id="256" r:id="R4f8c2d036d9b44a5"/>
+    <p:sldId id="256" r:id="Re03462fcf8c4474a"/>
   </p:sldIdLst>
   <p:sldSz cx="12192000" cy="6858000"/>
   <p:notesSz cx="6858000" cy="9144000"/>
@@ -2652,17 +2652,17 @@
   </p:cSld>
   <p:clrMap bg1="lt1" tx1="dk1" bg2="lt2" tx2="dk2" accent1="accent1" accent2="accent2" accent3="accent3" accent4="accent4" accent5="accent5" accent6="accent6" hlink="hlink" folHlink="folHlink"/>
   <p:sldLayoutIdLst>
-    <p:sldLayoutId id="2147483649" r:id="R76a39a2aaa1542cf"/>
-    <p:sldLayoutId id="2147483650" r:id="R38806800ec834465"/>
-    <p:sldLayoutId id="2147483651" r:id="R31fb3f38fc694ba4"/>
-    <p:sldLayoutId id="2147483652" r:id="R54c1b3f955924dec"/>
-    <p:sldLayoutId id="2147483653" r:id="R572ad6553756445a"/>
-    <p:sldLayoutId id="2147483654" r:id="R2a8ac732fe8b46bf"/>
-    <p:sldLayoutId id="2147483655" r:id="R79f9b0b5e6db4a78"/>
-    <p:sldLayoutId id="2147483656" r:id="R22b9592f816049b3"/>
-    <p:sldLayoutId id="2147483657" r:id="Rc2c83acde4b340e9"/>
-    <p:sldLayoutId id="2147483658" r:id="Ra2f563f59eab4258"/>
-    <p:sldLayoutId id="2147483659" r:id="R40805ae5e458486d"/>
+    <p:sldLayoutId id="2147483649" r:id="R0093f17cb71f4ab7"/>
+    <p:sldLayoutId id="2147483650" r:id="Rffd0fef6e4674aa6"/>
+    <p:sldLayoutId id="2147483651" r:id="R247e0e42f8c54253"/>
+    <p:sldLayoutId id="2147483652" r:id="Rd993ce3f844947b1"/>
+    <p:sldLayoutId id="2147483653" r:id="Rf13447ac71c6408c"/>
+    <p:sldLayoutId id="2147483654" r:id="R17ccb25111ca4c0e"/>
+    <p:sldLayoutId id="2147483655" r:id="R741f6a984d794e3e"/>
+    <p:sldLayoutId id="2147483656" r:id="R0773455262f54204"/>
+    <p:sldLayoutId id="2147483657" r:id="R353ee330095f4557"/>
+    <p:sldLayoutId id="2147483658" r:id="Re96a21813da14a34"/>
+    <p:sldLayoutId id="2147483659" r:id="R3efeee456d8f4625"/>
   </p:sldLayoutIdLst>
   <p:txStyles>
     <p:titleStyle>
@@ -3279,7 +3279,7 @@
             </p:xfrm>
             <a:graphic>
               <a:graphicData uri="http://schemas.microsoft.com/office/webextensions/webextension/2010/11">
-                <we:webextensionref xmlns:we="http://schemas.microsoft.com/office/webextensions/webextension/2010/11" xmlns:r="http://schemas.openxmlformats.org/officeDocument/2006/relationships" r:id="Rdb80a8a3433f4bf4"/>
+                <we:webextensionref xmlns:we="http://schemas.microsoft.com/office/webextensions/webextension/2010/11" xmlns:r="http://schemas.openxmlformats.org/officeDocument/2006/relationships" r:id="R5fc6b2c5724448c6"/>
               </a:graphicData>
             </a:graphic>
           </p:graphicFrame>
@@ -3291,7 +3291,7 @@
               <p:cNvPicPr/>
             </p:nvPicPr>
             <p:blipFill>
-              <a:blip xmlns:r="http://schemas.openxmlformats.org/officeDocument/2006/relationships" r:embed="Rb5a5f20d06ec4c5d"/>
+              <a:blip xmlns:r="http://schemas.openxmlformats.org/officeDocument/2006/relationships" r:embed="R31eaf0bb8ee24ea5"/>
               <a:stretch>
                 <a:fillRect/>
               </a:stretch>
@@ -3322,11 +3322,11 @@
 </file>
 
 <file path=ppt/slides/udata/data.xml><?xml version="1.0" encoding="utf-8"?>
-<we:webextension xmlns:r="http://schemas.openxmlformats.org/officeDocument/2006/relationships" xmlns:we="http://schemas.microsoft.com/office/webextensions/webextension/2010/11" id="{aef3a2f1-0b90-49c5-a190-44017f11c9eb}">
+<we:webextension xmlns:r="http://schemas.openxmlformats.org/officeDocument/2006/relationships" xmlns:we="http://schemas.microsoft.com/office/webextensions/webextension/2010/11" id="{839e7278-d00a-45fb-9933-830e53375a76}">
   <we:reference id="695691ef-8f6e-4dc4-b6b9-c5a5f44499f7" version="1.0.0.0" store="developer" storeType="Registry"/>
   <we:alternateReferences/>
   <we:properties/>
   <we:bindings/>
-  <we:snapshot xmlns:r="http://schemas.openxmlformats.org/officeDocument/2006/relationships" r:embed="Rb5a5f20d06ec4c5d"/>
+  <we:snapshot xmlns:r="http://schemas.openxmlformats.org/officeDocument/2006/relationships" r:embed="R31eaf0bb8ee24ea5"/>
 </we:webextension>
 </file>
</xml_diff>

<commit_message>
added Pie.html and Pie.css with working pie charts. Made backend case insensitive
</commit_message>
<xml_diff>
--- a/PowerPoll/PowerPoll/bin/Debug/Presentation1.pptx
+++ b/PowerPoll/PowerPoll/bin/Debug/Presentation1.pptx
@@ -2,10 +2,10 @@
 <file path=ppt/presentation.xml><?xml version="1.0" encoding="utf-8"?>
 <p:presentation xmlns:a="http://schemas.openxmlformats.org/drawingml/2006/main" xmlns:r="http://schemas.openxmlformats.org/officeDocument/2006/relationships" xmlns:p="http://schemas.openxmlformats.org/presentationml/2006/main" saveSubsetFonts="1">
   <p:sldMasterIdLst>
-    <p:sldMasterId id="2147483648" r:id="Rf55de7e1f28c4978"/>
+    <p:sldMasterId id="2147483648" r:id="R0d7475039003401d"/>
   </p:sldMasterIdLst>
   <p:sldIdLst>
-    <p:sldId id="256" r:id="Re03462fcf8c4474a"/>
+    <p:sldId id="256" r:id="R6dfb9204737549ed"/>
   </p:sldIdLst>
   <p:sldSz cx="12192000" cy="6858000"/>
   <p:notesSz cx="6858000" cy="9144000"/>
@@ -2652,17 +2652,17 @@
   </p:cSld>
   <p:clrMap bg1="lt1" tx1="dk1" bg2="lt2" tx2="dk2" accent1="accent1" accent2="accent2" accent3="accent3" accent4="accent4" accent5="accent5" accent6="accent6" hlink="hlink" folHlink="folHlink"/>
   <p:sldLayoutIdLst>
-    <p:sldLayoutId id="2147483649" r:id="R0093f17cb71f4ab7"/>
-    <p:sldLayoutId id="2147483650" r:id="Rffd0fef6e4674aa6"/>
-    <p:sldLayoutId id="2147483651" r:id="R247e0e42f8c54253"/>
-    <p:sldLayoutId id="2147483652" r:id="Rd993ce3f844947b1"/>
-    <p:sldLayoutId id="2147483653" r:id="Rf13447ac71c6408c"/>
-    <p:sldLayoutId id="2147483654" r:id="R17ccb25111ca4c0e"/>
-    <p:sldLayoutId id="2147483655" r:id="R741f6a984d794e3e"/>
-    <p:sldLayoutId id="2147483656" r:id="R0773455262f54204"/>
-    <p:sldLayoutId id="2147483657" r:id="R353ee330095f4557"/>
-    <p:sldLayoutId id="2147483658" r:id="Re96a21813da14a34"/>
-    <p:sldLayoutId id="2147483659" r:id="R3efeee456d8f4625"/>
+    <p:sldLayoutId id="2147483649" r:id="R9bd7b901ea2b49d5"/>
+    <p:sldLayoutId id="2147483650" r:id="R6b9a56fe1fc94f27"/>
+    <p:sldLayoutId id="2147483651" r:id="Rcb92e03896b24537"/>
+    <p:sldLayoutId id="2147483652" r:id="R9925c3f1f3234af3"/>
+    <p:sldLayoutId id="2147483653" r:id="Rf5808d1b46d24d9a"/>
+    <p:sldLayoutId id="2147483654" r:id="Rf207ad13f6874d80"/>
+    <p:sldLayoutId id="2147483655" r:id="Rd6b5f347e2084e96"/>
+    <p:sldLayoutId id="2147483656" r:id="R23332f7559dd4e32"/>
+    <p:sldLayoutId id="2147483657" r:id="Rd63e97d226264833"/>
+    <p:sldLayoutId id="2147483658" r:id="Rfb46a967b5b6458a"/>
+    <p:sldLayoutId id="2147483659" r:id="R72c9f2746a384ebe"/>
   </p:sldLayoutIdLst>
   <p:txStyles>
     <p:titleStyle>
@@ -3279,7 +3279,7 @@
             </p:xfrm>
             <a:graphic>
               <a:graphicData uri="http://schemas.microsoft.com/office/webextensions/webextension/2010/11">
-                <we:webextensionref xmlns:we="http://schemas.microsoft.com/office/webextensions/webextension/2010/11" xmlns:r="http://schemas.openxmlformats.org/officeDocument/2006/relationships" r:id="R5fc6b2c5724448c6"/>
+                <we:webextensionref xmlns:we="http://schemas.microsoft.com/office/webextensions/webextension/2010/11" xmlns:r="http://schemas.openxmlformats.org/officeDocument/2006/relationships" r:id="Rcb630a9a878e423d"/>
               </a:graphicData>
             </a:graphic>
           </p:graphicFrame>
@@ -3291,7 +3291,7 @@
               <p:cNvPicPr/>
             </p:nvPicPr>
             <p:blipFill>
-              <a:blip xmlns:r="http://schemas.openxmlformats.org/officeDocument/2006/relationships" r:embed="R31eaf0bb8ee24ea5"/>
+              <a:blip xmlns:r="http://schemas.openxmlformats.org/officeDocument/2006/relationships" r:embed="R1e436540e1e34e49"/>
               <a:stretch>
                 <a:fillRect/>
               </a:stretch>
@@ -3322,11 +3322,11 @@
 </file>
 
 <file path=ppt/slides/udata/data.xml><?xml version="1.0" encoding="utf-8"?>
-<we:webextension xmlns:r="http://schemas.openxmlformats.org/officeDocument/2006/relationships" xmlns:we="http://schemas.microsoft.com/office/webextensions/webextension/2010/11" id="{839e7278-d00a-45fb-9933-830e53375a76}">
+<we:webextension xmlns:r="http://schemas.openxmlformats.org/officeDocument/2006/relationships" xmlns:we="http://schemas.microsoft.com/office/webextensions/webextension/2010/11" id="{7e2ea991-9603-4ca4-bdd0-b46cfbc30157}">
   <we:reference id="695691ef-8f6e-4dc4-b6b9-c5a5f44499f7" version="1.0.0.0" store="developer" storeType="Registry"/>
   <we:alternateReferences/>
   <we:properties/>
   <we:bindings/>
-  <we:snapshot xmlns:r="http://schemas.openxmlformats.org/officeDocument/2006/relationships" r:embed="R31eaf0bb8ee24ea5"/>
+  <we:snapshot xmlns:r="http://schemas.openxmlformats.org/officeDocument/2006/relationships" r:embed="R1e436540e1e34e49"/>
 </we:webextension>
 </file>
</xml_diff>

<commit_message>
changed the colours of the pie graph
</commit_message>
<xml_diff>
--- a/PowerPoll/PowerPoll/bin/Debug/Presentation1.pptx
+++ b/PowerPoll/PowerPoll/bin/Debug/Presentation1.pptx
@@ -2,10 +2,10 @@
 <file path=ppt/presentation.xml><?xml version="1.0" encoding="utf-8"?>
 <p:presentation xmlns:a="http://schemas.openxmlformats.org/drawingml/2006/main" xmlns:r="http://schemas.openxmlformats.org/officeDocument/2006/relationships" xmlns:p="http://schemas.openxmlformats.org/presentationml/2006/main" saveSubsetFonts="1">
   <p:sldMasterIdLst>
-    <p:sldMasterId id="2147483648" r:id="R0d7475039003401d"/>
+    <p:sldMasterId id="2147483648" r:id="R0abae5be86d5497a"/>
   </p:sldMasterIdLst>
   <p:sldIdLst>
-    <p:sldId id="256" r:id="R6dfb9204737549ed"/>
+    <p:sldId id="256" r:id="R952b5ed0cee94797"/>
   </p:sldIdLst>
   <p:sldSz cx="12192000" cy="6858000"/>
   <p:notesSz cx="6858000" cy="9144000"/>
@@ -2652,17 +2652,17 @@
   </p:cSld>
   <p:clrMap bg1="lt1" tx1="dk1" bg2="lt2" tx2="dk2" accent1="accent1" accent2="accent2" accent3="accent3" accent4="accent4" accent5="accent5" accent6="accent6" hlink="hlink" folHlink="folHlink"/>
   <p:sldLayoutIdLst>
-    <p:sldLayoutId id="2147483649" r:id="R9bd7b901ea2b49d5"/>
-    <p:sldLayoutId id="2147483650" r:id="R6b9a56fe1fc94f27"/>
-    <p:sldLayoutId id="2147483651" r:id="Rcb92e03896b24537"/>
-    <p:sldLayoutId id="2147483652" r:id="R9925c3f1f3234af3"/>
-    <p:sldLayoutId id="2147483653" r:id="Rf5808d1b46d24d9a"/>
-    <p:sldLayoutId id="2147483654" r:id="Rf207ad13f6874d80"/>
-    <p:sldLayoutId id="2147483655" r:id="Rd6b5f347e2084e96"/>
-    <p:sldLayoutId id="2147483656" r:id="R23332f7559dd4e32"/>
-    <p:sldLayoutId id="2147483657" r:id="Rd63e97d226264833"/>
-    <p:sldLayoutId id="2147483658" r:id="Rfb46a967b5b6458a"/>
-    <p:sldLayoutId id="2147483659" r:id="R72c9f2746a384ebe"/>
+    <p:sldLayoutId id="2147483649" r:id="Rdbd4bc70a13a43b4"/>
+    <p:sldLayoutId id="2147483650" r:id="R6e17529e5bb641a7"/>
+    <p:sldLayoutId id="2147483651" r:id="Rfba1f41744704417"/>
+    <p:sldLayoutId id="2147483652" r:id="Ra86d95724be54b8f"/>
+    <p:sldLayoutId id="2147483653" r:id="R00c9cc6ca665430c"/>
+    <p:sldLayoutId id="2147483654" r:id="Rd810e655511f429c"/>
+    <p:sldLayoutId id="2147483655" r:id="R4860e0e5493746af"/>
+    <p:sldLayoutId id="2147483656" r:id="R7ac26fb5d78b4a96"/>
+    <p:sldLayoutId id="2147483657" r:id="R2053b7159cdb4c05"/>
+    <p:sldLayoutId id="2147483658" r:id="R57c3e187a38b4d5a"/>
+    <p:sldLayoutId id="2147483659" r:id="R3868b00ee96b459c"/>
   </p:sldLayoutIdLst>
   <p:txStyles>
     <p:titleStyle>
@@ -3279,7 +3279,7 @@
             </p:xfrm>
             <a:graphic>
               <a:graphicData uri="http://schemas.microsoft.com/office/webextensions/webextension/2010/11">
-                <we:webextensionref xmlns:we="http://schemas.microsoft.com/office/webextensions/webextension/2010/11" xmlns:r="http://schemas.openxmlformats.org/officeDocument/2006/relationships" r:id="Rcb630a9a878e423d"/>
+                <we:webextensionref xmlns:we="http://schemas.microsoft.com/office/webextensions/webextension/2010/11" xmlns:r="http://schemas.openxmlformats.org/officeDocument/2006/relationships" r:id="R1b3dc85351394964"/>
               </a:graphicData>
             </a:graphic>
           </p:graphicFrame>
@@ -3291,7 +3291,7 @@
               <p:cNvPicPr/>
             </p:nvPicPr>
             <p:blipFill>
-              <a:blip xmlns:r="http://schemas.openxmlformats.org/officeDocument/2006/relationships" r:embed="R1e436540e1e34e49"/>
+              <a:blip xmlns:r="http://schemas.openxmlformats.org/officeDocument/2006/relationships" r:embed="R5d13ffe4d38c4ce5"/>
               <a:stretch>
                 <a:fillRect/>
               </a:stretch>
@@ -3322,11 +3322,11 @@
 </file>
 
 <file path=ppt/slides/udata/data.xml><?xml version="1.0" encoding="utf-8"?>
-<we:webextension xmlns:r="http://schemas.openxmlformats.org/officeDocument/2006/relationships" xmlns:we="http://schemas.microsoft.com/office/webextensions/webextension/2010/11" id="{7e2ea991-9603-4ca4-bdd0-b46cfbc30157}">
+<we:webextension xmlns:r="http://schemas.openxmlformats.org/officeDocument/2006/relationships" xmlns:we="http://schemas.microsoft.com/office/webextensions/webextension/2010/11" id="{21cc42f3-ebf5-48cb-a64d-ab12e7437263}">
   <we:reference id="695691ef-8f6e-4dc4-b6b9-c5a5f44499f7" version="1.0.0.0" store="developer" storeType="Registry"/>
   <we:alternateReferences/>
   <we:properties/>
   <we:bindings/>
-  <we:snapshot xmlns:r="http://schemas.openxmlformats.org/officeDocument/2006/relationships" r:embed="R1e436540e1e34e49"/>
+  <we:snapshot xmlns:r="http://schemas.openxmlformats.org/officeDocument/2006/relationships" r:embed="R5d13ffe4d38c4ce5"/>
 </we:webextension>
 </file>
</xml_diff>

<commit_message>
Hashtag is now displayed on the charts, An additional button is added for removing keyword fields(needs to be completed), The '+Keyword' button is now not removed when the keyword fields go over the count of 6
</commit_message>
<xml_diff>
--- a/PowerPoll/PowerPoll/bin/Debug/Presentation1.pptx
+++ b/PowerPoll/PowerPoll/bin/Debug/Presentation1.pptx
@@ -2,10 +2,10 @@
 <file path=ppt/presentation.xml><?xml version="1.0" encoding="utf-8"?>
 <p:presentation xmlns:a="http://schemas.openxmlformats.org/drawingml/2006/main" xmlns:r="http://schemas.openxmlformats.org/officeDocument/2006/relationships" xmlns:p="http://schemas.openxmlformats.org/presentationml/2006/main" saveSubsetFonts="1">
   <p:sldMasterIdLst>
-    <p:sldMasterId id="2147483648" r:id="Ra731bb85eddc42ba"/>
+    <p:sldMasterId id="2147483648" r:id="Rc58d34e0b48d41d3"/>
   </p:sldMasterIdLst>
   <p:sldIdLst>
-    <p:sldId id="256" r:id="Rf302fa515d3348fb"/>
+    <p:sldId id="256" r:id="R97ddb613c08a4b67"/>
   </p:sldIdLst>
   <p:sldSz cx="12192000" cy="6858000"/>
   <p:notesSz cx="6858000" cy="9144000"/>
@@ -2652,17 +2652,17 @@
   </p:cSld>
   <p:clrMap bg1="lt1" tx1="dk1" bg2="lt2" tx2="dk2" accent1="accent1" accent2="accent2" accent3="accent3" accent4="accent4" accent5="accent5" accent6="accent6" hlink="hlink" folHlink="folHlink"/>
   <p:sldLayoutIdLst>
-    <p:sldLayoutId id="2147483649" r:id="Re1d2e98985814a54"/>
-    <p:sldLayoutId id="2147483650" r:id="Rb99b0e8cf7b746da"/>
-    <p:sldLayoutId id="2147483651" r:id="Rb94782a30a044059"/>
-    <p:sldLayoutId id="2147483652" r:id="Rd71ce50cb73a41fb"/>
-    <p:sldLayoutId id="2147483653" r:id="R61e7d8a66f2943e0"/>
-    <p:sldLayoutId id="2147483654" r:id="Re8e08f1194054768"/>
-    <p:sldLayoutId id="2147483655" r:id="R4da1d89b811d4267"/>
-    <p:sldLayoutId id="2147483656" r:id="R38a5da60aa114e01"/>
-    <p:sldLayoutId id="2147483657" r:id="R345040168123452d"/>
-    <p:sldLayoutId id="2147483658" r:id="Rca3d4401165f4f5f"/>
-    <p:sldLayoutId id="2147483659" r:id="Rccff8de1113b4887"/>
+    <p:sldLayoutId id="2147483649" r:id="R2cb4cae0999b4117"/>
+    <p:sldLayoutId id="2147483650" r:id="R71071e9fe8e940a6"/>
+    <p:sldLayoutId id="2147483651" r:id="R2c7957becd5245b3"/>
+    <p:sldLayoutId id="2147483652" r:id="Rd9a812bba50442e5"/>
+    <p:sldLayoutId id="2147483653" r:id="R69094e3590f54e23"/>
+    <p:sldLayoutId id="2147483654" r:id="R5cdbc78bbca043f0"/>
+    <p:sldLayoutId id="2147483655" r:id="R1ae382714abd40e8"/>
+    <p:sldLayoutId id="2147483656" r:id="Ra61370f5eb204545"/>
+    <p:sldLayoutId id="2147483657" r:id="R65801dbdcf8a4556"/>
+    <p:sldLayoutId id="2147483658" r:id="R2ce5af44daf24150"/>
+    <p:sldLayoutId id="2147483659" r:id="R1d8b8a4f0afe4e67"/>
   </p:sldLayoutIdLst>
   <p:txStyles>
     <p:titleStyle>
@@ -3279,7 +3279,7 @@
             </p:xfrm>
             <a:graphic>
               <a:graphicData uri="http://schemas.microsoft.com/office/webextensions/webextension/2010/11">
-                <we:webextensionref xmlns:we="http://schemas.microsoft.com/office/webextensions/webextension/2010/11" xmlns:r="http://schemas.openxmlformats.org/officeDocument/2006/relationships" r:id="R13e84812b44d4d14"/>
+                <we:webextensionref xmlns:we="http://schemas.microsoft.com/office/webextensions/webextension/2010/11" xmlns:r="http://schemas.openxmlformats.org/officeDocument/2006/relationships" r:id="R82f4514125024aeb"/>
               </a:graphicData>
             </a:graphic>
           </p:graphicFrame>
@@ -3291,7 +3291,7 @@
               <p:cNvPicPr/>
             </p:nvPicPr>
             <p:blipFill>
-              <a:blip xmlns:r="http://schemas.openxmlformats.org/officeDocument/2006/relationships" r:embed="Rb331bfccdfe04cc5"/>
+              <a:blip xmlns:r="http://schemas.openxmlformats.org/officeDocument/2006/relationships" r:embed="R85c560dad7124084"/>
               <a:stretch>
                 <a:fillRect/>
               </a:stretch>
@@ -3322,11 +3322,11 @@
 </file>
 
 <file path=ppt/slides/udata/data.xml><?xml version="1.0" encoding="utf-8"?>
-<we:webextension xmlns:r="http://schemas.openxmlformats.org/officeDocument/2006/relationships" xmlns:we="http://schemas.microsoft.com/office/webextensions/webextension/2010/11" id="{be83c9a9-c4c8-4be3-9464-f5324e911b08}">
+<we:webextension xmlns:r="http://schemas.openxmlformats.org/officeDocument/2006/relationships" xmlns:we="http://schemas.microsoft.com/office/webextensions/webextension/2010/11" id="{fb7077eb-5ab9-43c2-a569-bd496edf3aca}">
   <we:reference id="695691ef-8f6e-4dc4-b6b9-c5a5f44499f7" version="1.0.0.0" store="developer" storeType="Registry"/>
   <we:alternateReferences/>
   <we:properties/>
   <we:bindings/>
-  <we:snapshot xmlns:r="http://schemas.openxmlformats.org/officeDocument/2006/relationships" r:embed="Rb331bfccdfe04cc5"/>
+  <we:snapshot xmlns:r="http://schemas.openxmlformats.org/officeDocument/2006/relationships" r:embed="R85c560dad7124084"/>
 </we:webextension>
 </file>
</xml_diff>

<commit_message>
Changed the colors of the pie chart
</commit_message>
<xml_diff>
--- a/PowerPoll/PowerPoll/bin/Debug/Presentation1.pptx
+++ b/PowerPoll/PowerPoll/bin/Debug/Presentation1.pptx
@@ -2,10 +2,10 @@
 <file path=ppt/presentation.xml><?xml version="1.0" encoding="utf-8"?>
 <p:presentation xmlns:a="http://schemas.openxmlformats.org/drawingml/2006/main" xmlns:r="http://schemas.openxmlformats.org/officeDocument/2006/relationships" xmlns:p="http://schemas.openxmlformats.org/presentationml/2006/main" saveSubsetFonts="1">
   <p:sldMasterIdLst>
-    <p:sldMasterId id="2147483648" r:id="Rc58d34e0b48d41d3"/>
+    <p:sldMasterId id="2147483648" r:id="Re1639c6bb4b64720"/>
   </p:sldMasterIdLst>
   <p:sldIdLst>
-    <p:sldId id="256" r:id="R97ddb613c08a4b67"/>
+    <p:sldId id="256" r:id="Rfe366568af7b4224"/>
   </p:sldIdLst>
   <p:sldSz cx="12192000" cy="6858000"/>
   <p:notesSz cx="6858000" cy="9144000"/>
@@ -2652,17 +2652,17 @@
   </p:cSld>
   <p:clrMap bg1="lt1" tx1="dk1" bg2="lt2" tx2="dk2" accent1="accent1" accent2="accent2" accent3="accent3" accent4="accent4" accent5="accent5" accent6="accent6" hlink="hlink" folHlink="folHlink"/>
   <p:sldLayoutIdLst>
-    <p:sldLayoutId id="2147483649" r:id="R2cb4cae0999b4117"/>
-    <p:sldLayoutId id="2147483650" r:id="R71071e9fe8e940a6"/>
-    <p:sldLayoutId id="2147483651" r:id="R2c7957becd5245b3"/>
-    <p:sldLayoutId id="2147483652" r:id="Rd9a812bba50442e5"/>
-    <p:sldLayoutId id="2147483653" r:id="R69094e3590f54e23"/>
-    <p:sldLayoutId id="2147483654" r:id="R5cdbc78bbca043f0"/>
-    <p:sldLayoutId id="2147483655" r:id="R1ae382714abd40e8"/>
-    <p:sldLayoutId id="2147483656" r:id="Ra61370f5eb204545"/>
-    <p:sldLayoutId id="2147483657" r:id="R65801dbdcf8a4556"/>
-    <p:sldLayoutId id="2147483658" r:id="R2ce5af44daf24150"/>
-    <p:sldLayoutId id="2147483659" r:id="R1d8b8a4f0afe4e67"/>
+    <p:sldLayoutId id="2147483649" r:id="Rf9a33f2ed0544f30"/>
+    <p:sldLayoutId id="2147483650" r:id="R0e07c156e7b14069"/>
+    <p:sldLayoutId id="2147483651" r:id="R75c154f485664c9a"/>
+    <p:sldLayoutId id="2147483652" r:id="R9512873bef734da5"/>
+    <p:sldLayoutId id="2147483653" r:id="R9cd5e0026f844f40"/>
+    <p:sldLayoutId id="2147483654" r:id="R9a12ee8f2c61458d"/>
+    <p:sldLayoutId id="2147483655" r:id="Rdb8047e9fa124704"/>
+    <p:sldLayoutId id="2147483656" r:id="R70afd1a86cf24568"/>
+    <p:sldLayoutId id="2147483657" r:id="R4c2e5dbea6e1404e"/>
+    <p:sldLayoutId id="2147483658" r:id="R2d327c925acb4a7e"/>
+    <p:sldLayoutId id="2147483659" r:id="R5942a453d9634429"/>
   </p:sldLayoutIdLst>
   <p:txStyles>
     <p:titleStyle>
@@ -3279,7 +3279,7 @@
             </p:xfrm>
             <a:graphic>
               <a:graphicData uri="http://schemas.microsoft.com/office/webextensions/webextension/2010/11">
-                <we:webextensionref xmlns:we="http://schemas.microsoft.com/office/webextensions/webextension/2010/11" xmlns:r="http://schemas.openxmlformats.org/officeDocument/2006/relationships" r:id="R82f4514125024aeb"/>
+                <we:webextensionref xmlns:we="http://schemas.microsoft.com/office/webextensions/webextension/2010/11" xmlns:r="http://schemas.openxmlformats.org/officeDocument/2006/relationships" r:id="R813e728f3e5b4ba5"/>
               </a:graphicData>
             </a:graphic>
           </p:graphicFrame>
@@ -3291,7 +3291,7 @@
               <p:cNvPicPr/>
             </p:nvPicPr>
             <p:blipFill>
-              <a:blip xmlns:r="http://schemas.openxmlformats.org/officeDocument/2006/relationships" r:embed="R85c560dad7124084"/>
+              <a:blip xmlns:r="http://schemas.openxmlformats.org/officeDocument/2006/relationships" r:embed="Rd46d9b4e2ab147e9"/>
               <a:stretch>
                 <a:fillRect/>
               </a:stretch>
@@ -3322,11 +3322,11 @@
 </file>
 
 <file path=ppt/slides/udata/data.xml><?xml version="1.0" encoding="utf-8"?>
-<we:webextension xmlns:r="http://schemas.openxmlformats.org/officeDocument/2006/relationships" xmlns:we="http://schemas.microsoft.com/office/webextensions/webextension/2010/11" id="{fb7077eb-5ab9-43c2-a569-bd496edf3aca}">
+<we:webextension xmlns:r="http://schemas.openxmlformats.org/officeDocument/2006/relationships" xmlns:we="http://schemas.microsoft.com/office/webextensions/webextension/2010/11" id="{2e4f462f-1cc3-4b7f-895a-8e60ef96a2a2}">
   <we:reference id="695691ef-8f6e-4dc4-b6b9-c5a5f44499f7" version="1.0.0.0" store="developer" storeType="Registry"/>
   <we:alternateReferences/>
   <we:properties/>
   <we:bindings/>
-  <we:snapshot xmlns:r="http://schemas.openxmlformats.org/officeDocument/2006/relationships" r:embed="R85c560dad7124084"/>
+  <we:snapshot xmlns:r="http://schemas.openxmlformats.org/officeDocument/2006/relationships" r:embed="Rd46d9b4e2ab147e9"/>
 </we:webextension>
 </file>
</xml_diff>

<commit_message>
remove keyword button gets rid of text as well as input box
</commit_message>
<xml_diff>
--- a/PowerPoll/PowerPoll/bin/Debug/Presentation1.pptx
+++ b/PowerPoll/PowerPoll/bin/Debug/Presentation1.pptx
@@ -2,10 +2,10 @@
 <file path=ppt/presentation.xml><?xml version="1.0" encoding="utf-8"?>
 <p:presentation xmlns:a="http://schemas.openxmlformats.org/drawingml/2006/main" xmlns:r="http://schemas.openxmlformats.org/officeDocument/2006/relationships" xmlns:p="http://schemas.openxmlformats.org/presentationml/2006/main" saveSubsetFonts="1">
   <p:sldMasterIdLst>
-    <p:sldMasterId id="2147483648" r:id="Re1639c6bb4b64720"/>
+    <p:sldMasterId id="2147483648" r:id="R7447aa20c83f4f54"/>
   </p:sldMasterIdLst>
   <p:sldIdLst>
-    <p:sldId id="256" r:id="Rfe366568af7b4224"/>
+    <p:sldId id="256" r:id="Re094ff5d9fc54b41"/>
   </p:sldIdLst>
   <p:sldSz cx="12192000" cy="6858000"/>
   <p:notesSz cx="6858000" cy="9144000"/>
@@ -2652,17 +2652,17 @@
   </p:cSld>
   <p:clrMap bg1="lt1" tx1="dk1" bg2="lt2" tx2="dk2" accent1="accent1" accent2="accent2" accent3="accent3" accent4="accent4" accent5="accent5" accent6="accent6" hlink="hlink" folHlink="folHlink"/>
   <p:sldLayoutIdLst>
-    <p:sldLayoutId id="2147483649" r:id="Rf9a33f2ed0544f30"/>
-    <p:sldLayoutId id="2147483650" r:id="R0e07c156e7b14069"/>
-    <p:sldLayoutId id="2147483651" r:id="R75c154f485664c9a"/>
-    <p:sldLayoutId id="2147483652" r:id="R9512873bef734da5"/>
-    <p:sldLayoutId id="2147483653" r:id="R9cd5e0026f844f40"/>
-    <p:sldLayoutId id="2147483654" r:id="R9a12ee8f2c61458d"/>
-    <p:sldLayoutId id="2147483655" r:id="Rdb8047e9fa124704"/>
-    <p:sldLayoutId id="2147483656" r:id="R70afd1a86cf24568"/>
-    <p:sldLayoutId id="2147483657" r:id="R4c2e5dbea6e1404e"/>
-    <p:sldLayoutId id="2147483658" r:id="R2d327c925acb4a7e"/>
-    <p:sldLayoutId id="2147483659" r:id="R5942a453d9634429"/>
+    <p:sldLayoutId id="2147483649" r:id="Rc521d358884a449c"/>
+    <p:sldLayoutId id="2147483650" r:id="R6fcf0ef4b0264fe5"/>
+    <p:sldLayoutId id="2147483651" r:id="R164a2c51751a44d6"/>
+    <p:sldLayoutId id="2147483652" r:id="Re4dd7bd21d254de5"/>
+    <p:sldLayoutId id="2147483653" r:id="Rd4fe3230de4b4a72"/>
+    <p:sldLayoutId id="2147483654" r:id="R2e1a6f2acf614686"/>
+    <p:sldLayoutId id="2147483655" r:id="R69c3dfa00f7547da"/>
+    <p:sldLayoutId id="2147483656" r:id="R7867796469604cee"/>
+    <p:sldLayoutId id="2147483657" r:id="R6759f1ede99445ae"/>
+    <p:sldLayoutId id="2147483658" r:id="R5cd770e6e5204048"/>
+    <p:sldLayoutId id="2147483659" r:id="Ra8d91c65fc9a41d3"/>
   </p:sldLayoutIdLst>
   <p:txStyles>
     <p:titleStyle>
@@ -3279,7 +3279,7 @@
             </p:xfrm>
             <a:graphic>
               <a:graphicData uri="http://schemas.microsoft.com/office/webextensions/webextension/2010/11">
-                <we:webextensionref xmlns:we="http://schemas.microsoft.com/office/webextensions/webextension/2010/11" xmlns:r="http://schemas.openxmlformats.org/officeDocument/2006/relationships" r:id="R813e728f3e5b4ba5"/>
+                <we:webextensionref xmlns:we="http://schemas.microsoft.com/office/webextensions/webextension/2010/11" xmlns:r="http://schemas.openxmlformats.org/officeDocument/2006/relationships" r:id="Rcc1e66feb8834510"/>
               </a:graphicData>
             </a:graphic>
           </p:graphicFrame>
@@ -3291,7 +3291,7 @@
               <p:cNvPicPr/>
             </p:nvPicPr>
             <p:blipFill>
-              <a:blip xmlns:r="http://schemas.openxmlformats.org/officeDocument/2006/relationships" r:embed="Rd46d9b4e2ab147e9"/>
+              <a:blip xmlns:r="http://schemas.openxmlformats.org/officeDocument/2006/relationships" r:embed="R1684b77d991c4d62"/>
               <a:stretch>
                 <a:fillRect/>
               </a:stretch>
@@ -3322,11 +3322,11 @@
 </file>
 
 <file path=ppt/slides/udata/data.xml><?xml version="1.0" encoding="utf-8"?>
-<we:webextension xmlns:r="http://schemas.openxmlformats.org/officeDocument/2006/relationships" xmlns:we="http://schemas.microsoft.com/office/webextensions/webextension/2010/11" id="{2e4f462f-1cc3-4b7f-895a-8e60ef96a2a2}">
+<we:webextension xmlns:r="http://schemas.openxmlformats.org/officeDocument/2006/relationships" xmlns:we="http://schemas.microsoft.com/office/webextensions/webextension/2010/11" id="{2c9f8d40-4e64-4741-b1a1-bb127437c75c}">
   <we:reference id="695691ef-8f6e-4dc4-b6b9-c5a5f44499f7" version="1.0.0.0" store="developer" storeType="Registry"/>
   <we:alternateReferences/>
   <we:properties/>
   <we:bindings/>
-  <we:snapshot xmlns:r="http://schemas.openxmlformats.org/officeDocument/2006/relationships" r:embed="Rd46d9b4e2ab147e9"/>
+  <we:snapshot xmlns:r="http://schemas.openxmlformats.org/officeDocument/2006/relationships" r:embed="R1684b77d991c4d62"/>
 </we:webextension>
 </file>
</xml_diff>

<commit_message>
change the back end so it shouldnt disconnect and keywods can be more than one word long
</commit_message>
<xml_diff>
--- a/PowerPoll/PowerPoll/bin/Debug/Presentation1.pptx
+++ b/PowerPoll/PowerPoll/bin/Debug/Presentation1.pptx
@@ -2,10 +2,10 @@
 <file path=ppt/presentation.xml><?xml version="1.0" encoding="utf-8"?>
 <p:presentation xmlns:a="http://schemas.openxmlformats.org/drawingml/2006/main" xmlns:r="http://schemas.openxmlformats.org/officeDocument/2006/relationships" xmlns:p="http://schemas.openxmlformats.org/presentationml/2006/main" saveSubsetFonts="1">
   <p:sldMasterIdLst>
-    <p:sldMasterId id="2147483648" r:id="R5605444fb7d94ad1"/>
+    <p:sldMasterId id="2147483648" r:id="R9f9e70ed4b3c43be"/>
   </p:sldMasterIdLst>
   <p:sldIdLst>
-    <p:sldId id="256" r:id="R821249228e0c458f"/>
+    <p:sldId id="256" r:id="R57b11059372441bf"/>
   </p:sldIdLst>
   <p:sldSz cx="12192000" cy="6858000"/>
   <p:notesSz cx="6858000" cy="9144000"/>
@@ -2652,17 +2652,17 @@
   </p:cSld>
   <p:clrMap bg1="lt1" tx1="dk1" bg2="lt2" tx2="dk2" accent1="accent1" accent2="accent2" accent3="accent3" accent4="accent4" accent5="accent5" accent6="accent6" hlink="hlink" folHlink="folHlink"/>
   <p:sldLayoutIdLst>
-    <p:sldLayoutId id="2147483649" r:id="Rf079f2aa9ac14cbb"/>
-    <p:sldLayoutId id="2147483650" r:id="Rff503f550678495d"/>
-    <p:sldLayoutId id="2147483651" r:id="Re6451638025b4283"/>
-    <p:sldLayoutId id="2147483652" r:id="R18a608accae14547"/>
-    <p:sldLayoutId id="2147483653" r:id="R6df65ccaeb2849c0"/>
-    <p:sldLayoutId id="2147483654" r:id="R2859d0315bf34aae"/>
-    <p:sldLayoutId id="2147483655" r:id="R2e2374e8714846a0"/>
-    <p:sldLayoutId id="2147483656" r:id="Re06873b000f34e6e"/>
-    <p:sldLayoutId id="2147483657" r:id="Rac8b2a130a684112"/>
-    <p:sldLayoutId id="2147483658" r:id="Rc9b6b85b22284548"/>
-    <p:sldLayoutId id="2147483659" r:id="Re6d5f9857d4948f3"/>
+    <p:sldLayoutId id="2147483649" r:id="Ra93af81770e642cb"/>
+    <p:sldLayoutId id="2147483650" r:id="R9bf53f019dd747b1"/>
+    <p:sldLayoutId id="2147483651" r:id="R3d97fa49e7fa482c"/>
+    <p:sldLayoutId id="2147483652" r:id="R50872389100041a1"/>
+    <p:sldLayoutId id="2147483653" r:id="R1c508378db7f425b"/>
+    <p:sldLayoutId id="2147483654" r:id="Rbbb84c42b2f744fd"/>
+    <p:sldLayoutId id="2147483655" r:id="R9f8e08f74d37482b"/>
+    <p:sldLayoutId id="2147483656" r:id="Re88dc108e0d247bd"/>
+    <p:sldLayoutId id="2147483657" r:id="R4ad6804fb48247a3"/>
+    <p:sldLayoutId id="2147483658" r:id="R2188e71c109e4471"/>
+    <p:sldLayoutId id="2147483659" r:id="R57dd054342d6496a"/>
   </p:sldLayoutIdLst>
   <p:txStyles>
     <p:titleStyle>
@@ -3279,7 +3279,7 @@
             </p:xfrm>
             <a:graphic>
               <a:graphicData uri="http://schemas.microsoft.com/office/webextensions/webextension/2010/11">
-                <we:webextensionref xmlns:we="http://schemas.microsoft.com/office/webextensions/webextension/2010/11" xmlns:r="http://schemas.openxmlformats.org/officeDocument/2006/relationships" r:id="Rf208c3364de3436a"/>
+                <we:webextensionref xmlns:we="http://schemas.microsoft.com/office/webextensions/webextension/2010/11" xmlns:r="http://schemas.openxmlformats.org/officeDocument/2006/relationships" r:id="R9d27122c243449ef"/>
               </a:graphicData>
             </a:graphic>
           </p:graphicFrame>
@@ -3291,7 +3291,7 @@
               <p:cNvPicPr/>
             </p:nvPicPr>
             <p:blipFill>
-              <a:blip xmlns:r="http://schemas.openxmlformats.org/officeDocument/2006/relationships" r:embed="R575c3ce138f14cf3"/>
+              <a:blip xmlns:r="http://schemas.openxmlformats.org/officeDocument/2006/relationships" r:embed="R1c6e2a23febd4642"/>
               <a:stretch>
                 <a:fillRect/>
               </a:stretch>
@@ -3322,11 +3322,11 @@
 </file>
 
 <file path=ppt/slides/udata/data.xml><?xml version="1.0" encoding="utf-8"?>
-<we:webextension xmlns:r="http://schemas.openxmlformats.org/officeDocument/2006/relationships" xmlns:we="http://schemas.microsoft.com/office/webextensions/webextension/2010/11" id="{ea776b45-126d-4615-8971-73afb30dcb83}">
+<we:webextension xmlns:r="http://schemas.openxmlformats.org/officeDocument/2006/relationships" xmlns:we="http://schemas.microsoft.com/office/webextensions/webextension/2010/11" id="{01a8c1fc-2685-4a7d-8ce5-8f5e5ba32464}">
   <we:reference id="695691ef-8f6e-4dc4-b6b9-c5a5f44499f7" version="1.0.0.0" store="developer" storeType="Registry"/>
   <we:alternateReferences/>
   <we:properties/>
   <we:bindings/>
-  <we:snapshot xmlns:r="http://schemas.openxmlformats.org/officeDocument/2006/relationships" r:embed="R575c3ce138f14cf3"/>
+  <we:snapshot xmlns:r="http://schemas.openxmlformats.org/officeDocument/2006/relationships" r:embed="R1c6e2a23febd4642"/>
 </we:webextension>
 </file>
</xml_diff>

<commit_message>
Added Kunals timers and added the keywords to the pie chart
</commit_message>
<xml_diff>
--- a/PowerPoll/PowerPoll/bin/Debug/Presentation1.pptx
+++ b/PowerPoll/PowerPoll/bin/Debug/Presentation1.pptx
@@ -2,10 +2,10 @@
 <file path=ppt/presentation.xml><?xml version="1.0" encoding="utf-8"?>
 <p:presentation xmlns:a="http://schemas.openxmlformats.org/drawingml/2006/main" xmlns:r="http://schemas.openxmlformats.org/officeDocument/2006/relationships" xmlns:p="http://schemas.openxmlformats.org/presentationml/2006/main" saveSubsetFonts="1">
   <p:sldMasterIdLst>
-    <p:sldMasterId id="2147483648" r:id="R9f9e70ed4b3c43be"/>
+    <p:sldMasterId id="2147483648" r:id="Rb37d2a361c134a67"/>
   </p:sldMasterIdLst>
   <p:sldIdLst>
-    <p:sldId id="256" r:id="R57b11059372441bf"/>
+    <p:sldId id="256" r:id="Ra5f6a24aae614702"/>
   </p:sldIdLst>
   <p:sldSz cx="12192000" cy="6858000"/>
   <p:notesSz cx="6858000" cy="9144000"/>
@@ -2652,17 +2652,17 @@
   </p:cSld>
   <p:clrMap bg1="lt1" tx1="dk1" bg2="lt2" tx2="dk2" accent1="accent1" accent2="accent2" accent3="accent3" accent4="accent4" accent5="accent5" accent6="accent6" hlink="hlink" folHlink="folHlink"/>
   <p:sldLayoutIdLst>
-    <p:sldLayoutId id="2147483649" r:id="Ra93af81770e642cb"/>
-    <p:sldLayoutId id="2147483650" r:id="R9bf53f019dd747b1"/>
-    <p:sldLayoutId id="2147483651" r:id="R3d97fa49e7fa482c"/>
-    <p:sldLayoutId id="2147483652" r:id="R50872389100041a1"/>
-    <p:sldLayoutId id="2147483653" r:id="R1c508378db7f425b"/>
-    <p:sldLayoutId id="2147483654" r:id="Rbbb84c42b2f744fd"/>
-    <p:sldLayoutId id="2147483655" r:id="R9f8e08f74d37482b"/>
-    <p:sldLayoutId id="2147483656" r:id="Re88dc108e0d247bd"/>
-    <p:sldLayoutId id="2147483657" r:id="R4ad6804fb48247a3"/>
-    <p:sldLayoutId id="2147483658" r:id="R2188e71c109e4471"/>
-    <p:sldLayoutId id="2147483659" r:id="R57dd054342d6496a"/>
+    <p:sldLayoutId id="2147483649" r:id="R4d14846929cf48ce"/>
+    <p:sldLayoutId id="2147483650" r:id="R037c4bb6007b49d2"/>
+    <p:sldLayoutId id="2147483651" r:id="Rcb21d53f634440fc"/>
+    <p:sldLayoutId id="2147483652" r:id="Rda5b1fdbcc364d2b"/>
+    <p:sldLayoutId id="2147483653" r:id="Rd1746a1fc1ba404b"/>
+    <p:sldLayoutId id="2147483654" r:id="R8338dd0025e04746"/>
+    <p:sldLayoutId id="2147483655" r:id="Ra5fb0ec865724440"/>
+    <p:sldLayoutId id="2147483656" r:id="R184d13e1ad4544d2"/>
+    <p:sldLayoutId id="2147483657" r:id="R28373e27ca124e05"/>
+    <p:sldLayoutId id="2147483658" r:id="R51bc74dbf008446d"/>
+    <p:sldLayoutId id="2147483659" r:id="R9daff37bb7464051"/>
   </p:sldLayoutIdLst>
   <p:txStyles>
     <p:titleStyle>
@@ -3279,7 +3279,7 @@
             </p:xfrm>
             <a:graphic>
               <a:graphicData uri="http://schemas.microsoft.com/office/webextensions/webextension/2010/11">
-                <we:webextensionref xmlns:we="http://schemas.microsoft.com/office/webextensions/webextension/2010/11" xmlns:r="http://schemas.openxmlformats.org/officeDocument/2006/relationships" r:id="R9d27122c243449ef"/>
+                <we:webextensionref xmlns:we="http://schemas.microsoft.com/office/webextensions/webextension/2010/11" xmlns:r="http://schemas.openxmlformats.org/officeDocument/2006/relationships" r:id="R2c1a3141e2654ac0"/>
               </a:graphicData>
             </a:graphic>
           </p:graphicFrame>
@@ -3291,7 +3291,7 @@
               <p:cNvPicPr/>
             </p:nvPicPr>
             <p:blipFill>
-              <a:blip xmlns:r="http://schemas.openxmlformats.org/officeDocument/2006/relationships" r:embed="R1c6e2a23febd4642"/>
+              <a:blip xmlns:r="http://schemas.openxmlformats.org/officeDocument/2006/relationships" r:embed="Rb2b4cab207004b5d"/>
               <a:stretch>
                 <a:fillRect/>
               </a:stretch>
@@ -3322,11 +3322,11 @@
 </file>
 
 <file path=ppt/slides/udata/data.xml><?xml version="1.0" encoding="utf-8"?>
-<we:webextension xmlns:r="http://schemas.openxmlformats.org/officeDocument/2006/relationships" xmlns:we="http://schemas.microsoft.com/office/webextensions/webextension/2010/11" id="{01a8c1fc-2685-4a7d-8ce5-8f5e5ba32464}">
+<we:webextension xmlns:r="http://schemas.openxmlformats.org/officeDocument/2006/relationships" xmlns:we="http://schemas.microsoft.com/office/webextensions/webextension/2010/11" id="{aaecb928-08b2-4a68-a0a3-d8d3756d6663}">
   <we:reference id="695691ef-8f6e-4dc4-b6b9-c5a5f44499f7" version="1.0.0.0" store="developer" storeType="Registry"/>
   <we:alternateReferences/>
   <we:properties/>
   <we:bindings/>
-  <we:snapshot xmlns:r="http://schemas.openxmlformats.org/officeDocument/2006/relationships" r:embed="R1c6e2a23febd4642"/>
+  <we:snapshot xmlns:r="http://schemas.openxmlformats.org/officeDocument/2006/relationships" r:embed="Rb2b4cab207004b5d"/>
 </we:webextension>
 </file>
</xml_diff>

<commit_message>
fixed the bug from the presentation
</commit_message>
<xml_diff>
--- a/PowerPoll/PowerPoll/bin/Debug/Presentation1.pptx
+++ b/PowerPoll/PowerPoll/bin/Debug/Presentation1.pptx
@@ -2,10 +2,10 @@
 <file path=ppt/presentation.xml><?xml version="1.0" encoding="utf-8"?>
 <p:presentation xmlns:a="http://schemas.openxmlformats.org/drawingml/2006/main" xmlns:r="http://schemas.openxmlformats.org/officeDocument/2006/relationships" xmlns:p="http://schemas.openxmlformats.org/presentationml/2006/main" saveSubsetFonts="1">
   <p:sldMasterIdLst>
-    <p:sldMasterId id="2147483648" r:id="Rb37d2a361c134a67"/>
+    <p:sldMasterId id="2147483648" r:id="Rb047bb5ce9e04da4"/>
   </p:sldMasterIdLst>
   <p:sldIdLst>
-    <p:sldId id="256" r:id="Ra5f6a24aae614702"/>
+    <p:sldId id="256" r:id="R325aa8dd2a364408"/>
   </p:sldIdLst>
   <p:sldSz cx="12192000" cy="6858000"/>
   <p:notesSz cx="6858000" cy="9144000"/>
@@ -2652,17 +2652,17 @@
   </p:cSld>
   <p:clrMap bg1="lt1" tx1="dk1" bg2="lt2" tx2="dk2" accent1="accent1" accent2="accent2" accent3="accent3" accent4="accent4" accent5="accent5" accent6="accent6" hlink="hlink" folHlink="folHlink"/>
   <p:sldLayoutIdLst>
-    <p:sldLayoutId id="2147483649" r:id="R4d14846929cf48ce"/>
-    <p:sldLayoutId id="2147483650" r:id="R037c4bb6007b49d2"/>
-    <p:sldLayoutId id="2147483651" r:id="Rcb21d53f634440fc"/>
-    <p:sldLayoutId id="2147483652" r:id="Rda5b1fdbcc364d2b"/>
-    <p:sldLayoutId id="2147483653" r:id="Rd1746a1fc1ba404b"/>
-    <p:sldLayoutId id="2147483654" r:id="R8338dd0025e04746"/>
-    <p:sldLayoutId id="2147483655" r:id="Ra5fb0ec865724440"/>
-    <p:sldLayoutId id="2147483656" r:id="R184d13e1ad4544d2"/>
-    <p:sldLayoutId id="2147483657" r:id="R28373e27ca124e05"/>
-    <p:sldLayoutId id="2147483658" r:id="R51bc74dbf008446d"/>
-    <p:sldLayoutId id="2147483659" r:id="R9daff37bb7464051"/>
+    <p:sldLayoutId id="2147483649" r:id="Re3356b2e04df41b8"/>
+    <p:sldLayoutId id="2147483650" r:id="R34cd6b42b48040b4"/>
+    <p:sldLayoutId id="2147483651" r:id="R2962c6addba44639"/>
+    <p:sldLayoutId id="2147483652" r:id="R6476d3c8abd9438c"/>
+    <p:sldLayoutId id="2147483653" r:id="Rcc7f690a9c0b42dd"/>
+    <p:sldLayoutId id="2147483654" r:id="Rfaca9722272446bb"/>
+    <p:sldLayoutId id="2147483655" r:id="R22a9b3840eac4c65"/>
+    <p:sldLayoutId id="2147483656" r:id="R44f21f7169d84a7f"/>
+    <p:sldLayoutId id="2147483657" r:id="R676fc90fa686427f"/>
+    <p:sldLayoutId id="2147483658" r:id="R05c3cb9fae3144ea"/>
+    <p:sldLayoutId id="2147483659" r:id="Rfcb7afcdd8fa40f1"/>
   </p:sldLayoutIdLst>
   <p:txStyles>
     <p:titleStyle>
@@ -3279,7 +3279,7 @@
             </p:xfrm>
             <a:graphic>
               <a:graphicData uri="http://schemas.microsoft.com/office/webextensions/webextension/2010/11">
-                <we:webextensionref xmlns:we="http://schemas.microsoft.com/office/webextensions/webextension/2010/11" xmlns:r="http://schemas.openxmlformats.org/officeDocument/2006/relationships" r:id="R2c1a3141e2654ac0"/>
+                <we:webextensionref xmlns:we="http://schemas.microsoft.com/office/webextensions/webextension/2010/11" xmlns:r="http://schemas.openxmlformats.org/officeDocument/2006/relationships" r:id="R1c9e821b00ce4577"/>
               </a:graphicData>
             </a:graphic>
           </p:graphicFrame>
@@ -3291,7 +3291,7 @@
               <p:cNvPicPr/>
             </p:nvPicPr>
             <p:blipFill>
-              <a:blip xmlns:r="http://schemas.openxmlformats.org/officeDocument/2006/relationships" r:embed="Rb2b4cab207004b5d"/>
+              <a:blip xmlns:r="http://schemas.openxmlformats.org/officeDocument/2006/relationships" r:embed="Rfa81c280696a42ee"/>
               <a:stretch>
                 <a:fillRect/>
               </a:stretch>
@@ -3322,11 +3322,11 @@
 </file>
 
 <file path=ppt/slides/udata/data.xml><?xml version="1.0" encoding="utf-8"?>
-<we:webextension xmlns:r="http://schemas.openxmlformats.org/officeDocument/2006/relationships" xmlns:we="http://schemas.microsoft.com/office/webextensions/webextension/2010/11" id="{aaecb928-08b2-4a68-a0a3-d8d3756d6663}">
+<we:webextension xmlns:r="http://schemas.openxmlformats.org/officeDocument/2006/relationships" xmlns:we="http://schemas.microsoft.com/office/webextensions/webextension/2010/11" id="{fd6a6dfd-c954-46fa-9684-b86df559f51b}">
   <we:reference id="695691ef-8f6e-4dc4-b6b9-c5a5f44499f7" version="1.0.0.0" store="developer" storeType="Registry"/>
   <we:alternateReferences/>
   <we:properties/>
   <we:bindings/>
-  <we:snapshot xmlns:r="http://schemas.openxmlformats.org/officeDocument/2006/relationships" r:embed="Rb2b4cab207004b5d"/>
+  <we:snapshot xmlns:r="http://schemas.openxmlformats.org/officeDocument/2006/relationships" r:embed="Rfa81c280696a42ee"/>
 </we:webextension>
 </file>
</xml_diff>

<commit_message>
fixed two bugs in the nack end, fixed some things that caused warnings in the front end
</commit_message>
<xml_diff>
--- a/PowerPoll/PowerPoll/bin/Debug/Presentation1.pptx
+++ b/PowerPoll/PowerPoll/bin/Debug/Presentation1.pptx
@@ -2,10 +2,10 @@
 <file path=ppt/presentation.xml><?xml version="1.0" encoding="utf-8"?>
 <p:presentation xmlns:a="http://schemas.openxmlformats.org/drawingml/2006/main" xmlns:r="http://schemas.openxmlformats.org/officeDocument/2006/relationships" xmlns:p="http://schemas.openxmlformats.org/presentationml/2006/main" saveSubsetFonts="1">
   <p:sldMasterIdLst>
-    <p:sldMasterId id="2147483648" r:id="Rcf88f6b750a54bd1"/>
+    <p:sldMasterId id="2147483648" r:id="Re85aba054d044e13"/>
   </p:sldMasterIdLst>
   <p:sldIdLst>
-    <p:sldId id="256" r:id="R90240499e48047f9"/>
+    <p:sldId id="256" r:id="R7777e13cbeed417f"/>
   </p:sldIdLst>
   <p:sldSz cx="12192000" cy="6858000"/>
   <p:notesSz cx="6858000" cy="9144000"/>
@@ -2652,17 +2652,17 @@
   </p:cSld>
   <p:clrMap bg1="lt1" tx1="dk1" bg2="lt2" tx2="dk2" accent1="accent1" accent2="accent2" accent3="accent3" accent4="accent4" accent5="accent5" accent6="accent6" hlink="hlink" folHlink="folHlink"/>
   <p:sldLayoutIdLst>
-    <p:sldLayoutId id="2147483649" r:id="Rb085f3d6d94043f5"/>
-    <p:sldLayoutId id="2147483650" r:id="Rcf8fa13ddace4740"/>
-    <p:sldLayoutId id="2147483651" r:id="Rec1b689fb8294e81"/>
-    <p:sldLayoutId id="2147483652" r:id="Rbcd489217425456a"/>
-    <p:sldLayoutId id="2147483653" r:id="R0358d3cbfbd54497"/>
-    <p:sldLayoutId id="2147483654" r:id="Rd15c52ee741e4aad"/>
-    <p:sldLayoutId id="2147483655" r:id="R85e99dad270e45da"/>
-    <p:sldLayoutId id="2147483656" r:id="R9386c96f09d84f39"/>
-    <p:sldLayoutId id="2147483657" r:id="R29663cbe4bc0465a"/>
-    <p:sldLayoutId id="2147483658" r:id="Raec03538fbdf43d0"/>
-    <p:sldLayoutId id="2147483659" r:id="Rf8d15b9ebb0b4e00"/>
+    <p:sldLayoutId id="2147483649" r:id="Rcd0f62ac8cca4974"/>
+    <p:sldLayoutId id="2147483650" r:id="R7a9146445c9e4381"/>
+    <p:sldLayoutId id="2147483651" r:id="Rcb45612bba8348eb"/>
+    <p:sldLayoutId id="2147483652" r:id="R47258a439c0c4a25"/>
+    <p:sldLayoutId id="2147483653" r:id="R4fdfc5146ea4498e"/>
+    <p:sldLayoutId id="2147483654" r:id="R81b7a8db433b4fdf"/>
+    <p:sldLayoutId id="2147483655" r:id="Raa9e982d0df24beb"/>
+    <p:sldLayoutId id="2147483656" r:id="Rc3e7c6c90e184dec"/>
+    <p:sldLayoutId id="2147483657" r:id="Rd5e8d3e819ad4d34"/>
+    <p:sldLayoutId id="2147483658" r:id="Rd83a07fa2191448e"/>
+    <p:sldLayoutId id="2147483659" r:id="R7de2e06a861643c2"/>
   </p:sldLayoutIdLst>
   <p:txStyles>
     <p:titleStyle>
@@ -3279,7 +3279,7 @@
             </p:xfrm>
             <a:graphic>
               <a:graphicData uri="http://schemas.microsoft.com/office/webextensions/webextension/2010/11">
-                <we:webextensionref xmlns:we="http://schemas.microsoft.com/office/webextensions/webextension/2010/11" xmlns:r="http://schemas.openxmlformats.org/officeDocument/2006/relationships" r:id="R708144e380f44ee6"/>
+                <we:webextensionref xmlns:we="http://schemas.microsoft.com/office/webextensions/webextension/2010/11" xmlns:r="http://schemas.openxmlformats.org/officeDocument/2006/relationships" r:id="Rc8496b697b834e2c"/>
               </a:graphicData>
             </a:graphic>
           </p:graphicFrame>
@@ -3291,7 +3291,7 @@
               <p:cNvPicPr/>
             </p:nvPicPr>
             <p:blipFill>
-              <a:blip xmlns:r="http://schemas.openxmlformats.org/officeDocument/2006/relationships" r:embed="R78bd3828cc2947e7"/>
+              <a:blip xmlns:r="http://schemas.openxmlformats.org/officeDocument/2006/relationships" r:embed="Rcc461d43fddb4e45"/>
               <a:stretch>
                 <a:fillRect/>
               </a:stretch>
@@ -3322,11 +3322,11 @@
 </file>
 
 <file path=ppt/slides/udata/data.xml><?xml version="1.0" encoding="utf-8"?>
-<we:webextension xmlns:r="http://schemas.openxmlformats.org/officeDocument/2006/relationships" xmlns:we="http://schemas.microsoft.com/office/webextensions/webextension/2010/11" id="{4894da70-33f5-43a9-9b39-4b2ed7fd67bf}">
+<we:webextension xmlns:r="http://schemas.openxmlformats.org/officeDocument/2006/relationships" xmlns:we="http://schemas.microsoft.com/office/webextensions/webextension/2010/11" id="{b69c6e89-575a-4984-a762-422d664a4b04}">
   <we:reference id="695691ef-8f6e-4dc4-b6b9-c5a5f44499f7" version="1.0.0.0" store="developer" storeType="Registry"/>
   <we:alternateReferences/>
   <we:properties/>
   <we:bindings/>
-  <we:snapshot xmlns:r="http://schemas.openxmlformats.org/officeDocument/2006/relationships" r:embed="R78bd3828cc2947e7"/>
+  <we:snapshot xmlns:r="http://schemas.openxmlformats.org/officeDocument/2006/relationships" r:embed="Rcc461d43fddb4e45"/>
 </we:webextension>
 </file>
</xml_diff>

<commit_message>
bar graph now resizes to fit starting window size, both graphs timer now based on the value from the database, opening an old graph now has an accurate time instead of NaN
</commit_message>
<xml_diff>
--- a/PowerPoll/PowerPoll/bin/Debug/Presentation1.pptx
+++ b/PowerPoll/PowerPoll/bin/Debug/Presentation1.pptx
@@ -2,10 +2,10 @@
 <file path=ppt/presentation.xml><?xml version="1.0" encoding="utf-8"?>
 <p:presentation xmlns:a="http://schemas.openxmlformats.org/drawingml/2006/main" xmlns:r="http://schemas.openxmlformats.org/officeDocument/2006/relationships" xmlns:p="http://schemas.openxmlformats.org/presentationml/2006/main" saveSubsetFonts="1">
   <p:sldMasterIdLst>
-    <p:sldMasterId id="2147483648" r:id="Re85aba054d044e13"/>
+    <p:sldMasterId id="2147483648" r:id="R43a98c0f2e414a7c"/>
   </p:sldMasterIdLst>
   <p:sldIdLst>
-    <p:sldId id="256" r:id="R7777e13cbeed417f"/>
+    <p:sldId id="256" r:id="R07b29f4c4e324b06"/>
   </p:sldIdLst>
   <p:sldSz cx="12192000" cy="6858000"/>
   <p:notesSz cx="6858000" cy="9144000"/>
@@ -2652,17 +2652,17 @@
   </p:cSld>
   <p:clrMap bg1="lt1" tx1="dk1" bg2="lt2" tx2="dk2" accent1="accent1" accent2="accent2" accent3="accent3" accent4="accent4" accent5="accent5" accent6="accent6" hlink="hlink" folHlink="folHlink"/>
   <p:sldLayoutIdLst>
-    <p:sldLayoutId id="2147483649" r:id="Rcd0f62ac8cca4974"/>
-    <p:sldLayoutId id="2147483650" r:id="R7a9146445c9e4381"/>
-    <p:sldLayoutId id="2147483651" r:id="Rcb45612bba8348eb"/>
-    <p:sldLayoutId id="2147483652" r:id="R47258a439c0c4a25"/>
-    <p:sldLayoutId id="2147483653" r:id="R4fdfc5146ea4498e"/>
-    <p:sldLayoutId id="2147483654" r:id="R81b7a8db433b4fdf"/>
-    <p:sldLayoutId id="2147483655" r:id="Raa9e982d0df24beb"/>
-    <p:sldLayoutId id="2147483656" r:id="Rc3e7c6c90e184dec"/>
-    <p:sldLayoutId id="2147483657" r:id="Rd5e8d3e819ad4d34"/>
-    <p:sldLayoutId id="2147483658" r:id="Rd83a07fa2191448e"/>
-    <p:sldLayoutId id="2147483659" r:id="R7de2e06a861643c2"/>
+    <p:sldLayoutId id="2147483649" r:id="R80c509687fe845b0"/>
+    <p:sldLayoutId id="2147483650" r:id="R2b530bcfb3c848ee"/>
+    <p:sldLayoutId id="2147483651" r:id="R8815e2908aec4e92"/>
+    <p:sldLayoutId id="2147483652" r:id="R26c9896cb7104977"/>
+    <p:sldLayoutId id="2147483653" r:id="R40d8643eb22245d8"/>
+    <p:sldLayoutId id="2147483654" r:id="R64dfe05cc0dc4f8c"/>
+    <p:sldLayoutId id="2147483655" r:id="Rf6ded71175cf49fb"/>
+    <p:sldLayoutId id="2147483656" r:id="Ra630042639e740c2"/>
+    <p:sldLayoutId id="2147483657" r:id="Rd2021a3cf0d045b2"/>
+    <p:sldLayoutId id="2147483658" r:id="R1565439a6cf64de2"/>
+    <p:sldLayoutId id="2147483659" r:id="R76bf0fd2b5d54ec6"/>
   </p:sldLayoutIdLst>
   <p:txStyles>
     <p:titleStyle>
@@ -3279,7 +3279,7 @@
             </p:xfrm>
             <a:graphic>
               <a:graphicData uri="http://schemas.microsoft.com/office/webextensions/webextension/2010/11">
-                <we:webextensionref xmlns:we="http://schemas.microsoft.com/office/webextensions/webextension/2010/11" xmlns:r="http://schemas.openxmlformats.org/officeDocument/2006/relationships" r:id="Rc8496b697b834e2c"/>
+                <we:webextensionref xmlns:we="http://schemas.microsoft.com/office/webextensions/webextension/2010/11" xmlns:r="http://schemas.openxmlformats.org/officeDocument/2006/relationships" r:id="Reb9c8551beff4efc"/>
               </a:graphicData>
             </a:graphic>
           </p:graphicFrame>
@@ -3291,7 +3291,7 @@
               <p:cNvPicPr/>
             </p:nvPicPr>
             <p:blipFill>
-              <a:blip xmlns:r="http://schemas.openxmlformats.org/officeDocument/2006/relationships" r:embed="Rcc461d43fddb4e45"/>
+              <a:blip xmlns:r="http://schemas.openxmlformats.org/officeDocument/2006/relationships" r:embed="R7813412b5f0243ed"/>
               <a:stretch>
                 <a:fillRect/>
               </a:stretch>
@@ -3322,11 +3322,11 @@
 </file>
 
 <file path=ppt/slides/udata/data.xml><?xml version="1.0" encoding="utf-8"?>
-<we:webextension xmlns:r="http://schemas.openxmlformats.org/officeDocument/2006/relationships" xmlns:we="http://schemas.microsoft.com/office/webextensions/webextension/2010/11" id="{b69c6e89-575a-4984-a762-422d664a4b04}">
+<we:webextension xmlns:r="http://schemas.openxmlformats.org/officeDocument/2006/relationships" xmlns:we="http://schemas.microsoft.com/office/webextensions/webextension/2010/11" id="{52204a67-a86c-41db-81a0-08175dccfe5e}">
   <we:reference id="695691ef-8f6e-4dc4-b6b9-c5a5f44499f7" version="1.0.0.0" store="developer" storeType="Registry"/>
   <we:alternateReferences/>
   <we:properties/>
   <we:bindings/>
-  <we:snapshot xmlns:r="http://schemas.openxmlformats.org/officeDocument/2006/relationships" r:embed="Rcc461d43fddb4e45"/>
+  <we:snapshot xmlns:r="http://schemas.openxmlformats.org/officeDocument/2006/relationships" r:embed="R7813412b5f0243ed"/>
 </we:webextension>
 </file>
</xml_diff>

<commit_message>
reworked some layout in html and bar to scale better
</commit_message>
<xml_diff>
--- a/PowerPoll/PowerPoll/bin/Debug/Presentation1.pptx
+++ b/PowerPoll/PowerPoll/bin/Debug/Presentation1.pptx
@@ -2,10 +2,10 @@
 <file path=ppt/presentation.xml><?xml version="1.0" encoding="utf-8"?>
 <p:presentation xmlns:a="http://schemas.openxmlformats.org/drawingml/2006/main" xmlns:r="http://schemas.openxmlformats.org/officeDocument/2006/relationships" xmlns:p="http://schemas.openxmlformats.org/presentationml/2006/main" saveSubsetFonts="1">
   <p:sldMasterIdLst>
-    <p:sldMasterId id="2147483648" r:id="R5f306049bc62493e"/>
+    <p:sldMasterId id="2147483648" r:id="Raba2c119e70146f3"/>
   </p:sldMasterIdLst>
   <p:sldIdLst>
-    <p:sldId id="256" r:id="R61b177e7e2e34870"/>
+    <p:sldId id="256" r:id="R7c0dcff5bd574fb2"/>
   </p:sldIdLst>
   <p:sldSz cx="12192000" cy="6858000"/>
   <p:notesSz cx="6858000" cy="9144000"/>
@@ -2652,17 +2652,17 @@
   </p:cSld>
   <p:clrMap bg1="lt1" tx1="dk1" bg2="lt2" tx2="dk2" accent1="accent1" accent2="accent2" accent3="accent3" accent4="accent4" accent5="accent5" accent6="accent6" hlink="hlink" folHlink="folHlink"/>
   <p:sldLayoutIdLst>
-    <p:sldLayoutId id="2147483649" r:id="R5aba93eb7d484a60"/>
-    <p:sldLayoutId id="2147483650" r:id="R5911464f7d964a48"/>
-    <p:sldLayoutId id="2147483651" r:id="Rd00c6b08032f44d9"/>
-    <p:sldLayoutId id="2147483652" r:id="R186dd7d3c26146ba"/>
-    <p:sldLayoutId id="2147483653" r:id="Ra532675d6b01439f"/>
-    <p:sldLayoutId id="2147483654" r:id="Re610fc51e84c4cb1"/>
-    <p:sldLayoutId id="2147483655" r:id="R884a6bff4d5e49bc"/>
-    <p:sldLayoutId id="2147483656" r:id="R596a2eaec1324050"/>
-    <p:sldLayoutId id="2147483657" r:id="R11b9b00202714490"/>
-    <p:sldLayoutId id="2147483658" r:id="R4277ef9539124ea6"/>
-    <p:sldLayoutId id="2147483659" r:id="Re3560e2c004e4b06"/>
+    <p:sldLayoutId id="2147483649" r:id="R7fc1866bd8704db9"/>
+    <p:sldLayoutId id="2147483650" r:id="Raeacda9736474a07"/>
+    <p:sldLayoutId id="2147483651" r:id="R27661c52b13e4334"/>
+    <p:sldLayoutId id="2147483652" r:id="Rdd9c14f0063c43b9"/>
+    <p:sldLayoutId id="2147483653" r:id="R9a6fcb2db65c4719"/>
+    <p:sldLayoutId id="2147483654" r:id="Rff80d573797a43b9"/>
+    <p:sldLayoutId id="2147483655" r:id="Rcc7bfb193e7e4c63"/>
+    <p:sldLayoutId id="2147483656" r:id="R02468283213949d2"/>
+    <p:sldLayoutId id="2147483657" r:id="R7c4e177b7cc24b21"/>
+    <p:sldLayoutId id="2147483658" r:id="Re8b03a4d3f3a4b51"/>
+    <p:sldLayoutId id="2147483659" r:id="Rcba46b6e07e34fec"/>
   </p:sldLayoutIdLst>
   <p:txStyles>
     <p:titleStyle>
@@ -3279,7 +3279,7 @@
             </p:xfrm>
             <a:graphic>
               <a:graphicData uri="http://schemas.microsoft.com/office/webextensions/webextension/2010/11">
-                <we:webextensionref xmlns:we="http://schemas.microsoft.com/office/webextensions/webextension/2010/11" xmlns:r="http://schemas.openxmlformats.org/officeDocument/2006/relationships" r:id="Rab27da160de149e8"/>
+                <we:webextensionref xmlns:we="http://schemas.microsoft.com/office/webextensions/webextension/2010/11" xmlns:r="http://schemas.openxmlformats.org/officeDocument/2006/relationships" r:id="R7f78b2b0746148ca"/>
               </a:graphicData>
             </a:graphic>
           </p:graphicFrame>
@@ -3291,7 +3291,7 @@
               <p:cNvPicPr/>
             </p:nvPicPr>
             <p:blipFill>
-              <a:blip xmlns:r="http://schemas.openxmlformats.org/officeDocument/2006/relationships" r:embed="R595200dec51b40c3"/>
+              <a:blip xmlns:r="http://schemas.openxmlformats.org/officeDocument/2006/relationships" r:embed="R81811fb8bb44428b"/>
               <a:stretch>
                 <a:fillRect/>
               </a:stretch>
@@ -3322,11 +3322,11 @@
 </file>
 
 <file path=ppt/slides/udata/data.xml><?xml version="1.0" encoding="utf-8"?>
-<we:webextension xmlns:r="http://schemas.openxmlformats.org/officeDocument/2006/relationships" xmlns:we="http://schemas.microsoft.com/office/webextensions/webextension/2010/11" id="{252bd23d-aaf6-4e32-825e-e55d820bb3c4}">
+<we:webextension xmlns:r="http://schemas.openxmlformats.org/officeDocument/2006/relationships" xmlns:we="http://schemas.microsoft.com/office/webextensions/webextension/2010/11" id="{293a4d1c-3f15-4c64-8eb3-571ca6758fff}">
   <we:reference id="695691ef-8f6e-4dc4-b6b9-c5a5f44499f7" version="1.0.0.0" store="developer" storeType="Registry"/>
   <we:alternateReferences/>
   <we:properties/>
   <we:bindings/>
-  <we:snapshot xmlns:r="http://schemas.openxmlformats.org/officeDocument/2006/relationships" r:embed="R595200dec51b40c3"/>
+  <we:snapshot xmlns:r="http://schemas.openxmlformats.org/officeDocument/2006/relationships" r:embed="R81811fb8bb44428b"/>
 </we:webextension>
 </file>
</xml_diff>

<commit_message>
Reworked the interface, default window is now 600x525, buttons are now at the bottom center, add and remove buttons are on the same line and move with bars
</commit_message>
<xml_diff>
--- a/PowerPoll/PowerPoll/bin/Debug/Presentation1.pptx
+++ b/PowerPoll/PowerPoll/bin/Debug/Presentation1.pptx
@@ -2,10 +2,10 @@
 <file path=ppt/presentation.xml><?xml version="1.0" encoding="utf-8"?>
 <p:presentation xmlns:a="http://schemas.openxmlformats.org/drawingml/2006/main" xmlns:r="http://schemas.openxmlformats.org/officeDocument/2006/relationships" xmlns:p="http://schemas.openxmlformats.org/presentationml/2006/main" saveSubsetFonts="1">
   <p:sldMasterIdLst>
-    <p:sldMasterId id="2147483648" r:id="Raba2c119e70146f3"/>
+    <p:sldMasterId id="2147483648" r:id="R1ff6bacf5c4543a1"/>
   </p:sldMasterIdLst>
   <p:sldIdLst>
-    <p:sldId id="256" r:id="R7c0dcff5bd574fb2"/>
+    <p:sldId id="256" r:id="R7162ce61d0f240d7"/>
   </p:sldIdLst>
   <p:sldSz cx="12192000" cy="6858000"/>
   <p:notesSz cx="6858000" cy="9144000"/>
@@ -2652,17 +2652,17 @@
   </p:cSld>
   <p:clrMap bg1="lt1" tx1="dk1" bg2="lt2" tx2="dk2" accent1="accent1" accent2="accent2" accent3="accent3" accent4="accent4" accent5="accent5" accent6="accent6" hlink="hlink" folHlink="folHlink"/>
   <p:sldLayoutIdLst>
-    <p:sldLayoutId id="2147483649" r:id="R7fc1866bd8704db9"/>
-    <p:sldLayoutId id="2147483650" r:id="Raeacda9736474a07"/>
-    <p:sldLayoutId id="2147483651" r:id="R27661c52b13e4334"/>
-    <p:sldLayoutId id="2147483652" r:id="Rdd9c14f0063c43b9"/>
-    <p:sldLayoutId id="2147483653" r:id="R9a6fcb2db65c4719"/>
-    <p:sldLayoutId id="2147483654" r:id="Rff80d573797a43b9"/>
-    <p:sldLayoutId id="2147483655" r:id="Rcc7bfb193e7e4c63"/>
-    <p:sldLayoutId id="2147483656" r:id="R02468283213949d2"/>
-    <p:sldLayoutId id="2147483657" r:id="R7c4e177b7cc24b21"/>
-    <p:sldLayoutId id="2147483658" r:id="Re8b03a4d3f3a4b51"/>
-    <p:sldLayoutId id="2147483659" r:id="Rcba46b6e07e34fec"/>
+    <p:sldLayoutId id="2147483649" r:id="R1313adc210e347d1"/>
+    <p:sldLayoutId id="2147483650" r:id="Re145de4d36a947d8"/>
+    <p:sldLayoutId id="2147483651" r:id="R71ffcbe770234152"/>
+    <p:sldLayoutId id="2147483652" r:id="R0783046668774e8d"/>
+    <p:sldLayoutId id="2147483653" r:id="Re242568107b7488b"/>
+    <p:sldLayoutId id="2147483654" r:id="Rad07e3404da44bef"/>
+    <p:sldLayoutId id="2147483655" r:id="R31a176adcc534817"/>
+    <p:sldLayoutId id="2147483656" r:id="R60a06a9c000a4f53"/>
+    <p:sldLayoutId id="2147483657" r:id="R1376edd3e4c949ad"/>
+    <p:sldLayoutId id="2147483658" r:id="R401b686025574ff1"/>
+    <p:sldLayoutId id="2147483659" r:id="R6b61ad3ac7604ba8"/>
   </p:sldLayoutIdLst>
   <p:txStyles>
     <p:titleStyle>
@@ -3275,11 +3275,11 @@
             </p:nvGraphicFramePr>
             <p:xfrm>
               <a:off x="0" y="0"/>
-              <a:ext cx="9144000" cy="6858000"/>
+              <a:ext cx="5715000" cy="5143500"/>
             </p:xfrm>
             <a:graphic>
               <a:graphicData uri="http://schemas.microsoft.com/office/webextensions/webextension/2010/11">
-                <we:webextensionref xmlns:we="http://schemas.microsoft.com/office/webextensions/webextension/2010/11" xmlns:r="http://schemas.openxmlformats.org/officeDocument/2006/relationships" r:id="R7f78b2b0746148ca"/>
+                <we:webextensionref xmlns:we="http://schemas.microsoft.com/office/webextensions/webextension/2010/11" xmlns:r="http://schemas.openxmlformats.org/officeDocument/2006/relationships" r:id="Rd275716e9cf948d8"/>
               </a:graphicData>
             </a:graphic>
           </p:graphicFrame>
@@ -3291,7 +3291,7 @@
               <p:cNvPicPr/>
             </p:nvPicPr>
             <p:blipFill>
-              <a:blip xmlns:r="http://schemas.openxmlformats.org/officeDocument/2006/relationships" r:embed="R81811fb8bb44428b"/>
+              <a:blip xmlns:r="http://schemas.openxmlformats.org/officeDocument/2006/relationships" r:embed="R8718cbcdf6ac49a6"/>
               <a:stretch>
                 <a:fillRect/>
               </a:stretch>
@@ -3299,7 +3299,7 @@
             <p:spPr>
               <a:xfrm>
                 <a:off x="0" y="0"/>
-                <a:ext cx="9144000" cy="6858000"/>
+                <a:ext cx="5715000" cy="5143500"/>
               </a:xfrm>
               <a:prstGeom prst="rect">
                 <a:avLst/>
@@ -3322,11 +3322,11 @@
 </file>
 
 <file path=ppt/slides/udata/data.xml><?xml version="1.0" encoding="utf-8"?>
-<we:webextension xmlns:r="http://schemas.openxmlformats.org/officeDocument/2006/relationships" xmlns:we="http://schemas.microsoft.com/office/webextensions/webextension/2010/11" id="{293a4d1c-3f15-4c64-8eb3-571ca6758fff}">
+<we:webextension xmlns:r="http://schemas.openxmlformats.org/officeDocument/2006/relationships" xmlns:we="http://schemas.microsoft.com/office/webextensions/webextension/2010/11" id="{02fe7e2b-b617-4faf-aa04-a0100be73428}">
   <we:reference id="695691ef-8f6e-4dc4-b6b9-c5a5f44499f7" version="1.0.0.0" store="developer" storeType="Registry"/>
   <we:alternateReferences/>
   <we:properties/>
   <we:bindings/>
-  <we:snapshot xmlns:r="http://schemas.openxmlformats.org/officeDocument/2006/relationships" r:embed="R81811fb8bb44428b"/>
+  <we:snapshot xmlns:r="http://schemas.openxmlformats.org/officeDocument/2006/relationships" r:embed="R8718cbcdf6ac49a6"/>
 </we:webextension>
 </file>
</xml_diff>

<commit_message>
got pie to size to initial window with the filthiest hack, will update bar tomorrow
</commit_message>
<xml_diff>
--- a/PowerPoll/PowerPoll/bin/Debug/Presentation1.pptx
+++ b/PowerPoll/PowerPoll/bin/Debug/Presentation1.pptx
@@ -2,10 +2,10 @@
 <file path=ppt/presentation.xml><?xml version="1.0" encoding="utf-8"?>
 <p:presentation xmlns:a="http://schemas.openxmlformats.org/drawingml/2006/main" xmlns:r="http://schemas.openxmlformats.org/officeDocument/2006/relationships" xmlns:p="http://schemas.openxmlformats.org/presentationml/2006/main" saveSubsetFonts="1">
   <p:sldMasterIdLst>
-    <p:sldMasterId id="2147483648" r:id="R1ff6bacf5c4543a1"/>
+    <p:sldMasterId id="2147483648" r:id="Ra0198551c64e4660"/>
   </p:sldMasterIdLst>
   <p:sldIdLst>
-    <p:sldId id="256" r:id="R7162ce61d0f240d7"/>
+    <p:sldId id="256" r:id="R5407b29f6c1745bc"/>
   </p:sldIdLst>
   <p:sldSz cx="12192000" cy="6858000"/>
   <p:notesSz cx="6858000" cy="9144000"/>
@@ -2652,17 +2652,17 @@
   </p:cSld>
   <p:clrMap bg1="lt1" tx1="dk1" bg2="lt2" tx2="dk2" accent1="accent1" accent2="accent2" accent3="accent3" accent4="accent4" accent5="accent5" accent6="accent6" hlink="hlink" folHlink="folHlink"/>
   <p:sldLayoutIdLst>
-    <p:sldLayoutId id="2147483649" r:id="R1313adc210e347d1"/>
-    <p:sldLayoutId id="2147483650" r:id="Re145de4d36a947d8"/>
-    <p:sldLayoutId id="2147483651" r:id="R71ffcbe770234152"/>
-    <p:sldLayoutId id="2147483652" r:id="R0783046668774e8d"/>
-    <p:sldLayoutId id="2147483653" r:id="Re242568107b7488b"/>
-    <p:sldLayoutId id="2147483654" r:id="Rad07e3404da44bef"/>
-    <p:sldLayoutId id="2147483655" r:id="R31a176adcc534817"/>
-    <p:sldLayoutId id="2147483656" r:id="R60a06a9c000a4f53"/>
-    <p:sldLayoutId id="2147483657" r:id="R1376edd3e4c949ad"/>
-    <p:sldLayoutId id="2147483658" r:id="R401b686025574ff1"/>
-    <p:sldLayoutId id="2147483659" r:id="R6b61ad3ac7604ba8"/>
+    <p:sldLayoutId id="2147483649" r:id="R0b53e279895c44fe"/>
+    <p:sldLayoutId id="2147483650" r:id="R1ac0170e836c4008"/>
+    <p:sldLayoutId id="2147483651" r:id="R1bdf9ab2d604413c"/>
+    <p:sldLayoutId id="2147483652" r:id="Re879815b9809478a"/>
+    <p:sldLayoutId id="2147483653" r:id="Re4fe50f2237e460f"/>
+    <p:sldLayoutId id="2147483654" r:id="Rb1723895d63946de"/>
+    <p:sldLayoutId id="2147483655" r:id="R2769d646fed14575"/>
+    <p:sldLayoutId id="2147483656" r:id="R9647034c261c4141"/>
+    <p:sldLayoutId id="2147483657" r:id="R68f3df87c4374879"/>
+    <p:sldLayoutId id="2147483658" r:id="R38a1589927824189"/>
+    <p:sldLayoutId id="2147483659" r:id="R258dd7d5f1e747e8"/>
   </p:sldLayoutIdLst>
   <p:txStyles>
     <p:titleStyle>
@@ -3279,7 +3279,7 @@
             </p:xfrm>
             <a:graphic>
               <a:graphicData uri="http://schemas.microsoft.com/office/webextensions/webextension/2010/11">
-                <we:webextensionref xmlns:we="http://schemas.microsoft.com/office/webextensions/webextension/2010/11" xmlns:r="http://schemas.openxmlformats.org/officeDocument/2006/relationships" r:id="Rd275716e9cf948d8"/>
+                <we:webextensionref xmlns:we="http://schemas.microsoft.com/office/webextensions/webextension/2010/11" xmlns:r="http://schemas.openxmlformats.org/officeDocument/2006/relationships" r:id="R2c3dc01758524619"/>
               </a:graphicData>
             </a:graphic>
           </p:graphicFrame>
@@ -3291,7 +3291,7 @@
               <p:cNvPicPr/>
             </p:nvPicPr>
             <p:blipFill>
-              <a:blip xmlns:r="http://schemas.openxmlformats.org/officeDocument/2006/relationships" r:embed="R8718cbcdf6ac49a6"/>
+              <a:blip xmlns:r="http://schemas.openxmlformats.org/officeDocument/2006/relationships" r:embed="Rd6242ea5ee334f4a"/>
               <a:stretch>
                 <a:fillRect/>
               </a:stretch>
@@ -3322,11 +3322,11 @@
 </file>
 
 <file path=ppt/slides/udata/data.xml><?xml version="1.0" encoding="utf-8"?>
-<we:webextension xmlns:r="http://schemas.openxmlformats.org/officeDocument/2006/relationships" xmlns:we="http://schemas.microsoft.com/office/webextensions/webextension/2010/11" id="{02fe7e2b-b617-4faf-aa04-a0100be73428}">
+<we:webextension xmlns:r="http://schemas.openxmlformats.org/officeDocument/2006/relationships" xmlns:we="http://schemas.microsoft.com/office/webextensions/webextension/2010/11" id="{ae5f6c37-d1c4-4174-9542-f56989ca6323}">
   <we:reference id="695691ef-8f6e-4dc4-b6b9-c5a5f44499f7" version="1.0.0.0" store="developer" storeType="Registry"/>
   <we:alternateReferences/>
   <we:properties/>
   <we:bindings/>
-  <we:snapshot xmlns:r="http://schemas.openxmlformats.org/officeDocument/2006/relationships" r:embed="R8718cbcdf6ac49a6"/>
+  <we:snapshot xmlns:r="http://schemas.openxmlformats.org/officeDocument/2006/relationships" r:embed="Rd6242ea5ee334f4a"/>
 </we:webextension>
 </file>
</xml_diff>

<commit_message>
did some things to make bar graphs scales better to the starting window size
</commit_message>
<xml_diff>
--- a/PowerPoll/PowerPoll/bin/Debug/Presentation1.pptx
+++ b/PowerPoll/PowerPoll/bin/Debug/Presentation1.pptx
@@ -2,10 +2,10 @@
 <file path=ppt/presentation.xml><?xml version="1.0" encoding="utf-8"?>
 <p:presentation xmlns:a="http://schemas.openxmlformats.org/drawingml/2006/main" xmlns:r="http://schemas.openxmlformats.org/officeDocument/2006/relationships" xmlns:p="http://schemas.openxmlformats.org/presentationml/2006/main" saveSubsetFonts="1">
   <p:sldMasterIdLst>
-    <p:sldMasterId id="2147483648" r:id="Ra0198551c64e4660"/>
+    <p:sldMasterId id="2147483648" r:id="R0b5f17dfa8cb4468"/>
   </p:sldMasterIdLst>
   <p:sldIdLst>
-    <p:sldId id="256" r:id="R5407b29f6c1745bc"/>
+    <p:sldId id="256" r:id="Ree3b7c5a94e1461b"/>
   </p:sldIdLst>
   <p:sldSz cx="12192000" cy="6858000"/>
   <p:notesSz cx="6858000" cy="9144000"/>
@@ -2652,17 +2652,17 @@
   </p:cSld>
   <p:clrMap bg1="lt1" tx1="dk1" bg2="lt2" tx2="dk2" accent1="accent1" accent2="accent2" accent3="accent3" accent4="accent4" accent5="accent5" accent6="accent6" hlink="hlink" folHlink="folHlink"/>
   <p:sldLayoutIdLst>
-    <p:sldLayoutId id="2147483649" r:id="R0b53e279895c44fe"/>
-    <p:sldLayoutId id="2147483650" r:id="R1ac0170e836c4008"/>
-    <p:sldLayoutId id="2147483651" r:id="R1bdf9ab2d604413c"/>
-    <p:sldLayoutId id="2147483652" r:id="Re879815b9809478a"/>
-    <p:sldLayoutId id="2147483653" r:id="Re4fe50f2237e460f"/>
-    <p:sldLayoutId id="2147483654" r:id="Rb1723895d63946de"/>
-    <p:sldLayoutId id="2147483655" r:id="R2769d646fed14575"/>
-    <p:sldLayoutId id="2147483656" r:id="R9647034c261c4141"/>
-    <p:sldLayoutId id="2147483657" r:id="R68f3df87c4374879"/>
-    <p:sldLayoutId id="2147483658" r:id="R38a1589927824189"/>
-    <p:sldLayoutId id="2147483659" r:id="R258dd7d5f1e747e8"/>
+    <p:sldLayoutId id="2147483649" r:id="R4895ed68b88b4edd"/>
+    <p:sldLayoutId id="2147483650" r:id="Rf11560db1a3a42a3"/>
+    <p:sldLayoutId id="2147483651" r:id="Rfd52e56dc5c74dbf"/>
+    <p:sldLayoutId id="2147483652" r:id="R4ab0a9aae1db470a"/>
+    <p:sldLayoutId id="2147483653" r:id="Rc7131e1110b04e10"/>
+    <p:sldLayoutId id="2147483654" r:id="Rb1192a8e63e344a6"/>
+    <p:sldLayoutId id="2147483655" r:id="R2404cb114202480d"/>
+    <p:sldLayoutId id="2147483656" r:id="Rde675a138a394e6a"/>
+    <p:sldLayoutId id="2147483657" r:id="Rf37e8d1dc98a426f"/>
+    <p:sldLayoutId id="2147483658" r:id="R75b3ebd472e240dc"/>
+    <p:sldLayoutId id="2147483659" r:id="Rb330f79e45614267"/>
   </p:sldLayoutIdLst>
   <p:txStyles>
     <p:titleStyle>
@@ -3275,11 +3275,11 @@
             </p:nvGraphicFramePr>
             <p:xfrm>
               <a:off x="0" y="0"/>
-              <a:ext cx="5715000" cy="5143500"/>
+              <a:ext cx="5715000" cy="5000625"/>
             </p:xfrm>
             <a:graphic>
               <a:graphicData uri="http://schemas.microsoft.com/office/webextensions/webextension/2010/11">
-                <we:webextensionref xmlns:we="http://schemas.microsoft.com/office/webextensions/webextension/2010/11" xmlns:r="http://schemas.openxmlformats.org/officeDocument/2006/relationships" r:id="R2c3dc01758524619"/>
+                <we:webextensionref xmlns:we="http://schemas.microsoft.com/office/webextensions/webextension/2010/11" xmlns:r="http://schemas.openxmlformats.org/officeDocument/2006/relationships" r:id="R49f5158b0eff4f6a"/>
               </a:graphicData>
             </a:graphic>
           </p:graphicFrame>
@@ -3291,7 +3291,7 @@
               <p:cNvPicPr/>
             </p:nvPicPr>
             <p:blipFill>
-              <a:blip xmlns:r="http://schemas.openxmlformats.org/officeDocument/2006/relationships" r:embed="Rd6242ea5ee334f4a"/>
+              <a:blip xmlns:r="http://schemas.openxmlformats.org/officeDocument/2006/relationships" r:embed="R471de333416e4fc9"/>
               <a:stretch>
                 <a:fillRect/>
               </a:stretch>
@@ -3299,7 +3299,7 @@
             <p:spPr>
               <a:xfrm>
                 <a:off x="0" y="0"/>
-                <a:ext cx="5715000" cy="5143500"/>
+                <a:ext cx="5715000" cy="5000625"/>
               </a:xfrm>
               <a:prstGeom prst="rect">
                 <a:avLst/>
@@ -3322,11 +3322,11 @@
 </file>
 
 <file path=ppt/slides/udata/data.xml><?xml version="1.0" encoding="utf-8"?>
-<we:webextension xmlns:r="http://schemas.openxmlformats.org/officeDocument/2006/relationships" xmlns:we="http://schemas.microsoft.com/office/webextensions/webextension/2010/11" id="{ae5f6c37-d1c4-4174-9542-f56989ca6323}">
+<we:webextension xmlns:r="http://schemas.openxmlformats.org/officeDocument/2006/relationships" xmlns:we="http://schemas.microsoft.com/office/webextensions/webextension/2010/11" id="{f30358e4-77db-400b-8d49-c4ef7c029a02}">
   <we:reference id="695691ef-8f6e-4dc4-b6b9-c5a5f44499f7" version="1.0.0.0" store="developer" storeType="Registry"/>
   <we:alternateReferences/>
   <we:properties/>
   <we:bindings/>
-  <we:snapshot xmlns:r="http://schemas.openxmlformats.org/officeDocument/2006/relationships" r:embed="Rd6242ea5ee334f4a"/>
+  <we:snapshot xmlns:r="http://schemas.openxmlformats.org/officeDocument/2006/relationships" r:embed="R471de333416e4fc9"/>
 </we:webextension>
 </file>
</xml_diff>

<commit_message>
a few minor visual changes
</commit_message>
<xml_diff>
--- a/PowerPoll/PowerPoll/bin/Debug/Presentation1.pptx
+++ b/PowerPoll/PowerPoll/bin/Debug/Presentation1.pptx
@@ -2,10 +2,10 @@
 <file path=ppt/presentation.xml><?xml version="1.0" encoding="utf-8"?>
 <p:presentation xmlns:a="http://schemas.openxmlformats.org/drawingml/2006/main" xmlns:r="http://schemas.openxmlformats.org/officeDocument/2006/relationships" xmlns:p="http://schemas.openxmlformats.org/presentationml/2006/main" saveSubsetFonts="1">
   <p:sldMasterIdLst>
-    <p:sldMasterId id="2147483648" r:id="R0b5f17dfa8cb4468"/>
+    <p:sldMasterId id="2147483648" r:id="R338399dc76074a7f"/>
   </p:sldMasterIdLst>
   <p:sldIdLst>
-    <p:sldId id="256" r:id="Ree3b7c5a94e1461b"/>
+    <p:sldId id="256" r:id="R369ffdd2c38c47a7"/>
   </p:sldIdLst>
   <p:sldSz cx="12192000" cy="6858000"/>
   <p:notesSz cx="6858000" cy="9144000"/>
@@ -2652,17 +2652,17 @@
   </p:cSld>
   <p:clrMap bg1="lt1" tx1="dk1" bg2="lt2" tx2="dk2" accent1="accent1" accent2="accent2" accent3="accent3" accent4="accent4" accent5="accent5" accent6="accent6" hlink="hlink" folHlink="folHlink"/>
   <p:sldLayoutIdLst>
-    <p:sldLayoutId id="2147483649" r:id="R4895ed68b88b4edd"/>
-    <p:sldLayoutId id="2147483650" r:id="Rf11560db1a3a42a3"/>
-    <p:sldLayoutId id="2147483651" r:id="Rfd52e56dc5c74dbf"/>
-    <p:sldLayoutId id="2147483652" r:id="R4ab0a9aae1db470a"/>
-    <p:sldLayoutId id="2147483653" r:id="Rc7131e1110b04e10"/>
-    <p:sldLayoutId id="2147483654" r:id="Rb1192a8e63e344a6"/>
-    <p:sldLayoutId id="2147483655" r:id="R2404cb114202480d"/>
-    <p:sldLayoutId id="2147483656" r:id="Rde675a138a394e6a"/>
-    <p:sldLayoutId id="2147483657" r:id="Rf37e8d1dc98a426f"/>
-    <p:sldLayoutId id="2147483658" r:id="R75b3ebd472e240dc"/>
-    <p:sldLayoutId id="2147483659" r:id="Rb330f79e45614267"/>
+    <p:sldLayoutId id="2147483649" r:id="R9f305c3b1ac14d0c"/>
+    <p:sldLayoutId id="2147483650" r:id="R77e8fb66978043f5"/>
+    <p:sldLayoutId id="2147483651" r:id="Rd1bebe74ad884fa8"/>
+    <p:sldLayoutId id="2147483652" r:id="R642ac1101f154862"/>
+    <p:sldLayoutId id="2147483653" r:id="Rdde057b73fe24272"/>
+    <p:sldLayoutId id="2147483654" r:id="Rfaf4d3e6c7214601"/>
+    <p:sldLayoutId id="2147483655" r:id="Rdf48e56d26a04d85"/>
+    <p:sldLayoutId id="2147483656" r:id="R0600d0fb4c69407c"/>
+    <p:sldLayoutId id="2147483657" r:id="Rae22efbc3e014b25"/>
+    <p:sldLayoutId id="2147483658" r:id="R5e088cdce0b548b5"/>
+    <p:sldLayoutId id="2147483659" r:id="R486bac9fe24b4287"/>
   </p:sldLayoutIdLst>
   <p:txStyles>
     <p:titleStyle>
@@ -3279,7 +3279,7 @@
             </p:xfrm>
             <a:graphic>
               <a:graphicData uri="http://schemas.microsoft.com/office/webextensions/webextension/2010/11">
-                <we:webextensionref xmlns:we="http://schemas.microsoft.com/office/webextensions/webextension/2010/11" xmlns:r="http://schemas.openxmlformats.org/officeDocument/2006/relationships" r:id="R49f5158b0eff4f6a"/>
+                <we:webextensionref xmlns:we="http://schemas.microsoft.com/office/webextensions/webextension/2010/11" xmlns:r="http://schemas.openxmlformats.org/officeDocument/2006/relationships" r:id="R7187fe2fb07d4bd8"/>
               </a:graphicData>
             </a:graphic>
           </p:graphicFrame>
@@ -3291,7 +3291,7 @@
               <p:cNvPicPr/>
             </p:nvPicPr>
             <p:blipFill>
-              <a:blip xmlns:r="http://schemas.openxmlformats.org/officeDocument/2006/relationships" r:embed="R471de333416e4fc9"/>
+              <a:blip xmlns:r="http://schemas.openxmlformats.org/officeDocument/2006/relationships" r:embed="Rbddc1a59fda64c97"/>
               <a:stretch>
                 <a:fillRect/>
               </a:stretch>
@@ -3322,11 +3322,11 @@
 </file>
 
 <file path=ppt/slides/udata/data.xml><?xml version="1.0" encoding="utf-8"?>
-<we:webextension xmlns:r="http://schemas.openxmlformats.org/officeDocument/2006/relationships" xmlns:we="http://schemas.microsoft.com/office/webextensions/webextension/2010/11" id="{f30358e4-77db-400b-8d49-c4ef7c029a02}">
+<we:webextension xmlns:r="http://schemas.openxmlformats.org/officeDocument/2006/relationships" xmlns:we="http://schemas.microsoft.com/office/webextensions/webextension/2010/11" id="{cd7bf3b7-e303-4e27-95fc-99bc464d5401}">
   <we:reference id="695691ef-8f6e-4dc4-b6b9-c5a5f44499f7" version="1.0.0.0" store="developer" storeType="Registry"/>
   <we:alternateReferences/>
   <we:properties/>
   <we:bindings/>
-  <we:snapshot xmlns:r="http://schemas.openxmlformats.org/officeDocument/2006/relationships" r:embed="R471de333416e4fc9"/>
+  <we:snapshot xmlns:r="http://schemas.openxmlformats.org/officeDocument/2006/relationships" r:embed="Rbddc1a59fda64c97"/>
 </we:webextension>
 </file>
</xml_diff>

<commit_message>
I think I fixed the bug reported by MS Office Store, it was the css of the pie chart
</commit_message>
<xml_diff>
--- a/PowerPoll/PowerPoll/bin/Debug/Presentation1.pptx
+++ b/PowerPoll/PowerPoll/bin/Debug/Presentation1.pptx
@@ -2,10 +2,10 @@
 <file path=ppt/presentation.xml><?xml version="1.0" encoding="utf-8"?>
 <p:presentation xmlns:a="http://schemas.openxmlformats.org/drawingml/2006/main" xmlns:r="http://schemas.openxmlformats.org/officeDocument/2006/relationships" xmlns:p="http://schemas.openxmlformats.org/presentationml/2006/main" saveSubsetFonts="1">
   <p:sldMasterIdLst>
-    <p:sldMasterId id="2147483648" r:id="R338399dc76074a7f"/>
+    <p:sldMasterId id="2147483648" r:id="Rd72c7daa1664488b"/>
   </p:sldMasterIdLst>
   <p:sldIdLst>
-    <p:sldId id="256" r:id="R369ffdd2c38c47a7"/>
+    <p:sldId id="256" r:id="Rc07402072120497d"/>
   </p:sldIdLst>
   <p:sldSz cx="12192000" cy="6858000"/>
   <p:notesSz cx="6858000" cy="9144000"/>
@@ -2652,17 +2652,17 @@
   </p:cSld>
   <p:clrMap bg1="lt1" tx1="dk1" bg2="lt2" tx2="dk2" accent1="accent1" accent2="accent2" accent3="accent3" accent4="accent4" accent5="accent5" accent6="accent6" hlink="hlink" folHlink="folHlink"/>
   <p:sldLayoutIdLst>
-    <p:sldLayoutId id="2147483649" r:id="R9f305c3b1ac14d0c"/>
-    <p:sldLayoutId id="2147483650" r:id="R77e8fb66978043f5"/>
-    <p:sldLayoutId id="2147483651" r:id="Rd1bebe74ad884fa8"/>
-    <p:sldLayoutId id="2147483652" r:id="R642ac1101f154862"/>
-    <p:sldLayoutId id="2147483653" r:id="Rdde057b73fe24272"/>
-    <p:sldLayoutId id="2147483654" r:id="Rfaf4d3e6c7214601"/>
-    <p:sldLayoutId id="2147483655" r:id="Rdf48e56d26a04d85"/>
-    <p:sldLayoutId id="2147483656" r:id="R0600d0fb4c69407c"/>
-    <p:sldLayoutId id="2147483657" r:id="Rae22efbc3e014b25"/>
-    <p:sldLayoutId id="2147483658" r:id="R5e088cdce0b548b5"/>
-    <p:sldLayoutId id="2147483659" r:id="R486bac9fe24b4287"/>
+    <p:sldLayoutId id="2147483649" r:id="Rbf5dd5bcd7fb4001"/>
+    <p:sldLayoutId id="2147483650" r:id="Ra2083459616f4493"/>
+    <p:sldLayoutId id="2147483651" r:id="Ra4160617e5d14ba6"/>
+    <p:sldLayoutId id="2147483652" r:id="R0c425e480c464d31"/>
+    <p:sldLayoutId id="2147483653" r:id="R224c32cfcf384313"/>
+    <p:sldLayoutId id="2147483654" r:id="Rb15d2872627949d1"/>
+    <p:sldLayoutId id="2147483655" r:id="Rb176b81791164677"/>
+    <p:sldLayoutId id="2147483656" r:id="Rfde4e012ca9b486f"/>
+    <p:sldLayoutId id="2147483657" r:id="R0261cff4a1e04a36"/>
+    <p:sldLayoutId id="2147483658" r:id="R670bd243cae14ef9"/>
+    <p:sldLayoutId id="2147483659" r:id="Rc9db7f84368d4555"/>
   </p:sldLayoutIdLst>
   <p:txStyles>
     <p:titleStyle>
@@ -3279,7 +3279,7 @@
             </p:xfrm>
             <a:graphic>
               <a:graphicData uri="http://schemas.microsoft.com/office/webextensions/webextension/2010/11">
-                <we:webextensionref xmlns:we="http://schemas.microsoft.com/office/webextensions/webextension/2010/11" xmlns:r="http://schemas.openxmlformats.org/officeDocument/2006/relationships" r:id="R7187fe2fb07d4bd8"/>
+                <we:webextensionref xmlns:we="http://schemas.microsoft.com/office/webextensions/webextension/2010/11" xmlns:r="http://schemas.openxmlformats.org/officeDocument/2006/relationships" r:id="Rec45943006e747fe"/>
               </a:graphicData>
             </a:graphic>
           </p:graphicFrame>
@@ -3291,7 +3291,7 @@
               <p:cNvPicPr/>
             </p:nvPicPr>
             <p:blipFill>
-              <a:blip xmlns:r="http://schemas.openxmlformats.org/officeDocument/2006/relationships" r:embed="Rbddc1a59fda64c97"/>
+              <a:blip xmlns:r="http://schemas.openxmlformats.org/officeDocument/2006/relationships" r:embed="Rb999571480c94b93"/>
               <a:stretch>
                 <a:fillRect/>
               </a:stretch>
@@ -3322,11 +3322,11 @@
 </file>
 
 <file path=ppt/slides/udata/data.xml><?xml version="1.0" encoding="utf-8"?>
-<we:webextension xmlns:r="http://schemas.openxmlformats.org/officeDocument/2006/relationships" xmlns:we="http://schemas.microsoft.com/office/webextensions/webextension/2010/11" id="{cd7bf3b7-e303-4e27-95fc-99bc464d5401}">
+<we:webextension xmlns:r="http://schemas.openxmlformats.org/officeDocument/2006/relationships" xmlns:we="http://schemas.microsoft.com/office/webextensions/webextension/2010/11" id="{46864175-d13f-44c5-862f-f261be75698c}">
   <we:reference id="695691ef-8f6e-4dc4-b6b9-c5a5f44499f7" version="1.0.0.0" store="developer" storeType="Registry"/>
   <we:alternateReferences/>
   <we:properties/>
   <we:bindings/>
-  <we:snapshot xmlns:r="http://schemas.openxmlformats.org/officeDocument/2006/relationships" r:embed="Rbddc1a59fda64c97"/>
+  <we:snapshot xmlns:r="http://schemas.openxmlformats.org/officeDocument/2006/relationships" r:embed="Rb999571480c94b93"/>
 </we:webextension>
 </file>
</xml_diff>

<commit_message>
some testing set up
</commit_message>
<xml_diff>
--- a/PowerPoll/PowerPoll/bin/Debug/Presentation1.pptx
+++ b/PowerPoll/PowerPoll/bin/Debug/Presentation1.pptx
@@ -2,10 +2,10 @@
 <file path=ppt/presentation.xml><?xml version="1.0" encoding="utf-8"?>
 <p:presentation xmlns:a="http://schemas.openxmlformats.org/drawingml/2006/main" xmlns:r="http://schemas.openxmlformats.org/officeDocument/2006/relationships" xmlns:p="http://schemas.openxmlformats.org/presentationml/2006/main" saveSubsetFonts="1">
   <p:sldMasterIdLst>
-    <p:sldMasterId id="2147483648" r:id="Rd72c7daa1664488b"/>
+    <p:sldMasterId id="2147483648" r:id="R5e6c3376da7041f7"/>
   </p:sldMasterIdLst>
   <p:sldIdLst>
-    <p:sldId id="256" r:id="Rc07402072120497d"/>
+    <p:sldId id="256" r:id="Rcdef9deca5a04a3d"/>
   </p:sldIdLst>
   <p:sldSz cx="12192000" cy="6858000"/>
   <p:notesSz cx="6858000" cy="9144000"/>
@@ -2652,17 +2652,17 @@
   </p:cSld>
   <p:clrMap bg1="lt1" tx1="dk1" bg2="lt2" tx2="dk2" accent1="accent1" accent2="accent2" accent3="accent3" accent4="accent4" accent5="accent5" accent6="accent6" hlink="hlink" folHlink="folHlink"/>
   <p:sldLayoutIdLst>
-    <p:sldLayoutId id="2147483649" r:id="Rbf5dd5bcd7fb4001"/>
-    <p:sldLayoutId id="2147483650" r:id="Ra2083459616f4493"/>
-    <p:sldLayoutId id="2147483651" r:id="Ra4160617e5d14ba6"/>
-    <p:sldLayoutId id="2147483652" r:id="R0c425e480c464d31"/>
-    <p:sldLayoutId id="2147483653" r:id="R224c32cfcf384313"/>
-    <p:sldLayoutId id="2147483654" r:id="Rb15d2872627949d1"/>
-    <p:sldLayoutId id="2147483655" r:id="Rb176b81791164677"/>
-    <p:sldLayoutId id="2147483656" r:id="Rfde4e012ca9b486f"/>
-    <p:sldLayoutId id="2147483657" r:id="R0261cff4a1e04a36"/>
-    <p:sldLayoutId id="2147483658" r:id="R670bd243cae14ef9"/>
-    <p:sldLayoutId id="2147483659" r:id="Rc9db7f84368d4555"/>
+    <p:sldLayoutId id="2147483649" r:id="Rebc1d58bd67749a1"/>
+    <p:sldLayoutId id="2147483650" r:id="R15dc4133cd8e4020"/>
+    <p:sldLayoutId id="2147483651" r:id="Ra95a998b1cc34633"/>
+    <p:sldLayoutId id="2147483652" r:id="R48d0ca036e124289"/>
+    <p:sldLayoutId id="2147483653" r:id="R03db8c4aac4641b7"/>
+    <p:sldLayoutId id="2147483654" r:id="R149ad1d2a0114705"/>
+    <p:sldLayoutId id="2147483655" r:id="Reb0d1622f5284c08"/>
+    <p:sldLayoutId id="2147483656" r:id="Rcdd0a18d8e344865"/>
+    <p:sldLayoutId id="2147483657" r:id="Reaaabd789aea44e9"/>
+    <p:sldLayoutId id="2147483658" r:id="Rc93a369c5c914bc6"/>
+    <p:sldLayoutId id="2147483659" r:id="R96c3bf0316304ecd"/>
   </p:sldLayoutIdLst>
   <p:txStyles>
     <p:titleStyle>
@@ -3279,7 +3279,7 @@
             </p:xfrm>
             <a:graphic>
               <a:graphicData uri="http://schemas.microsoft.com/office/webextensions/webextension/2010/11">
-                <we:webextensionref xmlns:we="http://schemas.microsoft.com/office/webextensions/webextension/2010/11" xmlns:r="http://schemas.openxmlformats.org/officeDocument/2006/relationships" r:id="Rec45943006e747fe"/>
+                <we:webextensionref xmlns:we="http://schemas.microsoft.com/office/webextensions/webextension/2010/11" xmlns:r="http://schemas.openxmlformats.org/officeDocument/2006/relationships" r:id="R925144a14d764b12"/>
               </a:graphicData>
             </a:graphic>
           </p:graphicFrame>
@@ -3291,7 +3291,7 @@
               <p:cNvPicPr/>
             </p:nvPicPr>
             <p:blipFill>
-              <a:blip xmlns:r="http://schemas.openxmlformats.org/officeDocument/2006/relationships" r:embed="Rb999571480c94b93"/>
+              <a:blip xmlns:r="http://schemas.openxmlformats.org/officeDocument/2006/relationships" r:embed="Rec1c3ed0d80a46a7"/>
               <a:stretch>
                 <a:fillRect/>
               </a:stretch>
@@ -3322,11 +3322,11 @@
 </file>
 
 <file path=ppt/slides/udata/data.xml><?xml version="1.0" encoding="utf-8"?>
-<we:webextension xmlns:r="http://schemas.openxmlformats.org/officeDocument/2006/relationships" xmlns:we="http://schemas.microsoft.com/office/webextensions/webextension/2010/11" id="{46864175-d13f-44c5-862f-f261be75698c}">
+<we:webextension xmlns:r="http://schemas.openxmlformats.org/officeDocument/2006/relationships" xmlns:we="http://schemas.microsoft.com/office/webextensions/webextension/2010/11" id="{310c7a4b-75da-486c-8c5e-82d5df48a072}">
   <we:reference id="695691ef-8f6e-4dc4-b6b9-c5a5f44499f7" version="1.0.0.0" store="developer" storeType="Registry"/>
   <we:alternateReferences/>
   <we:properties/>
   <we:bindings/>
-  <we:snapshot xmlns:r="http://schemas.openxmlformats.org/officeDocument/2006/relationships" r:embed="Rb999571480c94b93"/>
+  <we:snapshot xmlns:r="http://schemas.openxmlformats.org/officeDocument/2006/relationships" r:embed="Rec1c3ed0d80a46a7"/>
 </we:webextension>
 </file>
</xml_diff>

<commit_message>
Added boundaries to timers, anything exceeding 30 will equate to 30 mintues and anything less than 1 will equate to 1 minute
</commit_message>
<xml_diff>
--- a/PowerPoll/PowerPoll/bin/Debug/Presentation1.pptx
+++ b/PowerPoll/PowerPoll/bin/Debug/Presentation1.pptx
@@ -2,10 +2,10 @@
 <file path=ppt/presentation.xml><?xml version="1.0" encoding="utf-8"?>
 <p:presentation xmlns:a="http://schemas.openxmlformats.org/drawingml/2006/main" xmlns:r="http://schemas.openxmlformats.org/officeDocument/2006/relationships" xmlns:p="http://schemas.openxmlformats.org/presentationml/2006/main" saveSubsetFonts="1">
   <p:sldMasterIdLst>
-    <p:sldMasterId id="2147483648" r:id="R4942ab731d084bdf"/>
+    <p:sldMasterId id="2147483648" r:id="R09e310e414dc46bd"/>
   </p:sldMasterIdLst>
   <p:sldIdLst>
-    <p:sldId id="256" r:id="Re77851ec60384a5c"/>
+    <p:sldId id="256" r:id="Rf09d43cf83d24810"/>
   </p:sldIdLst>
   <p:sldSz cx="12192000" cy="6858000"/>
   <p:notesSz cx="6858000" cy="9144000"/>
@@ -2652,17 +2652,17 @@
   </p:cSld>
   <p:clrMap bg1="lt1" tx1="dk1" bg2="lt2" tx2="dk2" accent1="accent1" accent2="accent2" accent3="accent3" accent4="accent4" accent5="accent5" accent6="accent6" hlink="hlink" folHlink="folHlink"/>
   <p:sldLayoutIdLst>
-    <p:sldLayoutId id="2147483649" r:id="R55a026e85bf24d9f"/>
-    <p:sldLayoutId id="2147483650" r:id="Rb8c0c0e9ded34dba"/>
-    <p:sldLayoutId id="2147483651" r:id="Rea24d4e89f7b497a"/>
-    <p:sldLayoutId id="2147483652" r:id="Rcb4e357b37664968"/>
-    <p:sldLayoutId id="2147483653" r:id="Radb67cf3fd654408"/>
-    <p:sldLayoutId id="2147483654" r:id="Rf77faa883aea4e4d"/>
-    <p:sldLayoutId id="2147483655" r:id="R6d887feafc6649e4"/>
-    <p:sldLayoutId id="2147483656" r:id="R9af9678cbe94418f"/>
-    <p:sldLayoutId id="2147483657" r:id="R3a035915e8e94562"/>
-    <p:sldLayoutId id="2147483658" r:id="R7100181eb9ab41c8"/>
-    <p:sldLayoutId id="2147483659" r:id="Rfddf757b427044bf"/>
+    <p:sldLayoutId id="2147483649" r:id="R00e44b7eedab4103"/>
+    <p:sldLayoutId id="2147483650" r:id="R96b7ab38a02f480a"/>
+    <p:sldLayoutId id="2147483651" r:id="Rb9228ca8e5a2491c"/>
+    <p:sldLayoutId id="2147483652" r:id="Ra7f99e473ac24166"/>
+    <p:sldLayoutId id="2147483653" r:id="R01f335ad4c51444b"/>
+    <p:sldLayoutId id="2147483654" r:id="R420a57a1ed9a44dd"/>
+    <p:sldLayoutId id="2147483655" r:id="R4557879f422a4576"/>
+    <p:sldLayoutId id="2147483656" r:id="R547535dd0bb344fd"/>
+    <p:sldLayoutId id="2147483657" r:id="R1e0bb99c80a14a02"/>
+    <p:sldLayoutId id="2147483658" r:id="R7f679dba29194af2"/>
+    <p:sldLayoutId id="2147483659" r:id="R910ab7d8ab2e4033"/>
   </p:sldLayoutIdLst>
   <p:txStyles>
     <p:titleStyle>
@@ -3279,7 +3279,7 @@
             </p:xfrm>
             <a:graphic>
               <a:graphicData uri="http://schemas.microsoft.com/office/webextensions/webextension/2010/11">
-                <we:webextensionref xmlns:we="http://schemas.microsoft.com/office/webextensions/webextension/2010/11" xmlns:r="http://schemas.openxmlformats.org/officeDocument/2006/relationships" r:id="R9fe42b131aee49b4"/>
+                <we:webextensionref xmlns:we="http://schemas.microsoft.com/office/webextensions/webextension/2010/11" xmlns:r="http://schemas.openxmlformats.org/officeDocument/2006/relationships" r:id="R97dcb41b46e84c54"/>
               </a:graphicData>
             </a:graphic>
           </p:graphicFrame>
@@ -3291,7 +3291,7 @@
               <p:cNvPicPr/>
             </p:nvPicPr>
             <p:blipFill>
-              <a:blip xmlns:r="http://schemas.openxmlformats.org/officeDocument/2006/relationships" r:embed="R2365eb24df5f4765"/>
+              <a:blip xmlns:r="http://schemas.openxmlformats.org/officeDocument/2006/relationships" r:embed="R99d2e14e441b44ba"/>
               <a:stretch>
                 <a:fillRect/>
               </a:stretch>
@@ -3322,11 +3322,11 @@
 </file>
 
 <file path=ppt/slides/udata/data.xml><?xml version="1.0" encoding="utf-8"?>
-<we:webextension xmlns:r="http://schemas.openxmlformats.org/officeDocument/2006/relationships" xmlns:we="http://schemas.microsoft.com/office/webextensions/webextension/2010/11" id="{dbbe26ed-e8f8-416f-968f-8f0607caf761}">
+<we:webextension xmlns:r="http://schemas.openxmlformats.org/officeDocument/2006/relationships" xmlns:we="http://schemas.microsoft.com/office/webextensions/webextension/2010/11" id="{b6a4104b-d20c-42f4-92a4-500b9531a3b1}">
   <we:reference id="695691ef-8f6e-4dc4-b6b9-c5a5f44499f7" version="1.0.0.0" store="developer" storeType="Registry"/>
   <we:alternateReferences/>
   <we:properties/>
   <we:bindings/>
-  <we:snapshot xmlns:r="http://schemas.openxmlformats.org/officeDocument/2006/relationships" r:embed="R2365eb24df5f4765"/>
+  <we:snapshot xmlns:r="http://schemas.openxmlformats.org/officeDocument/2006/relationships" r:embed="R99d2e14e441b44ba"/>
 </we:webextension>
 </file>
</xml_diff>

<commit_message>
Added boundaries to timers, anything exceeding 30 mintes will equate to 30 minutes and anything less than 1 minute will equate to 1 minute
</commit_message>
<xml_diff>
--- a/PowerPoll/PowerPoll/bin/Debug/Presentation1.pptx
+++ b/PowerPoll/PowerPoll/bin/Debug/Presentation1.pptx
@@ -2,10 +2,10 @@
 <file path=ppt/presentation.xml><?xml version="1.0" encoding="utf-8"?>
 <p:presentation xmlns:a="http://schemas.openxmlformats.org/drawingml/2006/main" xmlns:r="http://schemas.openxmlformats.org/officeDocument/2006/relationships" xmlns:p="http://schemas.openxmlformats.org/presentationml/2006/main" saveSubsetFonts="1">
   <p:sldMasterIdLst>
-    <p:sldMasterId id="2147483648" r:id="R09e310e414dc46bd"/>
+    <p:sldMasterId id="2147483648" r:id="Rb980210a609641f7"/>
   </p:sldMasterIdLst>
   <p:sldIdLst>
-    <p:sldId id="256" r:id="Rf09d43cf83d24810"/>
+    <p:sldId id="256" r:id="R13b5ab47f6b243fb"/>
   </p:sldIdLst>
   <p:sldSz cx="12192000" cy="6858000"/>
   <p:notesSz cx="6858000" cy="9144000"/>
@@ -2652,17 +2652,17 @@
   </p:cSld>
   <p:clrMap bg1="lt1" tx1="dk1" bg2="lt2" tx2="dk2" accent1="accent1" accent2="accent2" accent3="accent3" accent4="accent4" accent5="accent5" accent6="accent6" hlink="hlink" folHlink="folHlink"/>
   <p:sldLayoutIdLst>
-    <p:sldLayoutId id="2147483649" r:id="R00e44b7eedab4103"/>
-    <p:sldLayoutId id="2147483650" r:id="R96b7ab38a02f480a"/>
-    <p:sldLayoutId id="2147483651" r:id="Rb9228ca8e5a2491c"/>
-    <p:sldLayoutId id="2147483652" r:id="Ra7f99e473ac24166"/>
-    <p:sldLayoutId id="2147483653" r:id="R01f335ad4c51444b"/>
-    <p:sldLayoutId id="2147483654" r:id="R420a57a1ed9a44dd"/>
-    <p:sldLayoutId id="2147483655" r:id="R4557879f422a4576"/>
-    <p:sldLayoutId id="2147483656" r:id="R547535dd0bb344fd"/>
-    <p:sldLayoutId id="2147483657" r:id="R1e0bb99c80a14a02"/>
-    <p:sldLayoutId id="2147483658" r:id="R7f679dba29194af2"/>
-    <p:sldLayoutId id="2147483659" r:id="R910ab7d8ab2e4033"/>
+    <p:sldLayoutId id="2147483649" r:id="R6374713375924874"/>
+    <p:sldLayoutId id="2147483650" r:id="R273995706c634c7d"/>
+    <p:sldLayoutId id="2147483651" r:id="R68f34561c504426e"/>
+    <p:sldLayoutId id="2147483652" r:id="R3c41de3964c241ea"/>
+    <p:sldLayoutId id="2147483653" r:id="R42b5f03bedfb4737"/>
+    <p:sldLayoutId id="2147483654" r:id="Rd7a343cae17e48fa"/>
+    <p:sldLayoutId id="2147483655" r:id="R14632c69e7d643cd"/>
+    <p:sldLayoutId id="2147483656" r:id="R4904ff61acb848cd"/>
+    <p:sldLayoutId id="2147483657" r:id="R66fe4bde31ff4346"/>
+    <p:sldLayoutId id="2147483658" r:id="R4612676325414311"/>
+    <p:sldLayoutId id="2147483659" r:id="R13281149c021476f"/>
   </p:sldLayoutIdLst>
   <p:txStyles>
     <p:titleStyle>
@@ -3279,7 +3279,7 @@
             </p:xfrm>
             <a:graphic>
               <a:graphicData uri="http://schemas.microsoft.com/office/webextensions/webextension/2010/11">
-                <we:webextensionref xmlns:we="http://schemas.microsoft.com/office/webextensions/webextension/2010/11" xmlns:r="http://schemas.openxmlformats.org/officeDocument/2006/relationships" r:id="R97dcb41b46e84c54"/>
+                <we:webextensionref xmlns:we="http://schemas.microsoft.com/office/webextensions/webextension/2010/11" xmlns:r="http://schemas.openxmlformats.org/officeDocument/2006/relationships" r:id="R1843fae7d5a5494f"/>
               </a:graphicData>
             </a:graphic>
           </p:graphicFrame>
@@ -3291,7 +3291,7 @@
               <p:cNvPicPr/>
             </p:nvPicPr>
             <p:blipFill>
-              <a:blip xmlns:r="http://schemas.openxmlformats.org/officeDocument/2006/relationships" r:embed="R99d2e14e441b44ba"/>
+              <a:blip xmlns:r="http://schemas.openxmlformats.org/officeDocument/2006/relationships" r:embed="Rde4a4ab3614449cc"/>
               <a:stretch>
                 <a:fillRect/>
               </a:stretch>
@@ -3322,11 +3322,11 @@
 </file>
 
 <file path=ppt/slides/udata/data.xml><?xml version="1.0" encoding="utf-8"?>
-<we:webextension xmlns:r="http://schemas.openxmlformats.org/officeDocument/2006/relationships" xmlns:we="http://schemas.microsoft.com/office/webextensions/webextension/2010/11" id="{b6a4104b-d20c-42f4-92a4-500b9531a3b1}">
+<we:webextension xmlns:r="http://schemas.openxmlformats.org/officeDocument/2006/relationships" xmlns:we="http://schemas.microsoft.com/office/webextensions/webextension/2010/11" id="{6cd65b9a-e140-465d-9f3c-4d443c7c83c4}">
   <we:reference id="695691ef-8f6e-4dc4-b6b9-c5a5f44499f7" version="1.0.0.0" store="developer" storeType="Registry"/>
   <we:alternateReferences/>
   <we:properties/>
   <we:bindings/>
-  <we:snapshot xmlns:r="http://schemas.openxmlformats.org/officeDocument/2006/relationships" r:embed="R99d2e14e441b44ba"/>
+  <we:snapshot xmlns:r="http://schemas.openxmlformats.org/officeDocument/2006/relationships" r:embed="Rde4a4ab3614449cc"/>
 </we:webextension>
 </file>
</xml_diff>

<commit_message>
flipped labels in barchart on their side, also made the grapg taller so there is less wasted space
</commit_message>
<xml_diff>
--- a/PowerPoll/PowerPoll/bin/Debug/Presentation1.pptx
+++ b/PowerPoll/PowerPoll/bin/Debug/Presentation1.pptx
@@ -2,10 +2,10 @@
 <file path=ppt/presentation.xml><?xml version="1.0" encoding="utf-8"?>
 <p:presentation xmlns:a="http://schemas.openxmlformats.org/drawingml/2006/main" xmlns:r="http://schemas.openxmlformats.org/officeDocument/2006/relationships" xmlns:p="http://schemas.openxmlformats.org/presentationml/2006/main" saveSubsetFonts="1">
   <p:sldMasterIdLst>
-    <p:sldMasterId id="2147483648" r:id="Rb980210a609641f7"/>
+    <p:sldMasterId id="2147483648" r:id="R98059402dffe47ec"/>
   </p:sldMasterIdLst>
   <p:sldIdLst>
-    <p:sldId id="256" r:id="R13b5ab47f6b243fb"/>
+    <p:sldId id="256" r:id="R172e66274d37482a"/>
   </p:sldIdLst>
   <p:sldSz cx="12192000" cy="6858000"/>
   <p:notesSz cx="6858000" cy="9144000"/>
@@ -2652,17 +2652,17 @@
   </p:cSld>
   <p:clrMap bg1="lt1" tx1="dk1" bg2="lt2" tx2="dk2" accent1="accent1" accent2="accent2" accent3="accent3" accent4="accent4" accent5="accent5" accent6="accent6" hlink="hlink" folHlink="folHlink"/>
   <p:sldLayoutIdLst>
-    <p:sldLayoutId id="2147483649" r:id="R6374713375924874"/>
-    <p:sldLayoutId id="2147483650" r:id="R273995706c634c7d"/>
-    <p:sldLayoutId id="2147483651" r:id="R68f34561c504426e"/>
-    <p:sldLayoutId id="2147483652" r:id="R3c41de3964c241ea"/>
-    <p:sldLayoutId id="2147483653" r:id="R42b5f03bedfb4737"/>
-    <p:sldLayoutId id="2147483654" r:id="Rd7a343cae17e48fa"/>
-    <p:sldLayoutId id="2147483655" r:id="R14632c69e7d643cd"/>
-    <p:sldLayoutId id="2147483656" r:id="R4904ff61acb848cd"/>
-    <p:sldLayoutId id="2147483657" r:id="R66fe4bde31ff4346"/>
-    <p:sldLayoutId id="2147483658" r:id="R4612676325414311"/>
-    <p:sldLayoutId id="2147483659" r:id="R13281149c021476f"/>
+    <p:sldLayoutId id="2147483649" r:id="R5b48d42effd44b2d"/>
+    <p:sldLayoutId id="2147483650" r:id="Rb7884ff27a6b44fd"/>
+    <p:sldLayoutId id="2147483651" r:id="R0510837e309244ee"/>
+    <p:sldLayoutId id="2147483652" r:id="Rc67e43ef6a1842ac"/>
+    <p:sldLayoutId id="2147483653" r:id="R0dc281fabc334d93"/>
+    <p:sldLayoutId id="2147483654" r:id="R536fd32db0444e7d"/>
+    <p:sldLayoutId id="2147483655" r:id="R8d690ac30eb74c1e"/>
+    <p:sldLayoutId id="2147483656" r:id="Rb50956895f9b4531"/>
+    <p:sldLayoutId id="2147483657" r:id="R6b5ed3a890e54824"/>
+    <p:sldLayoutId id="2147483658" r:id="Rae00385d3590471f"/>
+    <p:sldLayoutId id="2147483659" r:id="R4b34097ab317400f"/>
   </p:sldLayoutIdLst>
   <p:txStyles>
     <p:titleStyle>
@@ -3279,7 +3279,7 @@
             </p:xfrm>
             <a:graphic>
               <a:graphicData uri="http://schemas.microsoft.com/office/webextensions/webextension/2010/11">
-                <we:webextensionref xmlns:we="http://schemas.microsoft.com/office/webextensions/webextension/2010/11" xmlns:r="http://schemas.openxmlformats.org/officeDocument/2006/relationships" r:id="R1843fae7d5a5494f"/>
+                <we:webextensionref xmlns:we="http://schemas.microsoft.com/office/webextensions/webextension/2010/11" xmlns:r="http://schemas.openxmlformats.org/officeDocument/2006/relationships" r:id="R82f0d8232f364cba"/>
               </a:graphicData>
             </a:graphic>
           </p:graphicFrame>
@@ -3291,7 +3291,7 @@
               <p:cNvPicPr/>
             </p:nvPicPr>
             <p:blipFill>
-              <a:blip xmlns:r="http://schemas.openxmlformats.org/officeDocument/2006/relationships" r:embed="Rde4a4ab3614449cc"/>
+              <a:blip xmlns:r="http://schemas.openxmlformats.org/officeDocument/2006/relationships" r:embed="R1e13ba3751cd4439"/>
               <a:stretch>
                 <a:fillRect/>
               </a:stretch>
@@ -3322,11 +3322,11 @@
 </file>
 
 <file path=ppt/slides/udata/data.xml><?xml version="1.0" encoding="utf-8"?>
-<we:webextension xmlns:r="http://schemas.openxmlformats.org/officeDocument/2006/relationships" xmlns:we="http://schemas.microsoft.com/office/webextensions/webextension/2010/11" id="{6cd65b9a-e140-465d-9f3c-4d443c7c83c4}">
+<we:webextension xmlns:r="http://schemas.openxmlformats.org/officeDocument/2006/relationships" xmlns:we="http://schemas.microsoft.com/office/webextensions/webextension/2010/11" id="{d1020b15-c8de-4b05-b613-4be09e63dea2}">
   <we:reference id="695691ef-8f6e-4dc4-b6b9-c5a5f44499f7" version="1.0.0.0" store="developer" storeType="Registry"/>
   <we:alternateReferences/>
   <we:properties/>
   <we:bindings/>
-  <we:snapshot xmlns:r="http://schemas.openxmlformats.org/officeDocument/2006/relationships" r:embed="Rde4a4ab3614449cc"/>
+  <we:snapshot xmlns:r="http://schemas.openxmlformats.org/officeDocument/2006/relationships" r:embed="R1e13ba3751cd4439"/>
 </we:webextension>
 </file>
</xml_diff>

<commit_message>
changed the pie chart so labels are no longer displayed in the slices and options are colour coded, got most of the error checking in
</commit_message>
<xml_diff>
--- a/PowerPoll/PowerPoll/bin/Debug/Presentation1.pptx
+++ b/PowerPoll/PowerPoll/bin/Debug/Presentation1.pptx
@@ -2,10 +2,10 @@
 <file path=ppt/presentation.xml><?xml version="1.0" encoding="utf-8"?>
 <p:presentation xmlns:a="http://schemas.openxmlformats.org/drawingml/2006/main" xmlns:r="http://schemas.openxmlformats.org/officeDocument/2006/relationships" xmlns:p="http://schemas.openxmlformats.org/presentationml/2006/main" saveSubsetFonts="1">
   <p:sldMasterIdLst>
-    <p:sldMasterId id="2147483648" r:id="R98059402dffe47ec"/>
+    <p:sldMasterId id="2147483648" r:id="Rebe7d18013da4564"/>
   </p:sldMasterIdLst>
   <p:sldIdLst>
-    <p:sldId id="256" r:id="R172e66274d37482a"/>
+    <p:sldId id="256" r:id="R9764ac4281a345e2"/>
   </p:sldIdLst>
   <p:sldSz cx="12192000" cy="6858000"/>
   <p:notesSz cx="6858000" cy="9144000"/>
@@ -2652,17 +2652,17 @@
   </p:cSld>
   <p:clrMap bg1="lt1" tx1="dk1" bg2="lt2" tx2="dk2" accent1="accent1" accent2="accent2" accent3="accent3" accent4="accent4" accent5="accent5" accent6="accent6" hlink="hlink" folHlink="folHlink"/>
   <p:sldLayoutIdLst>
-    <p:sldLayoutId id="2147483649" r:id="R5b48d42effd44b2d"/>
-    <p:sldLayoutId id="2147483650" r:id="Rb7884ff27a6b44fd"/>
-    <p:sldLayoutId id="2147483651" r:id="R0510837e309244ee"/>
-    <p:sldLayoutId id="2147483652" r:id="Rc67e43ef6a1842ac"/>
-    <p:sldLayoutId id="2147483653" r:id="R0dc281fabc334d93"/>
-    <p:sldLayoutId id="2147483654" r:id="R536fd32db0444e7d"/>
-    <p:sldLayoutId id="2147483655" r:id="R8d690ac30eb74c1e"/>
-    <p:sldLayoutId id="2147483656" r:id="Rb50956895f9b4531"/>
-    <p:sldLayoutId id="2147483657" r:id="R6b5ed3a890e54824"/>
-    <p:sldLayoutId id="2147483658" r:id="Rae00385d3590471f"/>
-    <p:sldLayoutId id="2147483659" r:id="R4b34097ab317400f"/>
+    <p:sldLayoutId id="2147483649" r:id="R4679573db3ab4160"/>
+    <p:sldLayoutId id="2147483650" r:id="R4f40c768936744be"/>
+    <p:sldLayoutId id="2147483651" r:id="Rfc47dda2a4534c15"/>
+    <p:sldLayoutId id="2147483652" r:id="Raa79e502904c4211"/>
+    <p:sldLayoutId id="2147483653" r:id="R273a5d4c161e4417"/>
+    <p:sldLayoutId id="2147483654" r:id="R17025f219c244003"/>
+    <p:sldLayoutId id="2147483655" r:id="Rdeb090958aaa4900"/>
+    <p:sldLayoutId id="2147483656" r:id="Rb0d381fb5586411a"/>
+    <p:sldLayoutId id="2147483657" r:id="R9ca1a48d59b94576"/>
+    <p:sldLayoutId id="2147483658" r:id="R926f226cdb794e05"/>
+    <p:sldLayoutId id="2147483659" r:id="R1e240f99ab4f466e"/>
   </p:sldLayoutIdLst>
   <p:txStyles>
     <p:titleStyle>
@@ -3279,7 +3279,7 @@
             </p:xfrm>
             <a:graphic>
               <a:graphicData uri="http://schemas.microsoft.com/office/webextensions/webextension/2010/11">
-                <we:webextensionref xmlns:we="http://schemas.microsoft.com/office/webextensions/webextension/2010/11" xmlns:r="http://schemas.openxmlformats.org/officeDocument/2006/relationships" r:id="R82f0d8232f364cba"/>
+                <we:webextensionref xmlns:we="http://schemas.microsoft.com/office/webextensions/webextension/2010/11" xmlns:r="http://schemas.openxmlformats.org/officeDocument/2006/relationships" r:id="R9a2242c7a6784fa7"/>
               </a:graphicData>
             </a:graphic>
           </p:graphicFrame>
@@ -3291,7 +3291,7 @@
               <p:cNvPicPr/>
             </p:nvPicPr>
             <p:blipFill>
-              <a:blip xmlns:r="http://schemas.openxmlformats.org/officeDocument/2006/relationships" r:embed="R1e13ba3751cd4439"/>
+              <a:blip xmlns:r="http://schemas.openxmlformats.org/officeDocument/2006/relationships" r:embed="R53e308e5a57d4d2c"/>
               <a:stretch>
                 <a:fillRect/>
               </a:stretch>
@@ -3322,11 +3322,11 @@
 </file>
 
 <file path=ppt/slides/udata/data.xml><?xml version="1.0" encoding="utf-8"?>
-<we:webextension xmlns:r="http://schemas.openxmlformats.org/officeDocument/2006/relationships" xmlns:we="http://schemas.microsoft.com/office/webextensions/webextension/2010/11" id="{d1020b15-c8de-4b05-b613-4be09e63dea2}">
+<we:webextension xmlns:r="http://schemas.openxmlformats.org/officeDocument/2006/relationships" xmlns:we="http://schemas.microsoft.com/office/webextensions/webextension/2010/11" id="{8c62e712-2625-4227-ad98-3b8147888a2a}">
   <we:reference id="695691ef-8f6e-4dc4-b6b9-c5a5f44499f7" version="1.0.0.0" store="developer" storeType="Registry"/>
   <we:alternateReferences/>
   <we:properties/>
   <we:bindings/>
-  <we:snapshot xmlns:r="http://schemas.openxmlformats.org/officeDocument/2006/relationships" r:embed="R1e13ba3751cd4439"/>
+  <we:snapshot xmlns:r="http://schemas.openxmlformats.org/officeDocument/2006/relationships" r:embed="R53e308e5a57d4d2c"/>
 </we:webextension>
 </file>
</xml_diff>

<commit_message>
you can open active polls without all the information being filled out(just the hashtag)
</commit_message>
<xml_diff>
--- a/PowerPoll/PowerPoll/bin/Debug/Presentation1.pptx
+++ b/PowerPoll/PowerPoll/bin/Debug/Presentation1.pptx
@@ -2,10 +2,10 @@
 <file path=ppt/presentation.xml><?xml version="1.0" encoding="utf-8"?>
 <p:presentation xmlns:a="http://schemas.openxmlformats.org/drawingml/2006/main" xmlns:r="http://schemas.openxmlformats.org/officeDocument/2006/relationships" xmlns:p="http://schemas.openxmlformats.org/presentationml/2006/main" saveSubsetFonts="1">
   <p:sldMasterIdLst>
-    <p:sldMasterId id="2147483648" r:id="Rebe7d18013da4564"/>
+    <p:sldMasterId id="2147483648" r:id="R223357deb6944e9e"/>
   </p:sldMasterIdLst>
   <p:sldIdLst>
-    <p:sldId id="256" r:id="R9764ac4281a345e2"/>
+    <p:sldId id="256" r:id="R8bda2d6ef72a4397"/>
   </p:sldIdLst>
   <p:sldSz cx="12192000" cy="6858000"/>
   <p:notesSz cx="6858000" cy="9144000"/>
@@ -2652,17 +2652,17 @@
   </p:cSld>
   <p:clrMap bg1="lt1" tx1="dk1" bg2="lt2" tx2="dk2" accent1="accent1" accent2="accent2" accent3="accent3" accent4="accent4" accent5="accent5" accent6="accent6" hlink="hlink" folHlink="folHlink"/>
   <p:sldLayoutIdLst>
-    <p:sldLayoutId id="2147483649" r:id="R4679573db3ab4160"/>
-    <p:sldLayoutId id="2147483650" r:id="R4f40c768936744be"/>
-    <p:sldLayoutId id="2147483651" r:id="Rfc47dda2a4534c15"/>
-    <p:sldLayoutId id="2147483652" r:id="Raa79e502904c4211"/>
-    <p:sldLayoutId id="2147483653" r:id="R273a5d4c161e4417"/>
-    <p:sldLayoutId id="2147483654" r:id="R17025f219c244003"/>
-    <p:sldLayoutId id="2147483655" r:id="Rdeb090958aaa4900"/>
-    <p:sldLayoutId id="2147483656" r:id="Rb0d381fb5586411a"/>
-    <p:sldLayoutId id="2147483657" r:id="R9ca1a48d59b94576"/>
-    <p:sldLayoutId id="2147483658" r:id="R926f226cdb794e05"/>
-    <p:sldLayoutId id="2147483659" r:id="R1e240f99ab4f466e"/>
+    <p:sldLayoutId id="2147483649" r:id="R8b02d6933e684171"/>
+    <p:sldLayoutId id="2147483650" r:id="R3ac3f22c005c4398"/>
+    <p:sldLayoutId id="2147483651" r:id="Rc9c694f7a8b541dd"/>
+    <p:sldLayoutId id="2147483652" r:id="R6c544e644b7f42d1"/>
+    <p:sldLayoutId id="2147483653" r:id="Rd51d1b5a039c4225"/>
+    <p:sldLayoutId id="2147483654" r:id="R1e0a0efe7dae4ac0"/>
+    <p:sldLayoutId id="2147483655" r:id="Rca9005e32f194feb"/>
+    <p:sldLayoutId id="2147483656" r:id="Rff8d16598351443a"/>
+    <p:sldLayoutId id="2147483657" r:id="R13f289f1d8be49a5"/>
+    <p:sldLayoutId id="2147483658" r:id="R75128dad6e074de6"/>
+    <p:sldLayoutId id="2147483659" r:id="Rc73f01e786f8414e"/>
   </p:sldLayoutIdLst>
   <p:txStyles>
     <p:titleStyle>
@@ -3279,7 +3279,7 @@
             </p:xfrm>
             <a:graphic>
               <a:graphicData uri="http://schemas.microsoft.com/office/webextensions/webextension/2010/11">
-                <we:webextensionref xmlns:we="http://schemas.microsoft.com/office/webextensions/webextension/2010/11" xmlns:r="http://schemas.openxmlformats.org/officeDocument/2006/relationships" r:id="R9a2242c7a6784fa7"/>
+                <we:webextensionref xmlns:we="http://schemas.microsoft.com/office/webextensions/webextension/2010/11" xmlns:r="http://schemas.openxmlformats.org/officeDocument/2006/relationships" r:id="R874396e34c824453"/>
               </a:graphicData>
             </a:graphic>
           </p:graphicFrame>
@@ -3291,7 +3291,7 @@
               <p:cNvPicPr/>
             </p:nvPicPr>
             <p:blipFill>
-              <a:blip xmlns:r="http://schemas.openxmlformats.org/officeDocument/2006/relationships" r:embed="R53e308e5a57d4d2c"/>
+              <a:blip xmlns:r="http://schemas.openxmlformats.org/officeDocument/2006/relationships" r:embed="R78b0845464504b35"/>
               <a:stretch>
                 <a:fillRect/>
               </a:stretch>
@@ -3322,11 +3322,11 @@
 </file>
 
 <file path=ppt/slides/udata/data.xml><?xml version="1.0" encoding="utf-8"?>
-<we:webextension xmlns:r="http://schemas.openxmlformats.org/officeDocument/2006/relationships" xmlns:we="http://schemas.microsoft.com/office/webextensions/webextension/2010/11" id="{8c62e712-2625-4227-ad98-3b8147888a2a}">
+<we:webextension xmlns:r="http://schemas.openxmlformats.org/officeDocument/2006/relationships" xmlns:we="http://schemas.microsoft.com/office/webextensions/webextension/2010/11" id="{186f11b7-7e97-4496-adcb-d817cac881ee}">
   <we:reference id="695691ef-8f6e-4dc4-b6b9-c5a5f44499f7" version="1.0.0.0" store="developer" storeType="Registry"/>
   <we:alternateReferences/>
   <we:properties/>
   <we:bindings/>
-  <we:snapshot xmlns:r="http://schemas.openxmlformats.org/officeDocument/2006/relationships" r:embed="R53e308e5a57d4d2c"/>
+  <we:snapshot xmlns:r="http://schemas.openxmlformats.org/officeDocument/2006/relationships" r:embed="R78b0845464504b35"/>
 </we:webextension>
 </file>
</xml_diff>

<commit_message>
fixed timer going into negative when old poll loaded
</commit_message>
<xml_diff>
--- a/PowerPoll/PowerPoll/bin/Debug/Presentation1.pptx
+++ b/PowerPoll/PowerPoll/bin/Debug/Presentation1.pptx
@@ -2,10 +2,10 @@
 <file path=ppt/presentation.xml><?xml version="1.0" encoding="utf-8"?>
 <p:presentation xmlns:a="http://schemas.openxmlformats.org/drawingml/2006/main" xmlns:r="http://schemas.openxmlformats.org/officeDocument/2006/relationships" xmlns:p="http://schemas.openxmlformats.org/presentationml/2006/main" saveSubsetFonts="1">
   <p:sldMasterIdLst>
-    <p:sldMasterId id="2147483648" r:id="R223357deb6944e9e"/>
+    <p:sldMasterId id="2147483648" r:id="R86271d5113da4678"/>
   </p:sldMasterIdLst>
   <p:sldIdLst>
-    <p:sldId id="256" r:id="R8bda2d6ef72a4397"/>
+    <p:sldId id="256" r:id="Rfd8980a0a0b24515"/>
   </p:sldIdLst>
   <p:sldSz cx="12192000" cy="6858000"/>
   <p:notesSz cx="6858000" cy="9144000"/>
@@ -2652,17 +2652,17 @@
   </p:cSld>
   <p:clrMap bg1="lt1" tx1="dk1" bg2="lt2" tx2="dk2" accent1="accent1" accent2="accent2" accent3="accent3" accent4="accent4" accent5="accent5" accent6="accent6" hlink="hlink" folHlink="folHlink"/>
   <p:sldLayoutIdLst>
-    <p:sldLayoutId id="2147483649" r:id="R8b02d6933e684171"/>
-    <p:sldLayoutId id="2147483650" r:id="R3ac3f22c005c4398"/>
-    <p:sldLayoutId id="2147483651" r:id="Rc9c694f7a8b541dd"/>
-    <p:sldLayoutId id="2147483652" r:id="R6c544e644b7f42d1"/>
-    <p:sldLayoutId id="2147483653" r:id="Rd51d1b5a039c4225"/>
-    <p:sldLayoutId id="2147483654" r:id="R1e0a0efe7dae4ac0"/>
-    <p:sldLayoutId id="2147483655" r:id="Rca9005e32f194feb"/>
-    <p:sldLayoutId id="2147483656" r:id="Rff8d16598351443a"/>
-    <p:sldLayoutId id="2147483657" r:id="R13f289f1d8be49a5"/>
-    <p:sldLayoutId id="2147483658" r:id="R75128dad6e074de6"/>
-    <p:sldLayoutId id="2147483659" r:id="Rc73f01e786f8414e"/>
+    <p:sldLayoutId id="2147483649" r:id="R3a126f01d0284b20"/>
+    <p:sldLayoutId id="2147483650" r:id="R3232db407ee04081"/>
+    <p:sldLayoutId id="2147483651" r:id="R133f9b6229534550"/>
+    <p:sldLayoutId id="2147483652" r:id="Rb7d424fab0a248c8"/>
+    <p:sldLayoutId id="2147483653" r:id="Rbc3569383ae34203"/>
+    <p:sldLayoutId id="2147483654" r:id="R0dd82e07be344ef0"/>
+    <p:sldLayoutId id="2147483655" r:id="Rfb9cd33e658d49cd"/>
+    <p:sldLayoutId id="2147483656" r:id="R505e4fe0331546cc"/>
+    <p:sldLayoutId id="2147483657" r:id="R06eb69577e0d436e"/>
+    <p:sldLayoutId id="2147483658" r:id="Rb00e366a53784f32"/>
+    <p:sldLayoutId id="2147483659" r:id="R66d37a82e8d54981"/>
   </p:sldLayoutIdLst>
   <p:txStyles>
     <p:titleStyle>
@@ -3279,7 +3279,7 @@
             </p:xfrm>
             <a:graphic>
               <a:graphicData uri="http://schemas.microsoft.com/office/webextensions/webextension/2010/11">
-                <we:webextensionref xmlns:we="http://schemas.microsoft.com/office/webextensions/webextension/2010/11" xmlns:r="http://schemas.openxmlformats.org/officeDocument/2006/relationships" r:id="R874396e34c824453"/>
+                <we:webextensionref xmlns:we="http://schemas.microsoft.com/office/webextensions/webextension/2010/11" xmlns:r="http://schemas.openxmlformats.org/officeDocument/2006/relationships" r:id="Rcf9f8abf0eac4e46"/>
               </a:graphicData>
             </a:graphic>
           </p:graphicFrame>
@@ -3291,7 +3291,7 @@
               <p:cNvPicPr/>
             </p:nvPicPr>
             <p:blipFill>
-              <a:blip xmlns:r="http://schemas.openxmlformats.org/officeDocument/2006/relationships" r:embed="R78b0845464504b35"/>
+              <a:blip xmlns:r="http://schemas.openxmlformats.org/officeDocument/2006/relationships" r:embed="Rdbd2f3cc962540d4"/>
               <a:stretch>
                 <a:fillRect/>
               </a:stretch>
@@ -3322,11 +3322,11 @@
 </file>
 
 <file path=ppt/slides/udata/data.xml><?xml version="1.0" encoding="utf-8"?>
-<we:webextension xmlns:r="http://schemas.openxmlformats.org/officeDocument/2006/relationships" xmlns:we="http://schemas.microsoft.com/office/webextensions/webextension/2010/11" id="{186f11b7-7e97-4496-adcb-d817cac881ee}">
+<we:webextension xmlns:r="http://schemas.openxmlformats.org/officeDocument/2006/relationships" xmlns:we="http://schemas.microsoft.com/office/webextensions/webextension/2010/11" id="{986b0177-65bb-48a5-9d3d-66909d0c08bf}">
   <we:reference id="695691ef-8f6e-4dc4-b6b9-c5a5f44499f7" version="1.0.0.0" store="developer" storeType="Registry"/>
   <we:alternateReferences/>
   <we:properties/>
   <we:bindings/>
-  <we:snapshot xmlns:r="http://schemas.openxmlformats.org/officeDocument/2006/relationships" r:embed="R78b0845464504b35"/>
+  <we:snapshot xmlns:r="http://schemas.openxmlformats.org/officeDocument/2006/relationships" r:embed="Rdbd2f3cc962540d4"/>
 </we:webextension>
 </file>
</xml_diff>

<commit_message>
completely removeed labels from pie chart, forgot the ones in update
</commit_message>
<xml_diff>
--- a/PowerPoll/PowerPoll/bin/Debug/Presentation1.pptx
+++ b/PowerPoll/PowerPoll/bin/Debug/Presentation1.pptx
@@ -2,10 +2,10 @@
 <file path=ppt/presentation.xml><?xml version="1.0" encoding="utf-8"?>
 <p:presentation xmlns:a="http://schemas.openxmlformats.org/drawingml/2006/main" xmlns:r="http://schemas.openxmlformats.org/officeDocument/2006/relationships" xmlns:p="http://schemas.openxmlformats.org/presentationml/2006/main" saveSubsetFonts="1">
   <p:sldMasterIdLst>
-    <p:sldMasterId id="2147483648" r:id="R86271d5113da4678"/>
+    <p:sldMasterId id="2147483648" r:id="R2cf55c273a6f4a2a"/>
   </p:sldMasterIdLst>
   <p:sldIdLst>
-    <p:sldId id="256" r:id="Rfd8980a0a0b24515"/>
+    <p:sldId id="256" r:id="R620ab067978a4454"/>
   </p:sldIdLst>
   <p:sldSz cx="12192000" cy="6858000"/>
   <p:notesSz cx="6858000" cy="9144000"/>
@@ -2652,17 +2652,17 @@
   </p:cSld>
   <p:clrMap bg1="lt1" tx1="dk1" bg2="lt2" tx2="dk2" accent1="accent1" accent2="accent2" accent3="accent3" accent4="accent4" accent5="accent5" accent6="accent6" hlink="hlink" folHlink="folHlink"/>
   <p:sldLayoutIdLst>
-    <p:sldLayoutId id="2147483649" r:id="R3a126f01d0284b20"/>
-    <p:sldLayoutId id="2147483650" r:id="R3232db407ee04081"/>
-    <p:sldLayoutId id="2147483651" r:id="R133f9b6229534550"/>
-    <p:sldLayoutId id="2147483652" r:id="Rb7d424fab0a248c8"/>
-    <p:sldLayoutId id="2147483653" r:id="Rbc3569383ae34203"/>
-    <p:sldLayoutId id="2147483654" r:id="R0dd82e07be344ef0"/>
-    <p:sldLayoutId id="2147483655" r:id="Rfb9cd33e658d49cd"/>
-    <p:sldLayoutId id="2147483656" r:id="R505e4fe0331546cc"/>
-    <p:sldLayoutId id="2147483657" r:id="R06eb69577e0d436e"/>
-    <p:sldLayoutId id="2147483658" r:id="Rb00e366a53784f32"/>
-    <p:sldLayoutId id="2147483659" r:id="R66d37a82e8d54981"/>
+    <p:sldLayoutId id="2147483649" r:id="R0c013618ad484c20"/>
+    <p:sldLayoutId id="2147483650" r:id="R27c1675e83964d5e"/>
+    <p:sldLayoutId id="2147483651" r:id="Rac2a8e21fd7e4e46"/>
+    <p:sldLayoutId id="2147483652" r:id="Rc80a2b85a2864c09"/>
+    <p:sldLayoutId id="2147483653" r:id="R4328b944fd794fe9"/>
+    <p:sldLayoutId id="2147483654" r:id="Rdbdc68bde8cc4871"/>
+    <p:sldLayoutId id="2147483655" r:id="R43890d6211dd491c"/>
+    <p:sldLayoutId id="2147483656" r:id="Raf1b72926a9543a6"/>
+    <p:sldLayoutId id="2147483657" r:id="R742054156e1c4ce5"/>
+    <p:sldLayoutId id="2147483658" r:id="R3244c603d6d74600"/>
+    <p:sldLayoutId id="2147483659" r:id="R766fe9c7f1ef4d71"/>
   </p:sldLayoutIdLst>
   <p:txStyles>
     <p:titleStyle>
@@ -3279,7 +3279,7 @@
             </p:xfrm>
             <a:graphic>
               <a:graphicData uri="http://schemas.microsoft.com/office/webextensions/webextension/2010/11">
-                <we:webextensionref xmlns:we="http://schemas.microsoft.com/office/webextensions/webextension/2010/11" xmlns:r="http://schemas.openxmlformats.org/officeDocument/2006/relationships" r:id="Rcf9f8abf0eac4e46"/>
+                <we:webextensionref xmlns:we="http://schemas.microsoft.com/office/webextensions/webextension/2010/11" xmlns:r="http://schemas.openxmlformats.org/officeDocument/2006/relationships" r:id="R33603deb1cef43f4"/>
               </a:graphicData>
             </a:graphic>
           </p:graphicFrame>
@@ -3291,7 +3291,7 @@
               <p:cNvPicPr/>
             </p:nvPicPr>
             <p:blipFill>
-              <a:blip xmlns:r="http://schemas.openxmlformats.org/officeDocument/2006/relationships" r:embed="Rdbd2f3cc962540d4"/>
+              <a:blip xmlns:r="http://schemas.openxmlformats.org/officeDocument/2006/relationships" r:embed="Re60a6ae3b3bf4344"/>
               <a:stretch>
                 <a:fillRect/>
               </a:stretch>
@@ -3322,11 +3322,11 @@
 </file>
 
 <file path=ppt/slides/udata/data.xml><?xml version="1.0" encoding="utf-8"?>
-<we:webextension xmlns:r="http://schemas.openxmlformats.org/officeDocument/2006/relationships" xmlns:we="http://schemas.microsoft.com/office/webextensions/webextension/2010/11" id="{986b0177-65bb-48a5-9d3d-66909d0c08bf}">
+<we:webextension xmlns:r="http://schemas.openxmlformats.org/officeDocument/2006/relationships" xmlns:we="http://schemas.microsoft.com/office/webextensions/webextension/2010/11" id="{a9923b64-8eea-4101-ac6f-b628d99c6a45}">
   <we:reference id="695691ef-8f6e-4dc4-b6b9-c5a5f44499f7" version="1.0.0.0" store="developer" storeType="Registry"/>
   <we:alternateReferences/>
   <we:properties/>
   <we:bindings/>
-  <we:snapshot xmlns:r="http://schemas.openxmlformats.org/officeDocument/2006/relationships" r:embed="Rdbd2f3cc962540d4"/>
+  <we:snapshot xmlns:r="http://schemas.openxmlformats.org/officeDocument/2006/relationships" r:embed="Re60a6ae3b3bf4344"/>
 </we:webextension>
 </file>
</xml_diff>

<commit_message>
maxlengths now handled by html with javascript double checking, changed the colour used for orange because it looked similar to the red when they were beside each other
</commit_message>
<xml_diff>
--- a/PowerPoll/PowerPoll/bin/Debug/Presentation1.pptx
+++ b/PowerPoll/PowerPoll/bin/Debug/Presentation1.pptx
@@ -2,10 +2,10 @@
 <file path=ppt/presentation.xml><?xml version="1.0" encoding="utf-8"?>
 <p:presentation xmlns:a="http://schemas.openxmlformats.org/drawingml/2006/main" xmlns:r="http://schemas.openxmlformats.org/officeDocument/2006/relationships" xmlns:p="http://schemas.openxmlformats.org/presentationml/2006/main" saveSubsetFonts="1">
   <p:sldMasterIdLst>
-    <p:sldMasterId id="2147483648" r:id="R2cf55c273a6f4a2a"/>
+    <p:sldMasterId id="2147483648" r:id="R26ccb2442acf4668"/>
   </p:sldMasterIdLst>
   <p:sldIdLst>
-    <p:sldId id="256" r:id="R620ab067978a4454"/>
+    <p:sldId id="256" r:id="Rdac389d17b324532"/>
   </p:sldIdLst>
   <p:sldSz cx="12192000" cy="6858000"/>
   <p:notesSz cx="6858000" cy="9144000"/>
@@ -2652,17 +2652,17 @@
   </p:cSld>
   <p:clrMap bg1="lt1" tx1="dk1" bg2="lt2" tx2="dk2" accent1="accent1" accent2="accent2" accent3="accent3" accent4="accent4" accent5="accent5" accent6="accent6" hlink="hlink" folHlink="folHlink"/>
   <p:sldLayoutIdLst>
-    <p:sldLayoutId id="2147483649" r:id="R0c013618ad484c20"/>
-    <p:sldLayoutId id="2147483650" r:id="R27c1675e83964d5e"/>
-    <p:sldLayoutId id="2147483651" r:id="Rac2a8e21fd7e4e46"/>
-    <p:sldLayoutId id="2147483652" r:id="Rc80a2b85a2864c09"/>
-    <p:sldLayoutId id="2147483653" r:id="R4328b944fd794fe9"/>
-    <p:sldLayoutId id="2147483654" r:id="Rdbdc68bde8cc4871"/>
-    <p:sldLayoutId id="2147483655" r:id="R43890d6211dd491c"/>
-    <p:sldLayoutId id="2147483656" r:id="Raf1b72926a9543a6"/>
-    <p:sldLayoutId id="2147483657" r:id="R742054156e1c4ce5"/>
-    <p:sldLayoutId id="2147483658" r:id="R3244c603d6d74600"/>
-    <p:sldLayoutId id="2147483659" r:id="R766fe9c7f1ef4d71"/>
+    <p:sldLayoutId id="2147483649" r:id="R5da7e91f6e524783"/>
+    <p:sldLayoutId id="2147483650" r:id="Rc846372c303b4bca"/>
+    <p:sldLayoutId id="2147483651" r:id="R7bf6a32d0a9a4049"/>
+    <p:sldLayoutId id="2147483652" r:id="R4134e3b2ba6e4141"/>
+    <p:sldLayoutId id="2147483653" r:id="R92b04812012143dc"/>
+    <p:sldLayoutId id="2147483654" r:id="R3de289eb22c44633"/>
+    <p:sldLayoutId id="2147483655" r:id="R500250452616441b"/>
+    <p:sldLayoutId id="2147483656" r:id="R6b9ce554f7fc4676"/>
+    <p:sldLayoutId id="2147483657" r:id="Rd1a79698161a4d00"/>
+    <p:sldLayoutId id="2147483658" r:id="R1860d1c0476c4e0e"/>
+    <p:sldLayoutId id="2147483659" r:id="R418776688bd14e9a"/>
   </p:sldLayoutIdLst>
   <p:txStyles>
     <p:titleStyle>
@@ -3279,7 +3279,7 @@
             </p:xfrm>
             <a:graphic>
               <a:graphicData uri="http://schemas.microsoft.com/office/webextensions/webextension/2010/11">
-                <we:webextensionref xmlns:we="http://schemas.microsoft.com/office/webextensions/webextension/2010/11" xmlns:r="http://schemas.openxmlformats.org/officeDocument/2006/relationships" r:id="R33603deb1cef43f4"/>
+                <we:webextensionref xmlns:we="http://schemas.microsoft.com/office/webextensions/webextension/2010/11" xmlns:r="http://schemas.openxmlformats.org/officeDocument/2006/relationships" r:id="Rb828feb7957b478b"/>
               </a:graphicData>
             </a:graphic>
           </p:graphicFrame>
@@ -3291,7 +3291,7 @@
               <p:cNvPicPr/>
             </p:nvPicPr>
             <p:blipFill>
-              <a:blip xmlns:r="http://schemas.openxmlformats.org/officeDocument/2006/relationships" r:embed="Re60a6ae3b3bf4344"/>
+              <a:blip xmlns:r="http://schemas.openxmlformats.org/officeDocument/2006/relationships" r:embed="R54206cc7476f44ec"/>
               <a:stretch>
                 <a:fillRect/>
               </a:stretch>
@@ -3322,11 +3322,11 @@
 </file>
 
 <file path=ppt/slides/udata/data.xml><?xml version="1.0" encoding="utf-8"?>
-<we:webextension xmlns:r="http://schemas.openxmlformats.org/officeDocument/2006/relationships" xmlns:we="http://schemas.microsoft.com/office/webextensions/webextension/2010/11" id="{a9923b64-8eea-4101-ac6f-b628d99c6a45}">
+<we:webextension xmlns:r="http://schemas.openxmlformats.org/officeDocument/2006/relationships" xmlns:we="http://schemas.microsoft.com/office/webextensions/webextension/2010/11" id="{893e55dc-fcd9-4d8f-9dde-2e5f4c137fec}">
   <we:reference id="695691ef-8f6e-4dc4-b6b9-c5a5f44499f7" version="1.0.0.0" store="developer" storeType="Registry"/>
   <we:alternateReferences/>
   <we:properties/>
   <we:bindings/>
-  <we:snapshot xmlns:r="http://schemas.openxmlformats.org/officeDocument/2006/relationships" r:embed="Re60a6ae3b3bf4344"/>
+  <we:snapshot xmlns:r="http://schemas.openxmlformats.org/officeDocument/2006/relationships" r:embed="R54206cc7476f44ec"/>
 </we:webextension>
 </file>
</xml_diff>

<commit_message>
added the individual numbers to bar and pie, made updates 10x faster
</commit_message>
<xml_diff>
--- a/PowerPoll/PowerPoll/bin/Debug/Presentation1.pptx
+++ b/PowerPoll/PowerPoll/bin/Debug/Presentation1.pptx
@@ -2,10 +2,10 @@
 <file path=ppt/presentation.xml><?xml version="1.0" encoding="utf-8"?>
 <p:presentation xmlns:a="http://schemas.openxmlformats.org/drawingml/2006/main" xmlns:r="http://schemas.openxmlformats.org/officeDocument/2006/relationships" xmlns:p="http://schemas.openxmlformats.org/presentationml/2006/main" saveSubsetFonts="1">
   <p:sldMasterIdLst>
-    <p:sldMasterId id="2147483648" r:id="R26ccb2442acf4668"/>
+    <p:sldMasterId id="2147483648" r:id="Rf600940a0abf421c"/>
   </p:sldMasterIdLst>
   <p:sldIdLst>
-    <p:sldId id="256" r:id="Rdac389d17b324532"/>
+    <p:sldId id="256" r:id="Rfcb2de61dcdb40c3"/>
   </p:sldIdLst>
   <p:sldSz cx="12192000" cy="6858000"/>
   <p:notesSz cx="6858000" cy="9144000"/>
@@ -2652,17 +2652,17 @@
   </p:cSld>
   <p:clrMap bg1="lt1" tx1="dk1" bg2="lt2" tx2="dk2" accent1="accent1" accent2="accent2" accent3="accent3" accent4="accent4" accent5="accent5" accent6="accent6" hlink="hlink" folHlink="folHlink"/>
   <p:sldLayoutIdLst>
-    <p:sldLayoutId id="2147483649" r:id="R5da7e91f6e524783"/>
-    <p:sldLayoutId id="2147483650" r:id="Rc846372c303b4bca"/>
-    <p:sldLayoutId id="2147483651" r:id="R7bf6a32d0a9a4049"/>
-    <p:sldLayoutId id="2147483652" r:id="R4134e3b2ba6e4141"/>
-    <p:sldLayoutId id="2147483653" r:id="R92b04812012143dc"/>
-    <p:sldLayoutId id="2147483654" r:id="R3de289eb22c44633"/>
-    <p:sldLayoutId id="2147483655" r:id="R500250452616441b"/>
-    <p:sldLayoutId id="2147483656" r:id="R6b9ce554f7fc4676"/>
-    <p:sldLayoutId id="2147483657" r:id="Rd1a79698161a4d00"/>
-    <p:sldLayoutId id="2147483658" r:id="R1860d1c0476c4e0e"/>
-    <p:sldLayoutId id="2147483659" r:id="R418776688bd14e9a"/>
+    <p:sldLayoutId id="2147483649" r:id="R4b660e2848764c91"/>
+    <p:sldLayoutId id="2147483650" r:id="R2434fea4741449d3"/>
+    <p:sldLayoutId id="2147483651" r:id="R93d336b6b4354e9b"/>
+    <p:sldLayoutId id="2147483652" r:id="R71a3c748cf054de0"/>
+    <p:sldLayoutId id="2147483653" r:id="R8003edd2a5f74cfb"/>
+    <p:sldLayoutId id="2147483654" r:id="Rdd9f76268ec54a61"/>
+    <p:sldLayoutId id="2147483655" r:id="R879acf287b7c45ff"/>
+    <p:sldLayoutId id="2147483656" r:id="Rc510a52e7cb148dd"/>
+    <p:sldLayoutId id="2147483657" r:id="R81ae7f74275448cb"/>
+    <p:sldLayoutId id="2147483658" r:id="Rbfbb884d09954331"/>
+    <p:sldLayoutId id="2147483659" r:id="Rb6b79e08c4404ec5"/>
   </p:sldLayoutIdLst>
   <p:txStyles>
     <p:titleStyle>
@@ -3279,7 +3279,7 @@
             </p:xfrm>
             <a:graphic>
               <a:graphicData uri="http://schemas.microsoft.com/office/webextensions/webextension/2010/11">
-                <we:webextensionref xmlns:we="http://schemas.microsoft.com/office/webextensions/webextension/2010/11" xmlns:r="http://schemas.openxmlformats.org/officeDocument/2006/relationships" r:id="Rb828feb7957b478b"/>
+                <we:webextensionref xmlns:we="http://schemas.microsoft.com/office/webextensions/webextension/2010/11" xmlns:r="http://schemas.openxmlformats.org/officeDocument/2006/relationships" r:id="Rc80424d283634e73"/>
               </a:graphicData>
             </a:graphic>
           </p:graphicFrame>
@@ -3291,7 +3291,7 @@
               <p:cNvPicPr/>
             </p:nvPicPr>
             <p:blipFill>
-              <a:blip xmlns:r="http://schemas.openxmlformats.org/officeDocument/2006/relationships" r:embed="R54206cc7476f44ec"/>
+              <a:blip xmlns:r="http://schemas.openxmlformats.org/officeDocument/2006/relationships" r:embed="R1b1f48b35e73447f"/>
               <a:stretch>
                 <a:fillRect/>
               </a:stretch>
@@ -3322,11 +3322,11 @@
 </file>
 
 <file path=ppt/slides/udata/data.xml><?xml version="1.0" encoding="utf-8"?>
-<we:webextension xmlns:r="http://schemas.openxmlformats.org/officeDocument/2006/relationships" xmlns:we="http://schemas.microsoft.com/office/webextensions/webextension/2010/11" id="{893e55dc-fcd9-4d8f-9dde-2e5f4c137fec}">
+<we:webextension xmlns:r="http://schemas.openxmlformats.org/officeDocument/2006/relationships" xmlns:we="http://schemas.microsoft.com/office/webextensions/webextension/2010/11" id="{152d2005-37a4-4bf9-853c-545ed2953f81}">
   <we:reference id="695691ef-8f6e-4dc4-b6b9-c5a5f44499f7" version="1.0.0.0" store="developer" storeType="Registry"/>
   <we:alternateReferences/>
   <we:properties/>
   <we:bindings/>
-  <we:snapshot xmlns:r="http://schemas.openxmlformats.org/officeDocument/2006/relationships" r:embed="R54206cc7476f44ec"/>
+  <we:snapshot xmlns:r="http://schemas.openxmlformats.org/officeDocument/2006/relationships" r:embed="R1b1f48b35e73447f"/>
 </we:webextension>
 </file>
</xml_diff>

<commit_message>
added notifications for incorrect input, changed the refresh rate of the graphs
</commit_message>
<xml_diff>
--- a/PowerPoll/PowerPoll/bin/Debug/Presentation1.pptx
+++ b/PowerPoll/PowerPoll/bin/Debug/Presentation1.pptx
@@ -2,10 +2,10 @@
 <file path=ppt/presentation.xml><?xml version="1.0" encoding="utf-8"?>
 <p:presentation xmlns:a="http://schemas.openxmlformats.org/drawingml/2006/main" xmlns:r="http://schemas.openxmlformats.org/officeDocument/2006/relationships" xmlns:p="http://schemas.openxmlformats.org/presentationml/2006/main" saveSubsetFonts="1">
   <p:sldMasterIdLst>
-    <p:sldMasterId id="2147483648" r:id="Rf600940a0abf421c"/>
+    <p:sldMasterId id="2147483648" r:id="R88fddba1e8124ac3"/>
   </p:sldMasterIdLst>
   <p:sldIdLst>
-    <p:sldId id="256" r:id="Rfcb2de61dcdb40c3"/>
+    <p:sldId id="256" r:id="R5b850cb677584ca6"/>
   </p:sldIdLst>
   <p:sldSz cx="12192000" cy="6858000"/>
   <p:notesSz cx="6858000" cy="9144000"/>
@@ -2652,17 +2652,17 @@
   </p:cSld>
   <p:clrMap bg1="lt1" tx1="dk1" bg2="lt2" tx2="dk2" accent1="accent1" accent2="accent2" accent3="accent3" accent4="accent4" accent5="accent5" accent6="accent6" hlink="hlink" folHlink="folHlink"/>
   <p:sldLayoutIdLst>
-    <p:sldLayoutId id="2147483649" r:id="R4b660e2848764c91"/>
-    <p:sldLayoutId id="2147483650" r:id="R2434fea4741449d3"/>
-    <p:sldLayoutId id="2147483651" r:id="R93d336b6b4354e9b"/>
-    <p:sldLayoutId id="2147483652" r:id="R71a3c748cf054de0"/>
-    <p:sldLayoutId id="2147483653" r:id="R8003edd2a5f74cfb"/>
-    <p:sldLayoutId id="2147483654" r:id="Rdd9f76268ec54a61"/>
-    <p:sldLayoutId id="2147483655" r:id="R879acf287b7c45ff"/>
-    <p:sldLayoutId id="2147483656" r:id="Rc510a52e7cb148dd"/>
-    <p:sldLayoutId id="2147483657" r:id="R81ae7f74275448cb"/>
-    <p:sldLayoutId id="2147483658" r:id="Rbfbb884d09954331"/>
-    <p:sldLayoutId id="2147483659" r:id="Rb6b79e08c4404ec5"/>
+    <p:sldLayoutId id="2147483649" r:id="Rdc7cb562e42e4270"/>
+    <p:sldLayoutId id="2147483650" r:id="Ra5df7032b9f24fbd"/>
+    <p:sldLayoutId id="2147483651" r:id="R6b63a0928a944828"/>
+    <p:sldLayoutId id="2147483652" r:id="R2ba3f627f9f54305"/>
+    <p:sldLayoutId id="2147483653" r:id="R27deed7cb2bf4bc8"/>
+    <p:sldLayoutId id="2147483654" r:id="R5bbde401c5ef491d"/>
+    <p:sldLayoutId id="2147483655" r:id="R1cc2b3819f43454d"/>
+    <p:sldLayoutId id="2147483656" r:id="Rdbd0f2ec39bb472c"/>
+    <p:sldLayoutId id="2147483657" r:id="Rb3022bad05a44d2e"/>
+    <p:sldLayoutId id="2147483658" r:id="Red07c3c379e24fbf"/>
+    <p:sldLayoutId id="2147483659" r:id="Ree879f2c782140fc"/>
   </p:sldLayoutIdLst>
   <p:txStyles>
     <p:titleStyle>
@@ -3279,7 +3279,7 @@
             </p:xfrm>
             <a:graphic>
               <a:graphicData uri="http://schemas.microsoft.com/office/webextensions/webextension/2010/11">
-                <we:webextensionref xmlns:we="http://schemas.microsoft.com/office/webextensions/webextension/2010/11" xmlns:r="http://schemas.openxmlformats.org/officeDocument/2006/relationships" r:id="Rc80424d283634e73"/>
+                <we:webextensionref xmlns:we="http://schemas.microsoft.com/office/webextensions/webextension/2010/11" xmlns:r="http://schemas.openxmlformats.org/officeDocument/2006/relationships" r:id="R22b7972666674d8e"/>
               </a:graphicData>
             </a:graphic>
           </p:graphicFrame>
@@ -3291,7 +3291,7 @@
               <p:cNvPicPr/>
             </p:nvPicPr>
             <p:blipFill>
-              <a:blip xmlns:r="http://schemas.openxmlformats.org/officeDocument/2006/relationships" r:embed="R1b1f48b35e73447f"/>
+              <a:blip xmlns:r="http://schemas.openxmlformats.org/officeDocument/2006/relationships" r:embed="Rff7b3456e25f4f22"/>
               <a:stretch>
                 <a:fillRect/>
               </a:stretch>
@@ -3322,11 +3322,11 @@
 </file>
 
 <file path=ppt/slides/udata/data.xml><?xml version="1.0" encoding="utf-8"?>
-<we:webextension xmlns:r="http://schemas.openxmlformats.org/officeDocument/2006/relationships" xmlns:we="http://schemas.microsoft.com/office/webextensions/webextension/2010/11" id="{152d2005-37a4-4bf9-853c-545ed2953f81}">
+<we:webextension xmlns:r="http://schemas.openxmlformats.org/officeDocument/2006/relationships" xmlns:we="http://schemas.microsoft.com/office/webextensions/webextension/2010/11" id="{fecd3c64-9029-4112-a6f2-e0fc18eba378}">
   <we:reference id="695691ef-8f6e-4dc4-b6b9-c5a5f44499f7" version="1.0.0.0" store="developer" storeType="Registry"/>
   <we:alternateReferences/>
   <we:properties/>
   <we:bindings/>
-  <we:snapshot xmlns:r="http://schemas.openxmlformats.org/officeDocument/2006/relationships" r:embed="R1b1f48b35e73447f"/>
+  <we:snapshot xmlns:r="http://schemas.openxmlformats.org/officeDocument/2006/relationships" r:embed="Rff7b3456e25f4f22"/>
 </we:webextension>
 </file>
</xml_diff>

<commit_message>
improved the way detecting active hashtags works
</commit_message>
<xml_diff>
--- a/PowerPoll/PowerPoll/bin/Debug/Presentation1.pptx
+++ b/PowerPoll/PowerPoll/bin/Debug/Presentation1.pptx
@@ -2,10 +2,10 @@
 <file path=ppt/presentation.xml><?xml version="1.0" encoding="utf-8"?>
 <p:presentation xmlns:a="http://schemas.openxmlformats.org/drawingml/2006/main" xmlns:r="http://schemas.openxmlformats.org/officeDocument/2006/relationships" xmlns:p="http://schemas.openxmlformats.org/presentationml/2006/main" saveSubsetFonts="1">
   <p:sldMasterIdLst>
-    <p:sldMasterId id="2147483648" r:id="R88fddba1e8124ac3"/>
+    <p:sldMasterId id="2147483648" r:id="Rf377995730794c1a"/>
   </p:sldMasterIdLst>
   <p:sldIdLst>
-    <p:sldId id="256" r:id="R5b850cb677584ca6"/>
+    <p:sldId id="256" r:id="Rc8baf01b4e6e4ad6"/>
   </p:sldIdLst>
   <p:sldSz cx="12192000" cy="6858000"/>
   <p:notesSz cx="6858000" cy="9144000"/>
@@ -2652,17 +2652,17 @@
   </p:cSld>
   <p:clrMap bg1="lt1" tx1="dk1" bg2="lt2" tx2="dk2" accent1="accent1" accent2="accent2" accent3="accent3" accent4="accent4" accent5="accent5" accent6="accent6" hlink="hlink" folHlink="folHlink"/>
   <p:sldLayoutIdLst>
-    <p:sldLayoutId id="2147483649" r:id="Rdc7cb562e42e4270"/>
-    <p:sldLayoutId id="2147483650" r:id="Ra5df7032b9f24fbd"/>
-    <p:sldLayoutId id="2147483651" r:id="R6b63a0928a944828"/>
-    <p:sldLayoutId id="2147483652" r:id="R2ba3f627f9f54305"/>
-    <p:sldLayoutId id="2147483653" r:id="R27deed7cb2bf4bc8"/>
-    <p:sldLayoutId id="2147483654" r:id="R5bbde401c5ef491d"/>
-    <p:sldLayoutId id="2147483655" r:id="R1cc2b3819f43454d"/>
-    <p:sldLayoutId id="2147483656" r:id="Rdbd0f2ec39bb472c"/>
-    <p:sldLayoutId id="2147483657" r:id="Rb3022bad05a44d2e"/>
-    <p:sldLayoutId id="2147483658" r:id="Red07c3c379e24fbf"/>
-    <p:sldLayoutId id="2147483659" r:id="Ree879f2c782140fc"/>
+    <p:sldLayoutId id="2147483649" r:id="R1a671709f1db487c"/>
+    <p:sldLayoutId id="2147483650" r:id="R671dbad2f39c454d"/>
+    <p:sldLayoutId id="2147483651" r:id="R318b64db78964423"/>
+    <p:sldLayoutId id="2147483652" r:id="R44a7f2d5c86d456a"/>
+    <p:sldLayoutId id="2147483653" r:id="R2fa1a638264145f4"/>
+    <p:sldLayoutId id="2147483654" r:id="Re01f87b33e224db6"/>
+    <p:sldLayoutId id="2147483655" r:id="Re591db3154494c2a"/>
+    <p:sldLayoutId id="2147483656" r:id="R10b479ea1b244f8f"/>
+    <p:sldLayoutId id="2147483657" r:id="Rfff14c82bcab4d69"/>
+    <p:sldLayoutId id="2147483658" r:id="Raf302cca0ad7430b"/>
+    <p:sldLayoutId id="2147483659" r:id="R14d508903e5e48f7"/>
   </p:sldLayoutIdLst>
   <p:txStyles>
     <p:titleStyle>
@@ -3279,7 +3279,7 @@
             </p:xfrm>
             <a:graphic>
               <a:graphicData uri="http://schemas.microsoft.com/office/webextensions/webextension/2010/11">
-                <we:webextensionref xmlns:we="http://schemas.microsoft.com/office/webextensions/webextension/2010/11" xmlns:r="http://schemas.openxmlformats.org/officeDocument/2006/relationships" r:id="R22b7972666674d8e"/>
+                <we:webextensionref xmlns:we="http://schemas.microsoft.com/office/webextensions/webextension/2010/11" xmlns:r="http://schemas.openxmlformats.org/officeDocument/2006/relationships" r:id="R4760f22987eb4782"/>
               </a:graphicData>
             </a:graphic>
           </p:graphicFrame>
@@ -3291,7 +3291,7 @@
               <p:cNvPicPr/>
             </p:nvPicPr>
             <p:blipFill>
-              <a:blip xmlns:r="http://schemas.openxmlformats.org/officeDocument/2006/relationships" r:embed="Rff7b3456e25f4f22"/>
+              <a:blip xmlns:r="http://schemas.openxmlformats.org/officeDocument/2006/relationships" r:embed="Rf2209148af364fbc"/>
               <a:stretch>
                 <a:fillRect/>
               </a:stretch>
@@ -3322,11 +3322,11 @@
 </file>
 
 <file path=ppt/slides/udata/data.xml><?xml version="1.0" encoding="utf-8"?>
-<we:webextension xmlns:r="http://schemas.openxmlformats.org/officeDocument/2006/relationships" xmlns:we="http://schemas.microsoft.com/office/webextensions/webextension/2010/11" id="{fecd3c64-9029-4112-a6f2-e0fc18eba378}">
+<we:webextension xmlns:r="http://schemas.openxmlformats.org/officeDocument/2006/relationships" xmlns:we="http://schemas.microsoft.com/office/webextensions/webextension/2010/11" id="{4c228ca0-c681-4989-a6af-2e92eec94346}">
   <we:reference id="695691ef-8f6e-4dc4-b6b9-c5a5f44499f7" version="1.0.0.0" store="developer" storeType="Registry"/>
   <we:alternateReferences/>
   <we:properties/>
   <we:bindings/>
-  <we:snapshot xmlns:r="http://schemas.openxmlformats.org/officeDocument/2006/relationships" r:embed="Rff7b3456e25f4f22"/>
+  <we:snapshot xmlns:r="http://schemas.openxmlformats.org/officeDocument/2006/relationships" r:embed="Rf2209148af364fbc"/>
 </we:webextension>
 </file>
</xml_diff>

<commit_message>
made labels on pie chart a bit bigger, fixed a daylight savings bug (the fix is a bit hacky though)
</commit_message>
<xml_diff>
--- a/PowerPoll/PowerPoll/bin/Debug/Presentation1.pptx
+++ b/PowerPoll/PowerPoll/bin/Debug/Presentation1.pptx
@@ -2,10 +2,10 @@
 <file path=ppt/presentation.xml><?xml version="1.0" encoding="utf-8"?>
 <p:presentation xmlns:a="http://schemas.openxmlformats.org/drawingml/2006/main" xmlns:r="http://schemas.openxmlformats.org/officeDocument/2006/relationships" xmlns:p="http://schemas.openxmlformats.org/presentationml/2006/main" saveSubsetFonts="1">
   <p:sldMasterIdLst>
-    <p:sldMasterId id="2147483648" r:id="R68d87b352ca54604"/>
+    <p:sldMasterId id="2147483648" r:id="Rf52f87faae594d6d"/>
   </p:sldMasterIdLst>
   <p:sldIdLst>
-    <p:sldId id="256" r:id="Rfdd4f2b5422f43ae"/>
+    <p:sldId id="256" r:id="R0ba8d0c3ca624ab4"/>
   </p:sldIdLst>
   <p:sldSz cx="12192000" cy="6858000"/>
   <p:notesSz cx="6858000" cy="9144000"/>
@@ -2652,17 +2652,17 @@
   </p:cSld>
   <p:clrMap bg1="lt1" tx1="dk1" bg2="lt2" tx2="dk2" accent1="accent1" accent2="accent2" accent3="accent3" accent4="accent4" accent5="accent5" accent6="accent6" hlink="hlink" folHlink="folHlink"/>
   <p:sldLayoutIdLst>
-    <p:sldLayoutId id="2147483649" r:id="R3c784b2f59964fea"/>
-    <p:sldLayoutId id="2147483650" r:id="R3d759c14d6f540ea"/>
-    <p:sldLayoutId id="2147483651" r:id="R4ad7cf17dd4a48a0"/>
-    <p:sldLayoutId id="2147483652" r:id="R4c81ac3ac5c94a2b"/>
-    <p:sldLayoutId id="2147483653" r:id="R009f4f7d63ef4375"/>
-    <p:sldLayoutId id="2147483654" r:id="Rb2fd4c866f5745cf"/>
-    <p:sldLayoutId id="2147483655" r:id="R447cf1d7b3c946bd"/>
-    <p:sldLayoutId id="2147483656" r:id="R2d0517f6eeaa43d4"/>
-    <p:sldLayoutId id="2147483657" r:id="Rc14cba992cde4094"/>
-    <p:sldLayoutId id="2147483658" r:id="R3f7c57bec78d4a95"/>
-    <p:sldLayoutId id="2147483659" r:id="R79b5c7d12d754c26"/>
+    <p:sldLayoutId id="2147483649" r:id="Rd72a28a560464a30"/>
+    <p:sldLayoutId id="2147483650" r:id="Rf51314c99ad34db7"/>
+    <p:sldLayoutId id="2147483651" r:id="R929bbc7d1ece4b68"/>
+    <p:sldLayoutId id="2147483652" r:id="R4924a3840a494534"/>
+    <p:sldLayoutId id="2147483653" r:id="R49f891a353ab4608"/>
+    <p:sldLayoutId id="2147483654" r:id="Rf7bbb58632494ecf"/>
+    <p:sldLayoutId id="2147483655" r:id="R4c9d2056ff664b2a"/>
+    <p:sldLayoutId id="2147483656" r:id="R0d298ac41be141f2"/>
+    <p:sldLayoutId id="2147483657" r:id="Rbd9df7412e05461c"/>
+    <p:sldLayoutId id="2147483658" r:id="R364b8a179eea4437"/>
+    <p:sldLayoutId id="2147483659" r:id="R111c592bcd3940c6"/>
   </p:sldLayoutIdLst>
   <p:txStyles>
     <p:titleStyle>
@@ -3279,7 +3279,7 @@
             </p:xfrm>
             <a:graphic>
               <a:graphicData uri="http://schemas.microsoft.com/office/webextensions/webextension/2010/11">
-                <we:webextensionref xmlns:we="http://schemas.microsoft.com/office/webextensions/webextension/2010/11" xmlns:r="http://schemas.openxmlformats.org/officeDocument/2006/relationships" r:id="Ra64e6052ac14492d"/>
+                <we:webextensionref xmlns:we="http://schemas.microsoft.com/office/webextensions/webextension/2010/11" xmlns:r="http://schemas.openxmlformats.org/officeDocument/2006/relationships" r:id="Ra647aa8c1ec341d2"/>
               </a:graphicData>
             </a:graphic>
           </p:graphicFrame>
@@ -3291,7 +3291,7 @@
               <p:cNvPicPr/>
             </p:nvPicPr>
             <p:blipFill>
-              <a:blip xmlns:r="http://schemas.openxmlformats.org/officeDocument/2006/relationships" r:embed="R1ac346a603904c0a"/>
+              <a:blip xmlns:r="http://schemas.openxmlformats.org/officeDocument/2006/relationships" r:embed="Rcbccbb633906408e"/>
               <a:stretch>
                 <a:fillRect/>
               </a:stretch>
@@ -3322,11 +3322,11 @@
 </file>
 
 <file path=ppt/slides/udata/data.xml><?xml version="1.0" encoding="utf-8"?>
-<we:webextension xmlns:r="http://schemas.openxmlformats.org/officeDocument/2006/relationships" xmlns:we="http://schemas.microsoft.com/office/webextensions/webextension/2010/11" id="{4d450e0c-d374-4eb7-ab18-c3c2b6d3d350}">
+<we:webextension xmlns:r="http://schemas.openxmlformats.org/officeDocument/2006/relationships" xmlns:we="http://schemas.microsoft.com/office/webextensions/webextension/2010/11" id="{26fb3e51-1ea4-4269-ba77-b7894b710d94}">
   <we:reference id="695691ef-8f6e-4dc4-b6b9-c5a5f44499f7" version="1.0.0.0" store="developer" storeType="Registry"/>
   <we:alternateReferences/>
   <we:properties/>
   <we:bindings/>
-  <we:snapshot xmlns:r="http://schemas.openxmlformats.org/officeDocument/2006/relationships" r:embed="R1ac346a603904c0a"/>
+  <we:snapshot xmlns:r="http://schemas.openxmlformats.org/officeDocument/2006/relationships" r:embed="Rcbccbb633906408e"/>
 </we:webextension>
 </file>
</xml_diff>

<commit_message>
dealt with daylight savings properly
</commit_message>
<xml_diff>
--- a/PowerPoll/PowerPoll/bin/Debug/Presentation1.pptx
+++ b/PowerPoll/PowerPoll/bin/Debug/Presentation1.pptx
@@ -2,10 +2,10 @@
 <file path=ppt/presentation.xml><?xml version="1.0" encoding="utf-8"?>
 <p:presentation xmlns:a="http://schemas.openxmlformats.org/drawingml/2006/main" xmlns:r="http://schemas.openxmlformats.org/officeDocument/2006/relationships" xmlns:p="http://schemas.openxmlformats.org/presentationml/2006/main" saveSubsetFonts="1">
   <p:sldMasterIdLst>
-    <p:sldMasterId id="2147483648" r:id="Rf52f87faae594d6d"/>
+    <p:sldMasterId id="2147483648" r:id="R8541875a6aa14612"/>
   </p:sldMasterIdLst>
   <p:sldIdLst>
-    <p:sldId id="256" r:id="R0ba8d0c3ca624ab4"/>
+    <p:sldId id="256" r:id="R2034f67ec608479c"/>
   </p:sldIdLst>
   <p:sldSz cx="12192000" cy="6858000"/>
   <p:notesSz cx="6858000" cy="9144000"/>
@@ -2652,17 +2652,17 @@
   </p:cSld>
   <p:clrMap bg1="lt1" tx1="dk1" bg2="lt2" tx2="dk2" accent1="accent1" accent2="accent2" accent3="accent3" accent4="accent4" accent5="accent5" accent6="accent6" hlink="hlink" folHlink="folHlink"/>
   <p:sldLayoutIdLst>
-    <p:sldLayoutId id="2147483649" r:id="Rd72a28a560464a30"/>
-    <p:sldLayoutId id="2147483650" r:id="Rf51314c99ad34db7"/>
-    <p:sldLayoutId id="2147483651" r:id="R929bbc7d1ece4b68"/>
-    <p:sldLayoutId id="2147483652" r:id="R4924a3840a494534"/>
-    <p:sldLayoutId id="2147483653" r:id="R49f891a353ab4608"/>
-    <p:sldLayoutId id="2147483654" r:id="Rf7bbb58632494ecf"/>
-    <p:sldLayoutId id="2147483655" r:id="R4c9d2056ff664b2a"/>
-    <p:sldLayoutId id="2147483656" r:id="R0d298ac41be141f2"/>
-    <p:sldLayoutId id="2147483657" r:id="Rbd9df7412e05461c"/>
-    <p:sldLayoutId id="2147483658" r:id="R364b8a179eea4437"/>
-    <p:sldLayoutId id="2147483659" r:id="R111c592bcd3940c6"/>
+    <p:sldLayoutId id="2147483649" r:id="Ra9df9c7d1ad944c0"/>
+    <p:sldLayoutId id="2147483650" r:id="R612b8900f0f04382"/>
+    <p:sldLayoutId id="2147483651" r:id="Rae1342efbf454ae7"/>
+    <p:sldLayoutId id="2147483652" r:id="R592ed01a076f4821"/>
+    <p:sldLayoutId id="2147483653" r:id="Ref55edb257b847f0"/>
+    <p:sldLayoutId id="2147483654" r:id="R03f46ef9dff4497a"/>
+    <p:sldLayoutId id="2147483655" r:id="Rf7566999ee274b38"/>
+    <p:sldLayoutId id="2147483656" r:id="R3ffce4d6e5794fd9"/>
+    <p:sldLayoutId id="2147483657" r:id="Rd71cddfe88774047"/>
+    <p:sldLayoutId id="2147483658" r:id="Rd6306b1241cf4bf9"/>
+    <p:sldLayoutId id="2147483659" r:id="R0207c096e0c24fb3"/>
   </p:sldLayoutIdLst>
   <p:txStyles>
     <p:titleStyle>
@@ -3279,7 +3279,7 @@
             </p:xfrm>
             <a:graphic>
               <a:graphicData uri="http://schemas.microsoft.com/office/webextensions/webextension/2010/11">
-                <we:webextensionref xmlns:we="http://schemas.microsoft.com/office/webextensions/webextension/2010/11" xmlns:r="http://schemas.openxmlformats.org/officeDocument/2006/relationships" r:id="Ra647aa8c1ec341d2"/>
+                <we:webextensionref xmlns:we="http://schemas.microsoft.com/office/webextensions/webextension/2010/11" xmlns:r="http://schemas.openxmlformats.org/officeDocument/2006/relationships" r:id="Rb7e09d370d1e4040"/>
               </a:graphicData>
             </a:graphic>
           </p:graphicFrame>
@@ -3291,7 +3291,7 @@
               <p:cNvPicPr/>
             </p:nvPicPr>
             <p:blipFill>
-              <a:blip xmlns:r="http://schemas.openxmlformats.org/officeDocument/2006/relationships" r:embed="Rcbccbb633906408e"/>
+              <a:blip xmlns:r="http://schemas.openxmlformats.org/officeDocument/2006/relationships" r:embed="R29adc014f0e34604"/>
               <a:stretch>
                 <a:fillRect/>
               </a:stretch>
@@ -3322,11 +3322,11 @@
 </file>
 
 <file path=ppt/slides/udata/data.xml><?xml version="1.0" encoding="utf-8"?>
-<we:webextension xmlns:r="http://schemas.openxmlformats.org/officeDocument/2006/relationships" xmlns:we="http://schemas.microsoft.com/office/webextensions/webextension/2010/11" id="{26fb3e51-1ea4-4269-ba77-b7894b710d94}">
+<we:webextension xmlns:r="http://schemas.openxmlformats.org/officeDocument/2006/relationships" xmlns:we="http://schemas.microsoft.com/office/webextensions/webextension/2010/11" id="{23a6934e-2ac2-44e8-9c5a-efe4ef03fade}">
   <we:reference id="695691ef-8f6e-4dc4-b6b9-c5a5f44499f7" version="1.0.0.0" store="developer" storeType="Registry"/>
   <we:alternateReferences/>
   <we:properties/>
   <we:bindings/>
-  <we:snapshot xmlns:r="http://schemas.openxmlformats.org/officeDocument/2006/relationships" r:embed="Rcbccbb633906408e"/>
+  <we:snapshot xmlns:r="http://schemas.openxmlformats.org/officeDocument/2006/relationships" r:embed="R29adc014f0e34604"/>
 </we:webextension>
 </file>
</xml_diff>

<commit_message>
actually fixed the daylight ssavings bug,  all dates in backend are now presumed to be UTC as for some reason it converts from the time in the backend (UTC, formerly GMT) to the local time when the table is called which would be fine if the time wasnt already in GMT in the database
</commit_message>
<xml_diff>
--- a/PowerPoll/PowerPoll/bin/Debug/Presentation1.pptx
+++ b/PowerPoll/PowerPoll/bin/Debug/Presentation1.pptx
@@ -2,10 +2,10 @@
 <file path=ppt/presentation.xml><?xml version="1.0" encoding="utf-8"?>
 <p:presentation xmlns:a="http://schemas.openxmlformats.org/drawingml/2006/main" xmlns:r="http://schemas.openxmlformats.org/officeDocument/2006/relationships" xmlns:p="http://schemas.openxmlformats.org/presentationml/2006/main" saveSubsetFonts="1">
   <p:sldMasterIdLst>
-    <p:sldMasterId id="2147483648" r:id="R8541875a6aa14612"/>
+    <p:sldMasterId id="2147483648" r:id="Raeda2ede69ca4ae5"/>
   </p:sldMasterIdLst>
   <p:sldIdLst>
-    <p:sldId id="256" r:id="R2034f67ec608479c"/>
+    <p:sldId id="256" r:id="Rc13439559419405c"/>
   </p:sldIdLst>
   <p:sldSz cx="12192000" cy="6858000"/>
   <p:notesSz cx="6858000" cy="9144000"/>
@@ -2652,17 +2652,17 @@
   </p:cSld>
   <p:clrMap bg1="lt1" tx1="dk1" bg2="lt2" tx2="dk2" accent1="accent1" accent2="accent2" accent3="accent3" accent4="accent4" accent5="accent5" accent6="accent6" hlink="hlink" folHlink="folHlink"/>
   <p:sldLayoutIdLst>
-    <p:sldLayoutId id="2147483649" r:id="Ra9df9c7d1ad944c0"/>
-    <p:sldLayoutId id="2147483650" r:id="R612b8900f0f04382"/>
-    <p:sldLayoutId id="2147483651" r:id="Rae1342efbf454ae7"/>
-    <p:sldLayoutId id="2147483652" r:id="R592ed01a076f4821"/>
-    <p:sldLayoutId id="2147483653" r:id="Ref55edb257b847f0"/>
-    <p:sldLayoutId id="2147483654" r:id="R03f46ef9dff4497a"/>
-    <p:sldLayoutId id="2147483655" r:id="Rf7566999ee274b38"/>
-    <p:sldLayoutId id="2147483656" r:id="R3ffce4d6e5794fd9"/>
-    <p:sldLayoutId id="2147483657" r:id="Rd71cddfe88774047"/>
-    <p:sldLayoutId id="2147483658" r:id="Rd6306b1241cf4bf9"/>
-    <p:sldLayoutId id="2147483659" r:id="R0207c096e0c24fb3"/>
+    <p:sldLayoutId id="2147483649" r:id="R2f72bcd7f7b046c1"/>
+    <p:sldLayoutId id="2147483650" r:id="Rf2850496702941ab"/>
+    <p:sldLayoutId id="2147483651" r:id="Ra51308f58784413a"/>
+    <p:sldLayoutId id="2147483652" r:id="R0103bd2d57fa498a"/>
+    <p:sldLayoutId id="2147483653" r:id="R809fbd8f15c24059"/>
+    <p:sldLayoutId id="2147483654" r:id="Re13bd9fb4ef84864"/>
+    <p:sldLayoutId id="2147483655" r:id="R7e286199099b4290"/>
+    <p:sldLayoutId id="2147483656" r:id="R109c26159d164d00"/>
+    <p:sldLayoutId id="2147483657" r:id="Rca456b31e94649ce"/>
+    <p:sldLayoutId id="2147483658" r:id="R7f4980b149e54c4a"/>
+    <p:sldLayoutId id="2147483659" r:id="Ra13f33b34f214bfc"/>
   </p:sldLayoutIdLst>
   <p:txStyles>
     <p:titleStyle>
@@ -3279,7 +3279,7 @@
             </p:xfrm>
             <a:graphic>
               <a:graphicData uri="http://schemas.microsoft.com/office/webextensions/webextension/2010/11">
-                <we:webextensionref xmlns:we="http://schemas.microsoft.com/office/webextensions/webextension/2010/11" xmlns:r="http://schemas.openxmlformats.org/officeDocument/2006/relationships" r:id="Rb7e09d370d1e4040"/>
+                <we:webextensionref xmlns:we="http://schemas.microsoft.com/office/webextensions/webextension/2010/11" xmlns:r="http://schemas.openxmlformats.org/officeDocument/2006/relationships" r:id="Rdbfebca68580445c"/>
               </a:graphicData>
             </a:graphic>
           </p:graphicFrame>
@@ -3291,7 +3291,7 @@
               <p:cNvPicPr/>
             </p:nvPicPr>
             <p:blipFill>
-              <a:blip xmlns:r="http://schemas.openxmlformats.org/officeDocument/2006/relationships" r:embed="R29adc014f0e34604"/>
+              <a:blip xmlns:r="http://schemas.openxmlformats.org/officeDocument/2006/relationships" r:embed="R9885ac3281c140c1"/>
               <a:stretch>
                 <a:fillRect/>
               </a:stretch>
@@ -3322,11 +3322,11 @@
 </file>
 
 <file path=ppt/slides/udata/data.xml><?xml version="1.0" encoding="utf-8"?>
-<we:webextension xmlns:r="http://schemas.openxmlformats.org/officeDocument/2006/relationships" xmlns:we="http://schemas.microsoft.com/office/webextensions/webextension/2010/11" id="{23a6934e-2ac2-44e8-9c5a-efe4ef03fade}">
+<we:webextension xmlns:r="http://schemas.openxmlformats.org/officeDocument/2006/relationships" xmlns:we="http://schemas.microsoft.com/office/webextensions/webextension/2010/11" id="{c8afd194-6543-446f-83ff-14ffe7434739}">
   <we:reference id="695691ef-8f6e-4dc4-b6b9-c5a5f44499f7" version="1.0.0.0" store="developer" storeType="Registry"/>
   <we:alternateReferences/>
   <we:properties/>
   <we:bindings/>
-  <we:snapshot xmlns:r="http://schemas.openxmlformats.org/officeDocument/2006/relationships" r:embed="R29adc014f0e34604"/>
+  <we:snapshot xmlns:r="http://schemas.openxmlformats.org/officeDocument/2006/relationships" r:embed="R9885ac3281c140c1"/>
 </we:webextension>
 </file>
</xml_diff>

<commit_message>
fixed option bug in backend
</commit_message>
<xml_diff>
--- a/PowerPoll/PowerPoll/bin/Debug/Presentation1.pptx
+++ b/PowerPoll/PowerPoll/bin/Debug/Presentation1.pptx
@@ -2,10 +2,10 @@
 <file path=ppt/presentation.xml><?xml version="1.0" encoding="utf-8"?>
 <p:presentation xmlns:a="http://schemas.openxmlformats.org/drawingml/2006/main" xmlns:r="http://schemas.openxmlformats.org/officeDocument/2006/relationships" xmlns:p="http://schemas.openxmlformats.org/presentationml/2006/main" saveSubsetFonts="1">
   <p:sldMasterIdLst>
-    <p:sldMasterId id="2147483648" r:id="Raeda2ede69ca4ae5"/>
+    <p:sldMasterId id="2147483648" r:id="R1894ac9d286042cd"/>
   </p:sldMasterIdLst>
   <p:sldIdLst>
-    <p:sldId id="256" r:id="Rc13439559419405c"/>
+    <p:sldId id="256" r:id="R612098f787624db8"/>
   </p:sldIdLst>
   <p:sldSz cx="12192000" cy="6858000"/>
   <p:notesSz cx="6858000" cy="9144000"/>
@@ -2652,17 +2652,17 @@
   </p:cSld>
   <p:clrMap bg1="lt1" tx1="dk1" bg2="lt2" tx2="dk2" accent1="accent1" accent2="accent2" accent3="accent3" accent4="accent4" accent5="accent5" accent6="accent6" hlink="hlink" folHlink="folHlink"/>
   <p:sldLayoutIdLst>
-    <p:sldLayoutId id="2147483649" r:id="R2f72bcd7f7b046c1"/>
-    <p:sldLayoutId id="2147483650" r:id="Rf2850496702941ab"/>
-    <p:sldLayoutId id="2147483651" r:id="Ra51308f58784413a"/>
-    <p:sldLayoutId id="2147483652" r:id="R0103bd2d57fa498a"/>
-    <p:sldLayoutId id="2147483653" r:id="R809fbd8f15c24059"/>
-    <p:sldLayoutId id="2147483654" r:id="Re13bd9fb4ef84864"/>
-    <p:sldLayoutId id="2147483655" r:id="R7e286199099b4290"/>
-    <p:sldLayoutId id="2147483656" r:id="R109c26159d164d00"/>
-    <p:sldLayoutId id="2147483657" r:id="Rca456b31e94649ce"/>
-    <p:sldLayoutId id="2147483658" r:id="R7f4980b149e54c4a"/>
-    <p:sldLayoutId id="2147483659" r:id="Ra13f33b34f214bfc"/>
+    <p:sldLayoutId id="2147483649" r:id="R1a5a884796464f02"/>
+    <p:sldLayoutId id="2147483650" r:id="R03e668351e2b4dad"/>
+    <p:sldLayoutId id="2147483651" r:id="R22d4cdf966fe436b"/>
+    <p:sldLayoutId id="2147483652" r:id="R777593913e8b4dc0"/>
+    <p:sldLayoutId id="2147483653" r:id="R9e42ce29b0ea4777"/>
+    <p:sldLayoutId id="2147483654" r:id="Rd7fc58753c0e4e66"/>
+    <p:sldLayoutId id="2147483655" r:id="R4de06d56a11140d4"/>
+    <p:sldLayoutId id="2147483656" r:id="R99d2fdf83f6d4258"/>
+    <p:sldLayoutId id="2147483657" r:id="Ra99cf2feee664149"/>
+    <p:sldLayoutId id="2147483658" r:id="R588f986b7d3240bf"/>
+    <p:sldLayoutId id="2147483659" r:id="R3676e0eb57a6461a"/>
   </p:sldLayoutIdLst>
   <p:txStyles>
     <p:titleStyle>
@@ -3279,7 +3279,7 @@
             </p:xfrm>
             <a:graphic>
               <a:graphicData uri="http://schemas.microsoft.com/office/webextensions/webextension/2010/11">
-                <we:webextensionref xmlns:we="http://schemas.microsoft.com/office/webextensions/webextension/2010/11" xmlns:r="http://schemas.openxmlformats.org/officeDocument/2006/relationships" r:id="Rdbfebca68580445c"/>
+                <we:webextensionref xmlns:we="http://schemas.microsoft.com/office/webextensions/webextension/2010/11" xmlns:r="http://schemas.openxmlformats.org/officeDocument/2006/relationships" r:id="R2ae74f3e10334458"/>
               </a:graphicData>
             </a:graphic>
           </p:graphicFrame>
@@ -3291,7 +3291,7 @@
               <p:cNvPicPr/>
             </p:nvPicPr>
             <p:blipFill>
-              <a:blip xmlns:r="http://schemas.openxmlformats.org/officeDocument/2006/relationships" r:embed="R9885ac3281c140c1"/>
+              <a:blip xmlns:r="http://schemas.openxmlformats.org/officeDocument/2006/relationships" r:embed="R7a9eefa1c8534354"/>
               <a:stretch>
                 <a:fillRect/>
               </a:stretch>
@@ -3322,11 +3322,11 @@
 </file>
 
 <file path=ppt/slides/udata/data.xml><?xml version="1.0" encoding="utf-8"?>
-<we:webextension xmlns:r="http://schemas.openxmlformats.org/officeDocument/2006/relationships" xmlns:we="http://schemas.microsoft.com/office/webextensions/webextension/2010/11" id="{c8afd194-6543-446f-83ff-14ffe7434739}">
+<we:webextension xmlns:r="http://schemas.openxmlformats.org/officeDocument/2006/relationships" xmlns:we="http://schemas.microsoft.com/office/webextensions/webextension/2010/11" id="{8289992f-4420-42ef-9b2f-c86449189b5e}">
   <we:reference id="695691ef-8f6e-4dc4-b6b9-c5a5f44499f7" version="1.0.0.0" store="developer" storeType="Registry"/>
   <we:alternateReferences/>
   <we:properties/>
   <we:bindings/>
-  <we:snapshot xmlns:r="http://schemas.openxmlformats.org/officeDocument/2006/relationships" r:embed="R9885ac3281c140c1"/>
+  <we:snapshot xmlns:r="http://schemas.openxmlformats.org/officeDocument/2006/relationships" r:embed="R7a9eefa1c8534354"/>
 </we:webextension>
 </file>
</xml_diff>